<commit_message>
edits part 2 072121
</commit_message>
<xml_diff>
--- a/docs/images/darktrace-vsensor-architecture-diagram.pptx
+++ b/docs/images/darktrace-vsensor-architecture-diagram.pptx
@@ -250,7 +250,7 @@
           <a:p>
             <a:fld id="{091DC170-1660-4809-9A15-62445EB0C7B1}" type="datetimeFigureOut">
               <a:rPr lang="en-US" smtClean="0"/>
-              <a:t>7/16/2021</a:t>
+              <a:t>7/21/2021</a:t>
             </a:fld>
             <a:endParaRPr lang="en-US"/>
           </a:p>
@@ -420,7 +420,7 @@
           <a:p>
             <a:fld id="{091DC170-1660-4809-9A15-62445EB0C7B1}" type="datetimeFigureOut">
               <a:rPr lang="en-US" smtClean="0"/>
-              <a:t>7/16/2021</a:t>
+              <a:t>7/21/2021</a:t>
             </a:fld>
             <a:endParaRPr lang="en-US"/>
           </a:p>
@@ -600,7 +600,7 @@
           <a:p>
             <a:fld id="{091DC170-1660-4809-9A15-62445EB0C7B1}" type="datetimeFigureOut">
               <a:rPr lang="en-US" smtClean="0"/>
-              <a:t>7/16/2021</a:t>
+              <a:t>7/21/2021</a:t>
             </a:fld>
             <a:endParaRPr lang="en-US"/>
           </a:p>
@@ -770,7 +770,7 @@
           <a:p>
             <a:fld id="{091DC170-1660-4809-9A15-62445EB0C7B1}" type="datetimeFigureOut">
               <a:rPr lang="en-US" smtClean="0"/>
-              <a:t>7/16/2021</a:t>
+              <a:t>7/21/2021</a:t>
             </a:fld>
             <a:endParaRPr lang="en-US"/>
           </a:p>
@@ -1016,7 +1016,7 @@
           <a:p>
             <a:fld id="{091DC170-1660-4809-9A15-62445EB0C7B1}" type="datetimeFigureOut">
               <a:rPr lang="en-US" smtClean="0"/>
-              <a:t>7/16/2021</a:t>
+              <a:t>7/21/2021</a:t>
             </a:fld>
             <a:endParaRPr lang="en-US"/>
           </a:p>
@@ -1248,7 +1248,7 @@
           <a:p>
             <a:fld id="{091DC170-1660-4809-9A15-62445EB0C7B1}" type="datetimeFigureOut">
               <a:rPr lang="en-US" smtClean="0"/>
-              <a:t>7/16/2021</a:t>
+              <a:t>7/21/2021</a:t>
             </a:fld>
             <a:endParaRPr lang="en-US"/>
           </a:p>
@@ -1615,7 +1615,7 @@
           <a:p>
             <a:fld id="{091DC170-1660-4809-9A15-62445EB0C7B1}" type="datetimeFigureOut">
               <a:rPr lang="en-US" smtClean="0"/>
-              <a:t>7/16/2021</a:t>
+              <a:t>7/21/2021</a:t>
             </a:fld>
             <a:endParaRPr lang="en-US"/>
           </a:p>
@@ -1733,7 +1733,7 @@
           <a:p>
             <a:fld id="{091DC170-1660-4809-9A15-62445EB0C7B1}" type="datetimeFigureOut">
               <a:rPr lang="en-US" smtClean="0"/>
-              <a:t>7/16/2021</a:t>
+              <a:t>7/21/2021</a:t>
             </a:fld>
             <a:endParaRPr lang="en-US"/>
           </a:p>
@@ -1828,7 +1828,7 @@
           <a:p>
             <a:fld id="{091DC170-1660-4809-9A15-62445EB0C7B1}" type="datetimeFigureOut">
               <a:rPr lang="en-US" smtClean="0"/>
-              <a:t>7/16/2021</a:t>
+              <a:t>7/21/2021</a:t>
             </a:fld>
             <a:endParaRPr lang="en-US"/>
           </a:p>
@@ -2105,7 +2105,7 @@
           <a:p>
             <a:fld id="{091DC170-1660-4809-9A15-62445EB0C7B1}" type="datetimeFigureOut">
               <a:rPr lang="en-US" smtClean="0"/>
-              <a:t>7/16/2021</a:t>
+              <a:t>7/21/2021</a:t>
             </a:fld>
             <a:endParaRPr lang="en-US"/>
           </a:p>
@@ -2358,7 +2358,7 @@
           <a:p>
             <a:fld id="{091DC170-1660-4809-9A15-62445EB0C7B1}" type="datetimeFigureOut">
               <a:rPr lang="en-US" smtClean="0"/>
-              <a:t>7/16/2021</a:t>
+              <a:t>7/21/2021</a:t>
             </a:fld>
             <a:endParaRPr lang="en-US"/>
           </a:p>
@@ -2571,7 +2571,7 @@
           <a:p>
             <a:fld id="{091DC170-1660-4809-9A15-62445EB0C7B1}" type="datetimeFigureOut">
               <a:rPr lang="en-US" smtClean="0"/>
-              <a:t>7/16/2021</a:t>
+              <a:t>7/21/2021</a:t>
             </a:fld>
             <a:endParaRPr lang="en-US"/>
           </a:p>
@@ -27467,7 +27467,7 @@
                 <a:ea typeface="Amazon Ember" panose="020B0603020204020204" pitchFamily="34" charset="0"/>
                 <a:cs typeface="Arial" panose="020B0604020202020204" pitchFamily="34" charset="0"/>
               </a:rPr>
-              <a:t>mirroring </a:t>
+              <a:t>mirror </a:t>
             </a:r>
             <a:r>
               <a:rPr lang="en-US" altLang="en-US" sz="1200" dirty="0" smtClean="0">

</xml_diff>

<commit_message>
[docs] vSensors contact the Darktrace appliance not the bastion
Update diagrams to show that
</commit_message>
<xml_diff>
--- a/docs/images/darktrace-vsensor-architecture-diagram.pptx
+++ b/docs/images/darktrace-vsensor-architecture-diagram.pptx
@@ -157,10 +157,9 @@
           </a:lstStyle>
           <a:p>
             <a:r>
-              <a:rPr lang="en-US" smtClean="0"/>
+              <a:rPr lang="en-US"/>
               <a:t>Click to edit Master title style</a:t>
             </a:r>
-            <a:endParaRPr lang="en-US"/>
           </a:p>
         </p:txBody>
       </p:sp>
@@ -222,10 +221,9 @@
           </a:lstStyle>
           <a:p>
             <a:r>
-              <a:rPr lang="en-US" smtClean="0"/>
+              <a:rPr lang="en-US"/>
               <a:t>Click to edit Master subtitle style</a:t>
             </a:r>
-            <a:endParaRPr lang="en-US"/>
           </a:p>
         </p:txBody>
       </p:sp>
@@ -246,7 +244,7 @@
           <a:p>
             <a:fld id="{091DC170-1660-4809-9A15-62445EB0C7B1}" type="datetimeFigureOut">
               <a:rPr lang="en-US" smtClean="0"/>
-              <a:t>7/26/2021</a:t>
+              <a:t>8/9/21</a:t>
             </a:fld>
             <a:endParaRPr lang="en-US"/>
           </a:p>
@@ -340,10 +338,9 @@
           <a:lstStyle/>
           <a:p>
             <a:r>
-              <a:rPr lang="en-US" smtClean="0"/>
+              <a:rPr lang="en-US"/>
               <a:t>Click to edit Master title style</a:t>
             </a:r>
-            <a:endParaRPr lang="en-US"/>
           </a:p>
         </p:txBody>
       </p:sp>
@@ -364,38 +361,37 @@
           <a:p>
             <a:pPr lvl="0"/>
             <a:r>
-              <a:rPr lang="en-US" smtClean="0"/>
+              <a:rPr lang="en-US"/>
               <a:t>Edit Master text styles</a:t>
             </a:r>
           </a:p>
           <a:p>
             <a:pPr lvl="1"/>
             <a:r>
-              <a:rPr lang="en-US" smtClean="0"/>
+              <a:rPr lang="en-US"/>
               <a:t>Second level</a:t>
             </a:r>
           </a:p>
           <a:p>
             <a:pPr lvl="2"/>
             <a:r>
-              <a:rPr lang="en-US" smtClean="0"/>
+              <a:rPr lang="en-US"/>
               <a:t>Third level</a:t>
             </a:r>
           </a:p>
           <a:p>
             <a:pPr lvl="3"/>
             <a:r>
-              <a:rPr lang="en-US" smtClean="0"/>
+              <a:rPr lang="en-US"/>
               <a:t>Fourth level</a:t>
             </a:r>
           </a:p>
           <a:p>
             <a:pPr lvl="4"/>
             <a:r>
-              <a:rPr lang="en-US" smtClean="0"/>
+              <a:rPr lang="en-US"/>
               <a:t>Fifth level</a:t>
             </a:r>
-            <a:endParaRPr lang="en-US"/>
           </a:p>
         </p:txBody>
       </p:sp>
@@ -416,7 +412,7 @@
           <a:p>
             <a:fld id="{091DC170-1660-4809-9A15-62445EB0C7B1}" type="datetimeFigureOut">
               <a:rPr lang="en-US" smtClean="0"/>
-              <a:t>7/26/2021</a:t>
+              <a:t>8/9/21</a:t>
             </a:fld>
             <a:endParaRPr lang="en-US"/>
           </a:p>
@@ -515,10 +511,9 @@
           <a:lstStyle/>
           <a:p>
             <a:r>
-              <a:rPr lang="en-US" smtClean="0"/>
+              <a:rPr lang="en-US"/>
               <a:t>Click to edit Master title style</a:t>
             </a:r>
-            <a:endParaRPr lang="en-US"/>
           </a:p>
         </p:txBody>
       </p:sp>
@@ -544,38 +539,37 @@
           <a:p>
             <a:pPr lvl="0"/>
             <a:r>
-              <a:rPr lang="en-US" smtClean="0"/>
+              <a:rPr lang="en-US"/>
               <a:t>Edit Master text styles</a:t>
             </a:r>
           </a:p>
           <a:p>
             <a:pPr lvl="1"/>
             <a:r>
-              <a:rPr lang="en-US" smtClean="0"/>
+              <a:rPr lang="en-US"/>
               <a:t>Second level</a:t>
             </a:r>
           </a:p>
           <a:p>
             <a:pPr lvl="2"/>
             <a:r>
-              <a:rPr lang="en-US" smtClean="0"/>
+              <a:rPr lang="en-US"/>
               <a:t>Third level</a:t>
             </a:r>
           </a:p>
           <a:p>
             <a:pPr lvl="3"/>
             <a:r>
-              <a:rPr lang="en-US" smtClean="0"/>
+              <a:rPr lang="en-US"/>
               <a:t>Fourth level</a:t>
             </a:r>
           </a:p>
           <a:p>
             <a:pPr lvl="4"/>
             <a:r>
-              <a:rPr lang="en-US" smtClean="0"/>
+              <a:rPr lang="en-US"/>
               <a:t>Fifth level</a:t>
             </a:r>
-            <a:endParaRPr lang="en-US"/>
           </a:p>
         </p:txBody>
       </p:sp>
@@ -596,7 +590,7 @@
           <a:p>
             <a:fld id="{091DC170-1660-4809-9A15-62445EB0C7B1}" type="datetimeFigureOut">
               <a:rPr lang="en-US" smtClean="0"/>
-              <a:t>7/26/2021</a:t>
+              <a:t>8/9/21</a:t>
             </a:fld>
             <a:endParaRPr lang="en-US"/>
           </a:p>
@@ -690,10 +684,9 @@
           <a:lstStyle/>
           <a:p>
             <a:r>
-              <a:rPr lang="en-US" smtClean="0"/>
+              <a:rPr lang="en-US"/>
               <a:t>Click to edit Master title style</a:t>
             </a:r>
-            <a:endParaRPr lang="en-US"/>
           </a:p>
         </p:txBody>
       </p:sp>
@@ -714,38 +707,37 @@
           <a:p>
             <a:pPr lvl="0"/>
             <a:r>
-              <a:rPr lang="en-US" smtClean="0"/>
+              <a:rPr lang="en-US"/>
               <a:t>Edit Master text styles</a:t>
             </a:r>
           </a:p>
           <a:p>
             <a:pPr lvl="1"/>
             <a:r>
-              <a:rPr lang="en-US" smtClean="0"/>
+              <a:rPr lang="en-US"/>
               <a:t>Second level</a:t>
             </a:r>
           </a:p>
           <a:p>
             <a:pPr lvl="2"/>
             <a:r>
-              <a:rPr lang="en-US" smtClean="0"/>
+              <a:rPr lang="en-US"/>
               <a:t>Third level</a:t>
             </a:r>
           </a:p>
           <a:p>
             <a:pPr lvl="3"/>
             <a:r>
-              <a:rPr lang="en-US" smtClean="0"/>
+              <a:rPr lang="en-US"/>
               <a:t>Fourth level</a:t>
             </a:r>
           </a:p>
           <a:p>
             <a:pPr lvl="4"/>
             <a:r>
-              <a:rPr lang="en-US" smtClean="0"/>
+              <a:rPr lang="en-US"/>
               <a:t>Fifth level</a:t>
             </a:r>
-            <a:endParaRPr lang="en-US"/>
           </a:p>
         </p:txBody>
       </p:sp>
@@ -766,7 +758,7 @@
           <a:p>
             <a:fld id="{091DC170-1660-4809-9A15-62445EB0C7B1}" type="datetimeFigureOut">
               <a:rPr lang="en-US" smtClean="0"/>
-              <a:t>7/26/2021</a:t>
+              <a:t>8/9/21</a:t>
             </a:fld>
             <a:endParaRPr lang="en-US"/>
           </a:p>
@@ -869,10 +861,9 @@
           </a:lstStyle>
           <a:p>
             <a:r>
-              <a:rPr lang="en-US" smtClean="0"/>
+              <a:rPr lang="en-US"/>
               <a:t>Click to edit Master title style</a:t>
             </a:r>
-            <a:endParaRPr lang="en-US"/>
           </a:p>
         </p:txBody>
       </p:sp>
@@ -989,7 +980,7 @@
           <a:p>
             <a:pPr lvl="0"/>
             <a:r>
-              <a:rPr lang="en-US" smtClean="0"/>
+              <a:rPr lang="en-US"/>
               <a:t>Edit Master text styles</a:t>
             </a:r>
           </a:p>
@@ -1012,7 +1003,7 @@
           <a:p>
             <a:fld id="{091DC170-1660-4809-9A15-62445EB0C7B1}" type="datetimeFigureOut">
               <a:rPr lang="en-US" smtClean="0"/>
-              <a:t>7/26/2021</a:t>
+              <a:t>8/9/21</a:t>
             </a:fld>
             <a:endParaRPr lang="en-US"/>
           </a:p>
@@ -1106,10 +1097,9 @@
           <a:lstStyle/>
           <a:p>
             <a:r>
-              <a:rPr lang="en-US" smtClean="0"/>
+              <a:rPr lang="en-US"/>
               <a:t>Click to edit Master title style</a:t>
             </a:r>
-            <a:endParaRPr lang="en-US"/>
           </a:p>
         </p:txBody>
       </p:sp>
@@ -1135,38 +1125,37 @@
           <a:p>
             <a:pPr lvl="0"/>
             <a:r>
-              <a:rPr lang="en-US" smtClean="0"/>
+              <a:rPr lang="en-US"/>
               <a:t>Edit Master text styles</a:t>
             </a:r>
           </a:p>
           <a:p>
             <a:pPr lvl="1"/>
             <a:r>
-              <a:rPr lang="en-US" smtClean="0"/>
+              <a:rPr lang="en-US"/>
               <a:t>Second level</a:t>
             </a:r>
           </a:p>
           <a:p>
             <a:pPr lvl="2"/>
             <a:r>
-              <a:rPr lang="en-US" smtClean="0"/>
+              <a:rPr lang="en-US"/>
               <a:t>Third level</a:t>
             </a:r>
           </a:p>
           <a:p>
             <a:pPr lvl="3"/>
             <a:r>
-              <a:rPr lang="en-US" smtClean="0"/>
+              <a:rPr lang="en-US"/>
               <a:t>Fourth level</a:t>
             </a:r>
           </a:p>
           <a:p>
             <a:pPr lvl="4"/>
             <a:r>
-              <a:rPr lang="en-US" smtClean="0"/>
+              <a:rPr lang="en-US"/>
               <a:t>Fifth level</a:t>
             </a:r>
-            <a:endParaRPr lang="en-US"/>
           </a:p>
         </p:txBody>
       </p:sp>
@@ -1192,38 +1181,37 @@
           <a:p>
             <a:pPr lvl="0"/>
             <a:r>
-              <a:rPr lang="en-US" smtClean="0"/>
+              <a:rPr lang="en-US"/>
               <a:t>Edit Master text styles</a:t>
             </a:r>
           </a:p>
           <a:p>
             <a:pPr lvl="1"/>
             <a:r>
-              <a:rPr lang="en-US" smtClean="0"/>
+              <a:rPr lang="en-US"/>
               <a:t>Second level</a:t>
             </a:r>
           </a:p>
           <a:p>
             <a:pPr lvl="2"/>
             <a:r>
-              <a:rPr lang="en-US" smtClean="0"/>
+              <a:rPr lang="en-US"/>
               <a:t>Third level</a:t>
             </a:r>
           </a:p>
           <a:p>
             <a:pPr lvl="3"/>
             <a:r>
-              <a:rPr lang="en-US" smtClean="0"/>
+              <a:rPr lang="en-US"/>
               <a:t>Fourth level</a:t>
             </a:r>
           </a:p>
           <a:p>
             <a:pPr lvl="4"/>
             <a:r>
-              <a:rPr lang="en-US" smtClean="0"/>
+              <a:rPr lang="en-US"/>
               <a:t>Fifth level</a:t>
             </a:r>
-            <a:endParaRPr lang="en-US"/>
           </a:p>
         </p:txBody>
       </p:sp>
@@ -1244,7 +1232,7 @@
           <a:p>
             <a:fld id="{091DC170-1660-4809-9A15-62445EB0C7B1}" type="datetimeFigureOut">
               <a:rPr lang="en-US" smtClean="0"/>
-              <a:t>7/26/2021</a:t>
+              <a:t>8/9/21</a:t>
             </a:fld>
             <a:endParaRPr lang="en-US"/>
           </a:p>
@@ -1343,10 +1331,9 @@
           <a:lstStyle/>
           <a:p>
             <a:r>
-              <a:rPr lang="en-US" smtClean="0"/>
+              <a:rPr lang="en-US"/>
               <a:t>Click to edit Master title style</a:t>
             </a:r>
-            <a:endParaRPr lang="en-US"/>
           </a:p>
         </p:txBody>
       </p:sp>
@@ -1409,7 +1396,7 @@
           <a:p>
             <a:pPr lvl="0"/>
             <a:r>
-              <a:rPr lang="en-US" smtClean="0"/>
+              <a:rPr lang="en-US"/>
               <a:t>Edit Master text styles</a:t>
             </a:r>
           </a:p>
@@ -1437,38 +1424,37 @@
           <a:p>
             <a:pPr lvl="0"/>
             <a:r>
-              <a:rPr lang="en-US" smtClean="0"/>
+              <a:rPr lang="en-US"/>
               <a:t>Edit Master text styles</a:t>
             </a:r>
           </a:p>
           <a:p>
             <a:pPr lvl="1"/>
             <a:r>
-              <a:rPr lang="en-US" smtClean="0"/>
+              <a:rPr lang="en-US"/>
               <a:t>Second level</a:t>
             </a:r>
           </a:p>
           <a:p>
             <a:pPr lvl="2"/>
             <a:r>
-              <a:rPr lang="en-US" smtClean="0"/>
+              <a:rPr lang="en-US"/>
               <a:t>Third level</a:t>
             </a:r>
           </a:p>
           <a:p>
             <a:pPr lvl="3"/>
             <a:r>
-              <a:rPr lang="en-US" smtClean="0"/>
+              <a:rPr lang="en-US"/>
               <a:t>Fourth level</a:t>
             </a:r>
           </a:p>
           <a:p>
             <a:pPr lvl="4"/>
             <a:r>
-              <a:rPr lang="en-US" smtClean="0"/>
+              <a:rPr lang="en-US"/>
               <a:t>Fifth level</a:t>
             </a:r>
-            <a:endParaRPr lang="en-US"/>
           </a:p>
         </p:txBody>
       </p:sp>
@@ -1531,7 +1517,7 @@
           <a:p>
             <a:pPr lvl="0"/>
             <a:r>
-              <a:rPr lang="en-US" smtClean="0"/>
+              <a:rPr lang="en-US"/>
               <a:t>Edit Master text styles</a:t>
             </a:r>
           </a:p>
@@ -1559,38 +1545,37 @@
           <a:p>
             <a:pPr lvl="0"/>
             <a:r>
-              <a:rPr lang="en-US" smtClean="0"/>
+              <a:rPr lang="en-US"/>
               <a:t>Edit Master text styles</a:t>
             </a:r>
           </a:p>
           <a:p>
             <a:pPr lvl="1"/>
             <a:r>
-              <a:rPr lang="en-US" smtClean="0"/>
+              <a:rPr lang="en-US"/>
               <a:t>Second level</a:t>
             </a:r>
           </a:p>
           <a:p>
             <a:pPr lvl="2"/>
             <a:r>
-              <a:rPr lang="en-US" smtClean="0"/>
+              <a:rPr lang="en-US"/>
               <a:t>Third level</a:t>
             </a:r>
           </a:p>
           <a:p>
             <a:pPr lvl="3"/>
             <a:r>
-              <a:rPr lang="en-US" smtClean="0"/>
+              <a:rPr lang="en-US"/>
               <a:t>Fourth level</a:t>
             </a:r>
           </a:p>
           <a:p>
             <a:pPr lvl="4"/>
             <a:r>
-              <a:rPr lang="en-US" smtClean="0"/>
+              <a:rPr lang="en-US"/>
               <a:t>Fifth level</a:t>
             </a:r>
-            <a:endParaRPr lang="en-US"/>
           </a:p>
         </p:txBody>
       </p:sp>
@@ -1611,7 +1596,7 @@
           <a:p>
             <a:fld id="{091DC170-1660-4809-9A15-62445EB0C7B1}" type="datetimeFigureOut">
               <a:rPr lang="en-US" smtClean="0"/>
-              <a:t>7/26/2021</a:t>
+              <a:t>8/9/21</a:t>
             </a:fld>
             <a:endParaRPr lang="en-US"/>
           </a:p>
@@ -1705,10 +1690,9 @@
           <a:lstStyle/>
           <a:p>
             <a:r>
-              <a:rPr lang="en-US" smtClean="0"/>
+              <a:rPr lang="en-US"/>
               <a:t>Click to edit Master title style</a:t>
             </a:r>
-            <a:endParaRPr lang="en-US"/>
           </a:p>
         </p:txBody>
       </p:sp>
@@ -1729,7 +1713,7 @@
           <a:p>
             <a:fld id="{091DC170-1660-4809-9A15-62445EB0C7B1}" type="datetimeFigureOut">
               <a:rPr lang="en-US" smtClean="0"/>
-              <a:t>7/26/2021</a:t>
+              <a:t>8/9/21</a:t>
             </a:fld>
             <a:endParaRPr lang="en-US"/>
           </a:p>
@@ -1824,7 +1808,7 @@
           <a:p>
             <a:fld id="{091DC170-1660-4809-9A15-62445EB0C7B1}" type="datetimeFigureOut">
               <a:rPr lang="en-US" smtClean="0"/>
-              <a:t>7/26/2021</a:t>
+              <a:t>8/9/21</a:t>
             </a:fld>
             <a:endParaRPr lang="en-US"/>
           </a:p>
@@ -1927,10 +1911,9 @@
           </a:lstStyle>
           <a:p>
             <a:r>
-              <a:rPr lang="en-US" smtClean="0"/>
+              <a:rPr lang="en-US"/>
               <a:t>Click to edit Master title style</a:t>
             </a:r>
-            <a:endParaRPr lang="en-US"/>
           </a:p>
         </p:txBody>
       </p:sp>
@@ -1984,38 +1967,37 @@
           <a:p>
             <a:pPr lvl="0"/>
             <a:r>
-              <a:rPr lang="en-US" smtClean="0"/>
+              <a:rPr lang="en-US"/>
               <a:t>Edit Master text styles</a:t>
             </a:r>
           </a:p>
           <a:p>
             <a:pPr lvl="1"/>
             <a:r>
-              <a:rPr lang="en-US" smtClean="0"/>
+              <a:rPr lang="en-US"/>
               <a:t>Second level</a:t>
             </a:r>
           </a:p>
           <a:p>
             <a:pPr lvl="2"/>
             <a:r>
-              <a:rPr lang="en-US" smtClean="0"/>
+              <a:rPr lang="en-US"/>
               <a:t>Third level</a:t>
             </a:r>
           </a:p>
           <a:p>
             <a:pPr lvl="3"/>
             <a:r>
-              <a:rPr lang="en-US" smtClean="0"/>
+              <a:rPr lang="en-US"/>
               <a:t>Fourth level</a:t>
             </a:r>
           </a:p>
           <a:p>
             <a:pPr lvl="4"/>
             <a:r>
-              <a:rPr lang="en-US" smtClean="0"/>
+              <a:rPr lang="en-US"/>
               <a:t>Fifth level</a:t>
             </a:r>
-            <a:endParaRPr lang="en-US"/>
           </a:p>
         </p:txBody>
       </p:sp>
@@ -2078,7 +2060,7 @@
           <a:p>
             <a:pPr lvl="0"/>
             <a:r>
-              <a:rPr lang="en-US" smtClean="0"/>
+              <a:rPr lang="en-US"/>
               <a:t>Edit Master text styles</a:t>
             </a:r>
           </a:p>
@@ -2101,7 +2083,7 @@
           <a:p>
             <a:fld id="{091DC170-1660-4809-9A15-62445EB0C7B1}" type="datetimeFigureOut">
               <a:rPr lang="en-US" smtClean="0"/>
-              <a:t>7/26/2021</a:t>
+              <a:t>8/9/21</a:t>
             </a:fld>
             <a:endParaRPr lang="en-US"/>
           </a:p>
@@ -2204,10 +2186,9 @@
           </a:lstStyle>
           <a:p>
             <a:r>
-              <a:rPr lang="en-US" smtClean="0"/>
+              <a:rPr lang="en-US"/>
               <a:t>Click to edit Master title style</a:t>
             </a:r>
-            <a:endParaRPr lang="en-US"/>
           </a:p>
         </p:txBody>
       </p:sp>
@@ -2331,7 +2312,7 @@
           <a:p>
             <a:pPr lvl="0"/>
             <a:r>
-              <a:rPr lang="en-US" smtClean="0"/>
+              <a:rPr lang="en-US"/>
               <a:t>Edit Master text styles</a:t>
             </a:r>
           </a:p>
@@ -2354,7 +2335,7 @@
           <a:p>
             <a:fld id="{091DC170-1660-4809-9A15-62445EB0C7B1}" type="datetimeFigureOut">
               <a:rPr lang="en-US" smtClean="0"/>
-              <a:t>7/26/2021</a:t>
+              <a:t>8/9/21</a:t>
             </a:fld>
             <a:endParaRPr lang="en-US"/>
           </a:p>
@@ -2463,10 +2444,9 @@
           <a:lstStyle/>
           <a:p>
             <a:r>
-              <a:rPr lang="en-US" smtClean="0"/>
+              <a:rPr lang="en-US"/>
               <a:t>Click to edit Master title style</a:t>
             </a:r>
-            <a:endParaRPr lang="en-US"/>
           </a:p>
         </p:txBody>
       </p:sp>
@@ -2497,38 +2477,37 @@
           <a:p>
             <a:pPr lvl="0"/>
             <a:r>
-              <a:rPr lang="en-US" smtClean="0"/>
+              <a:rPr lang="en-US"/>
               <a:t>Edit Master text styles</a:t>
             </a:r>
           </a:p>
           <a:p>
             <a:pPr lvl="1"/>
             <a:r>
-              <a:rPr lang="en-US" smtClean="0"/>
+              <a:rPr lang="en-US"/>
               <a:t>Second level</a:t>
             </a:r>
           </a:p>
           <a:p>
             <a:pPr lvl="2"/>
             <a:r>
-              <a:rPr lang="en-US" smtClean="0"/>
+              <a:rPr lang="en-US"/>
               <a:t>Third level</a:t>
             </a:r>
           </a:p>
           <a:p>
             <a:pPr lvl="3"/>
             <a:r>
-              <a:rPr lang="en-US" smtClean="0"/>
+              <a:rPr lang="en-US"/>
               <a:t>Fourth level</a:t>
             </a:r>
           </a:p>
           <a:p>
             <a:pPr lvl="4"/>
             <a:r>
-              <a:rPr lang="en-US" smtClean="0"/>
+              <a:rPr lang="en-US"/>
               <a:t>Fifth level</a:t>
             </a:r>
-            <a:endParaRPr lang="en-US"/>
           </a:p>
         </p:txBody>
       </p:sp>
@@ -2567,7 +2546,7 @@
           <a:p>
             <a:fld id="{091DC170-1660-4809-9A15-62445EB0C7B1}" type="datetimeFigureOut">
               <a:rPr lang="en-US" smtClean="0"/>
-              <a:t>7/26/2021</a:t>
+              <a:t>8/9/21</a:t>
             </a:fld>
             <a:endParaRPr lang="en-US"/>
           </a:p>
@@ -3431,7 +3410,7 @@
           <a:p>
             <a:pPr algn="ctr" eaLnBrk="1" hangingPunct="1"/>
             <a:r>
-              <a:rPr lang="en-US" altLang="en-US" sz="1200" dirty="0" smtClean="0">
+              <a:rPr lang="en-US" altLang="en-US" sz="1200" dirty="0">
                 <a:solidFill>
                   <a:srgbClr val="232F3E"/>
                 </a:solidFill>
@@ -3440,13 +3419,6 @@
               </a:rPr>
               <a:t>Darktrace vSensor</a:t>
             </a:r>
-            <a:endParaRPr lang="en-US" altLang="en-US" sz="1200" dirty="0">
-              <a:solidFill>
-                <a:srgbClr val="232F3E"/>
-              </a:solidFill>
-              <a:latin typeface="Arial" panose="020B0604020202020204" pitchFamily="34" charset="0"/>
-              <a:cs typeface="Arial" panose="020B0604020202020204" pitchFamily="34" charset="0"/>
-            </a:endParaRPr>
           </a:p>
         </p:txBody>
       </p:sp>
@@ -3853,7 +3825,7 @@
           <a:p>
             <a:pPr algn="ctr" eaLnBrk="1" hangingPunct="1"/>
             <a:r>
-              <a:rPr lang="en-US" altLang="en-US" sz="1200" dirty="0" smtClean="0">
+              <a:rPr lang="en-US" altLang="en-US" sz="1200" dirty="0">
                 <a:solidFill>
                   <a:srgbClr val="232F3E"/>
                 </a:solidFill>
@@ -3862,13 +3834,6 @@
               </a:rPr>
               <a:t>Linux bastion host</a:t>
             </a:r>
-            <a:endParaRPr lang="en-US" altLang="en-US" sz="1200" dirty="0">
-              <a:solidFill>
-                <a:srgbClr val="232F3E"/>
-              </a:solidFill>
-              <a:latin typeface="Arial" panose="020B0604020202020204" pitchFamily="34" charset="0"/>
-              <a:cs typeface="Arial" panose="020B0604020202020204" pitchFamily="34" charset="0"/>
-            </a:endParaRPr>
           </a:p>
         </p:txBody>
       </p:sp>
@@ -4364,18 +4329,13 @@
           <a:p>
             <a:pPr algn="ctr" eaLnBrk="1" hangingPunct="1"/>
             <a:r>
-              <a:rPr lang="en-US" altLang="en-US" sz="1200" dirty="0" smtClean="0">
+              <a:rPr lang="en-US" altLang="en-US" sz="1200" dirty="0">
                 <a:latin typeface="Arial" panose="020B0604020202020204" pitchFamily="34" charset="0"/>
                 <a:ea typeface="Amazon Ember" panose="020B0603020204020204" pitchFamily="34" charset="0"/>
                 <a:cs typeface="Arial" panose="020B0604020202020204" pitchFamily="34" charset="0"/>
               </a:rPr>
               <a:t>Captured packets</a:t>
             </a:r>
-            <a:endParaRPr lang="en-US" altLang="en-US" sz="1200" dirty="0">
-              <a:latin typeface="Arial" panose="020B0604020202020204" pitchFamily="34" charset="0"/>
-              <a:ea typeface="Amazon Ember" panose="020B0603020204020204" pitchFamily="34" charset="0"/>
-              <a:cs typeface="Arial" panose="020B0604020202020204" pitchFamily="34" charset="0"/>
-            </a:endParaRPr>
           </a:p>
         </p:txBody>
       </p:sp>
@@ -5028,7 +4988,7 @@
           <a:p>
             <a:pPr algn="ctr" eaLnBrk="1" hangingPunct="1"/>
             <a:r>
-              <a:rPr lang="en-US" altLang="en-US" sz="1200" dirty="0" smtClean="0">
+              <a:rPr lang="en-US" altLang="en-US" sz="1200" dirty="0">
                 <a:solidFill>
                   <a:srgbClr val="232F3E"/>
                 </a:solidFill>
@@ -5037,13 +4997,6 @@
               </a:rPr>
               <a:t>Darktrace vSensor</a:t>
             </a:r>
-            <a:endParaRPr lang="en-US" altLang="en-US" sz="1200" dirty="0">
-              <a:solidFill>
-                <a:srgbClr val="232F3E"/>
-              </a:solidFill>
-              <a:latin typeface="Arial" panose="020B0604020202020204" pitchFamily="34" charset="0"/>
-              <a:cs typeface="Arial" panose="020B0604020202020204" pitchFamily="34" charset="0"/>
-            </a:endParaRPr>
           </a:p>
         </p:txBody>
       </p:sp>
@@ -5450,7 +5403,7 @@
           <a:p>
             <a:pPr algn="ctr" eaLnBrk="1" hangingPunct="1"/>
             <a:r>
-              <a:rPr lang="en-US" altLang="en-US" sz="1200" dirty="0" smtClean="0">
+              <a:rPr lang="en-US" altLang="en-US" sz="1200" dirty="0">
                 <a:solidFill>
                   <a:srgbClr val="232F3E"/>
                 </a:solidFill>
@@ -5459,13 +5412,6 @@
               </a:rPr>
               <a:t>Linux bastion host</a:t>
             </a:r>
-            <a:endParaRPr lang="en-US" altLang="en-US" sz="1200" dirty="0">
-              <a:solidFill>
-                <a:srgbClr val="232F3E"/>
-              </a:solidFill>
-              <a:latin typeface="Arial" panose="020B0604020202020204" pitchFamily="34" charset="0"/>
-              <a:cs typeface="Arial" panose="020B0604020202020204" pitchFamily="34" charset="0"/>
-            </a:endParaRPr>
           </a:p>
         </p:txBody>
       </p:sp>
@@ -5908,21 +5854,8 @@
                 <a:ea typeface="Amazon Ember" panose="020B0603020204020204" pitchFamily="34" charset="0"/>
                 <a:cs typeface="Arial" panose="020B0604020202020204" pitchFamily="34" charset="0"/>
               </a:rPr>
-              <a:t>Traffic </a:t>
+              <a:t>Traffic mirroring sessions</a:t>
             </a:r>
-            <a:r>
-              <a:rPr lang="en-US" altLang="en-US" sz="1200" dirty="0" smtClean="0">
-                <a:latin typeface="Arial" panose="020B0604020202020204" pitchFamily="34" charset="0"/>
-                <a:ea typeface="Amazon Ember" panose="020B0603020204020204" pitchFamily="34" charset="0"/>
-                <a:cs typeface="Arial" panose="020B0604020202020204" pitchFamily="34" charset="0"/>
-              </a:rPr>
-              <a:t>mirroring sessions</a:t>
-            </a:r>
-            <a:endParaRPr lang="en-US" altLang="en-US" sz="1200" dirty="0">
-              <a:latin typeface="Arial" panose="020B0604020202020204" pitchFamily="34" charset="0"/>
-              <a:ea typeface="Amazon Ember" panose="020B0603020204020204" pitchFamily="34" charset="0"/>
-              <a:cs typeface="Arial" panose="020B0604020202020204" pitchFamily="34" charset="0"/>
-            </a:endParaRPr>
           </a:p>
         </p:txBody>
       </p:sp>
@@ -6613,14 +6546,14 @@
             </a:extLst>
           </p:cNvPr>
           <p:cNvCxnSpPr>
-            <a:endCxn id="37" idx="2"/>
+            <a:cxnSpLocks/>
           </p:cNvCxnSpPr>
           <p:nvPr/>
         </p:nvCxnSpPr>
         <p:spPr>
-          <a:xfrm flipH="1" flipV="1">
-            <a:off x="8840141" y="5436673"/>
-            <a:ext cx="2606" cy="675260"/>
+          <a:xfrm flipV="1">
+            <a:off x="7191013" y="5238378"/>
+            <a:ext cx="0" cy="840692"/>
           </a:xfrm>
           <a:prstGeom prst="straightConnector1">
             <a:avLst/>
@@ -6670,7 +6603,7 @@
         </p:blipFill>
         <p:spPr>
           <a:xfrm>
-            <a:off x="8785398" y="6111932"/>
+            <a:off x="6146483" y="6172419"/>
             <a:ext cx="1905000" cy="355600"/>
           </a:xfrm>
           <a:prstGeom prst="rect">
@@ -6686,7 +6619,7 @@
         </p:nvSpPr>
         <p:spPr>
           <a:xfrm>
-            <a:off x="8946071" y="6457527"/>
+            <a:off x="6307156" y="6518014"/>
             <a:ext cx="1583655" cy="276999"/>
           </a:xfrm>
           <a:prstGeom prst="rect">
@@ -6701,7 +6634,7 @@
           <a:p>
             <a:pPr algn="ctr"/>
             <a:r>
-              <a:rPr lang="en-US" sz="1200" b="0" i="0" dirty="0" smtClean="0">
+              <a:rPr lang="en-US" sz="1200" b="0" i="0" dirty="0">
                 <a:solidFill>
                   <a:srgbClr val="2D2E3B"/>
                 </a:solidFill>
@@ -7139,7 +7072,7 @@
           <a:p>
             <a:pPr algn="ctr" eaLnBrk="1" hangingPunct="1"/>
             <a:r>
-              <a:rPr lang="en-US" altLang="en-US" sz="1200" dirty="0" smtClean="0">
+              <a:rPr lang="en-US" altLang="en-US" sz="1200" dirty="0">
                 <a:latin typeface="Arial" panose="020B0604020202020204" pitchFamily="34" charset="0"/>
                 <a:ea typeface="Amazon Ember" panose="020B0603020204020204" pitchFamily="34" charset="0"/>
                 <a:cs typeface="Arial" panose="020B0604020202020204" pitchFamily="34" charset="0"/>
@@ -7147,7 +7080,7 @@
               <a:t>Darktrace </a:t>
             </a:r>
             <a:r>
-              <a:rPr lang="en-US" altLang="en-US" sz="1200" dirty="0" err="1" smtClean="0">
+              <a:rPr lang="en-US" altLang="en-US" sz="1200" dirty="0" err="1">
                 <a:latin typeface="Arial" panose="020B0604020202020204" pitchFamily="34" charset="0"/>
                 <a:ea typeface="Amazon Ember" panose="020B0603020204020204" pitchFamily="34" charset="0"/>
                 <a:cs typeface="Arial" panose="020B0604020202020204" pitchFamily="34" charset="0"/>
@@ -7699,7 +7632,7 @@
           <a:p>
             <a:pPr algn="ctr" eaLnBrk="1" hangingPunct="1"/>
             <a:r>
-              <a:rPr lang="en-US" altLang="en-US" sz="1200" dirty="0" smtClean="0">
+              <a:rPr lang="en-US" altLang="en-US" sz="1200" dirty="0">
                 <a:solidFill>
                   <a:srgbClr val="232F3E"/>
                 </a:solidFill>
@@ -7708,13 +7641,6 @@
               </a:rPr>
               <a:t>Darktrace vSensor</a:t>
             </a:r>
-            <a:endParaRPr lang="en-US" altLang="en-US" sz="1200" dirty="0">
-              <a:solidFill>
-                <a:srgbClr val="232F3E"/>
-              </a:solidFill>
-              <a:latin typeface="Arial" panose="020B0604020202020204" pitchFamily="34" charset="0"/>
-              <a:cs typeface="Arial" panose="020B0604020202020204" pitchFamily="34" charset="0"/>
-            </a:endParaRPr>
           </a:p>
         </p:txBody>
       </p:sp>
@@ -8121,7 +8047,7 @@
           <a:p>
             <a:pPr algn="ctr" eaLnBrk="1" hangingPunct="1"/>
             <a:r>
-              <a:rPr lang="en-US" altLang="en-US" sz="1200" dirty="0" smtClean="0">
+              <a:rPr lang="en-US" altLang="en-US" sz="1200" dirty="0">
                 <a:solidFill>
                   <a:srgbClr val="232F3E"/>
                 </a:solidFill>
@@ -8130,13 +8056,6 @@
               </a:rPr>
               <a:t>Linux bastion host</a:t>
             </a:r>
-            <a:endParaRPr lang="en-US" altLang="en-US" sz="1200" dirty="0">
-              <a:solidFill>
-                <a:srgbClr val="232F3E"/>
-              </a:solidFill>
-              <a:latin typeface="Arial" panose="020B0604020202020204" pitchFamily="34" charset="0"/>
-              <a:cs typeface="Arial" panose="020B0604020202020204" pitchFamily="34" charset="0"/>
-            </a:endParaRPr>
           </a:p>
         </p:txBody>
       </p:sp>
@@ -8834,7 +8753,7 @@
           <a:p>
             <a:pPr algn="ctr" eaLnBrk="1" hangingPunct="1"/>
             <a:r>
-              <a:rPr lang="en-US" altLang="en-US" sz="1200" dirty="0" smtClean="0">
+              <a:rPr lang="en-US" altLang="en-US" sz="1200" dirty="0">
                 <a:solidFill>
                   <a:srgbClr val="232F3E"/>
                 </a:solidFill>
@@ -8843,13 +8762,6 @@
               </a:rPr>
               <a:t>Darktrace vSensor</a:t>
             </a:r>
-            <a:endParaRPr lang="en-US" altLang="en-US" sz="1200" dirty="0">
-              <a:solidFill>
-                <a:srgbClr val="232F3E"/>
-              </a:solidFill>
-              <a:latin typeface="Arial" panose="020B0604020202020204" pitchFamily="34" charset="0"/>
-              <a:cs typeface="Arial" panose="020B0604020202020204" pitchFamily="34" charset="0"/>
-            </a:endParaRPr>
           </a:p>
         </p:txBody>
       </p:sp>
@@ -9256,7 +9168,7 @@
           <a:p>
             <a:pPr algn="ctr" eaLnBrk="1" hangingPunct="1"/>
             <a:r>
-              <a:rPr lang="en-US" altLang="en-US" sz="1200" dirty="0" smtClean="0">
+              <a:rPr lang="en-US" altLang="en-US" sz="1200" dirty="0">
                 <a:solidFill>
                   <a:srgbClr val="232F3E"/>
                 </a:solidFill>
@@ -9265,13 +9177,6 @@
               </a:rPr>
               <a:t>Linux bastion host</a:t>
             </a:r>
-            <a:endParaRPr lang="en-US" altLang="en-US" sz="1200" dirty="0">
-              <a:solidFill>
-                <a:srgbClr val="232F3E"/>
-              </a:solidFill>
-              <a:latin typeface="Arial" panose="020B0604020202020204" pitchFamily="34" charset="0"/>
-              <a:cs typeface="Arial" panose="020B0604020202020204" pitchFamily="34" charset="0"/>
-            </a:endParaRPr>
           </a:p>
         </p:txBody>
       </p:sp>
@@ -10135,7 +10040,7 @@
           <a:p>
             <a:pPr algn="ctr"/>
             <a:r>
-              <a:rPr lang="en-US" sz="1200" b="0" i="0" dirty="0" smtClean="0">
+              <a:rPr lang="en-US" sz="1200" b="0" i="0" dirty="0">
                 <a:solidFill>
                   <a:srgbClr val="2D2E3B"/>
                 </a:solidFill>
@@ -10544,21 +10449,8 @@
                 <a:ea typeface="Amazon Ember" panose="020B0603020204020204" pitchFamily="34" charset="0"/>
                 <a:cs typeface="Arial" panose="020B0604020202020204" pitchFamily="34" charset="0"/>
               </a:rPr>
-              <a:t>Traffic </a:t>
+              <a:t>Traffic mirroring sessions</a:t>
             </a:r>
-            <a:r>
-              <a:rPr lang="en-US" altLang="en-US" sz="1200" dirty="0" smtClean="0">
-                <a:latin typeface="Arial" panose="020B0604020202020204" pitchFamily="34" charset="0"/>
-                <a:ea typeface="Amazon Ember" panose="020B0603020204020204" pitchFamily="34" charset="0"/>
-                <a:cs typeface="Arial" panose="020B0604020202020204" pitchFamily="34" charset="0"/>
-              </a:rPr>
-              <a:t>mirroring sessions</a:t>
-            </a:r>
-            <a:endParaRPr lang="en-US" altLang="en-US" sz="1200" dirty="0">
-              <a:latin typeface="Arial" panose="020B0604020202020204" pitchFamily="34" charset="0"/>
-              <a:ea typeface="Amazon Ember" panose="020B0603020204020204" pitchFamily="34" charset="0"/>
-              <a:cs typeface="Arial" panose="020B0604020202020204" pitchFamily="34" charset="0"/>
-            </a:endParaRPr>
           </a:p>
         </p:txBody>
       </p:sp>
@@ -10833,18 +10725,13 @@
           <a:p>
             <a:pPr algn="ctr" eaLnBrk="1" hangingPunct="1"/>
             <a:r>
-              <a:rPr lang="en-US" altLang="en-US" sz="1200" dirty="0" smtClean="0">
+              <a:rPr lang="en-US" altLang="en-US" sz="1200" dirty="0">
                 <a:latin typeface="Arial" panose="020B0604020202020204" pitchFamily="34" charset="0"/>
                 <a:ea typeface="Amazon Ember" panose="020B0603020204020204" pitchFamily="34" charset="0"/>
                 <a:cs typeface="Arial" panose="020B0604020202020204" pitchFamily="34" charset="0"/>
               </a:rPr>
               <a:t>Instances</a:t>
             </a:r>
-            <a:endParaRPr lang="en-US" altLang="en-US" sz="1200" dirty="0">
-              <a:latin typeface="Arial" panose="020B0604020202020204" pitchFamily="34" charset="0"/>
-              <a:ea typeface="Amazon Ember" panose="020B0603020204020204" pitchFamily="34" charset="0"/>
-              <a:cs typeface="Arial" panose="020B0604020202020204" pitchFamily="34" charset="0"/>
-            </a:endParaRPr>
           </a:p>
         </p:txBody>
       </p:sp>
@@ -10999,7 +10886,7 @@
           <a:p>
             <a:pPr algn="ctr" eaLnBrk="1" hangingPunct="1"/>
             <a:r>
-              <a:rPr lang="en-US" altLang="en-US" sz="1200" dirty="0" smtClean="0">
+              <a:rPr lang="en-US" altLang="en-US" sz="1200" dirty="0">
                 <a:latin typeface="Arial" panose="020B0604020202020204" pitchFamily="34" charset="0"/>
                 <a:ea typeface="Amazon Ember" panose="020B0603020204020204" pitchFamily="34" charset="0"/>
                 <a:cs typeface="Arial" panose="020B0604020202020204" pitchFamily="34" charset="0"/>
@@ -11007,7 +10894,7 @@
               <a:t>Darktrace </a:t>
             </a:r>
             <a:r>
-              <a:rPr lang="en-US" altLang="en-US" sz="1200" dirty="0" err="1" smtClean="0">
+              <a:rPr lang="en-US" altLang="en-US" sz="1200" dirty="0" err="1">
                 <a:latin typeface="Arial" panose="020B0604020202020204" pitchFamily="34" charset="0"/>
                 <a:ea typeface="Amazon Ember" panose="020B0603020204020204" pitchFamily="34" charset="0"/>
                 <a:cs typeface="Arial" panose="020B0604020202020204" pitchFamily="34" charset="0"/>
@@ -11435,7 +11322,7 @@
           <a:p>
             <a:pPr algn="ctr" eaLnBrk="1" hangingPunct="1"/>
             <a:r>
-              <a:rPr lang="en-US" altLang="en-US" sz="1200" dirty="0" smtClean="0">
+              <a:rPr lang="en-US" altLang="en-US" sz="1200" dirty="0">
                 <a:latin typeface="Arial" panose="020B0604020202020204" pitchFamily="34" charset="0"/>
                 <a:ea typeface="Amazon Ember" panose="020B0603020204020204" pitchFamily="34" charset="0"/>
                 <a:cs typeface="Arial" panose="020B0604020202020204" pitchFamily="34" charset="0"/>
@@ -11443,7 +11330,7 @@
               <a:t>Darktrace </a:t>
             </a:r>
             <a:r>
-              <a:rPr lang="en-US" altLang="en-US" sz="1200" dirty="0" err="1" smtClean="0">
+              <a:rPr lang="en-US" altLang="en-US" sz="1200" dirty="0" err="1">
                 <a:latin typeface="Arial" panose="020B0604020202020204" pitchFamily="34" charset="0"/>
                 <a:ea typeface="Amazon Ember" panose="020B0603020204020204" pitchFamily="34" charset="0"/>
                 <a:cs typeface="Arial" panose="020B0604020202020204" pitchFamily="34" charset="0"/>
@@ -11765,7 +11652,7 @@
           <a:p>
             <a:pPr algn="ctr" eaLnBrk="1" hangingPunct="1"/>
             <a:r>
-              <a:rPr lang="en-US" altLang="en-US" sz="1200" dirty="0" smtClean="0">
+              <a:rPr lang="en-US" altLang="en-US" sz="1200" dirty="0">
                 <a:latin typeface="Arial" panose="020B0604020202020204" pitchFamily="34" charset="0"/>
                 <a:ea typeface="Amazon Ember" panose="020B0603020204020204" pitchFamily="34" charset="0"/>
                 <a:cs typeface="Arial" panose="020B0604020202020204" pitchFamily="34" charset="0"/>
@@ -11773,7 +11660,7 @@
               <a:t>Darktrace </a:t>
             </a:r>
             <a:r>
-              <a:rPr lang="en-US" altLang="en-US" sz="1200" dirty="0" err="1" smtClean="0">
+              <a:rPr lang="en-US" altLang="en-US" sz="1200" dirty="0" err="1">
                 <a:latin typeface="Arial" panose="020B0604020202020204" pitchFamily="34" charset="0"/>
                 <a:ea typeface="Amazon Ember" panose="020B0603020204020204" pitchFamily="34" charset="0"/>
                 <a:cs typeface="Arial" panose="020B0604020202020204" pitchFamily="34" charset="0"/>
@@ -12045,18 +11932,13 @@
           <a:p>
             <a:pPr algn="ctr" eaLnBrk="1" hangingPunct="1"/>
             <a:r>
-              <a:rPr lang="en-US" altLang="en-US" sz="1200" dirty="0" smtClean="0">
+              <a:rPr lang="en-US" altLang="en-US" sz="1200" dirty="0">
                 <a:latin typeface="Arial" panose="020B0604020202020204" pitchFamily="34" charset="0"/>
                 <a:ea typeface="Amazon Ember" panose="020B0603020204020204" pitchFamily="34" charset="0"/>
                 <a:cs typeface="Arial" panose="020B0604020202020204" pitchFamily="34" charset="0"/>
               </a:rPr>
               <a:t>Captured packets</a:t>
             </a:r>
-            <a:endParaRPr lang="en-US" altLang="en-US" sz="1200" dirty="0">
-              <a:latin typeface="Arial" panose="020B0604020202020204" pitchFamily="34" charset="0"/>
-              <a:ea typeface="Amazon Ember" panose="020B0603020204020204" pitchFamily="34" charset="0"/>
-              <a:cs typeface="Arial" panose="020B0604020202020204" pitchFamily="34" charset="0"/>
-            </a:endParaRPr>
           </a:p>
         </p:txBody>
       </p:sp>
@@ -12549,16 +12431,12 @@
           <a:p>
             <a:pPr algn="ctr" eaLnBrk="1" hangingPunct="1"/>
             <a:r>
-              <a:rPr lang="en-US" altLang="en-US" sz="1200" dirty="0" smtClean="0">
+              <a:rPr lang="en-US" altLang="en-US" sz="1200" dirty="0">
                 <a:latin typeface="Arial" panose="020B0604020202020204" pitchFamily="34" charset="0"/>
                 <a:cs typeface="Arial" panose="020B0604020202020204" pitchFamily="34" charset="0"/>
               </a:rPr>
               <a:t>Darktrace vSensor</a:t>
             </a:r>
-            <a:endParaRPr lang="en-US" altLang="en-US" sz="1200" dirty="0">
-              <a:latin typeface="Arial" panose="020B0604020202020204" pitchFamily="34" charset="0"/>
-              <a:cs typeface="Arial" panose="020B0604020202020204" pitchFamily="34" charset="0"/>
-            </a:endParaRPr>
           </a:p>
         </p:txBody>
       </p:sp>
@@ -12965,16 +12843,12 @@
           <a:p>
             <a:pPr algn="ctr" eaLnBrk="1" hangingPunct="1"/>
             <a:r>
-              <a:rPr lang="en-US" altLang="en-US" sz="1200" dirty="0" smtClean="0">
+              <a:rPr lang="en-US" altLang="en-US" sz="1200" dirty="0">
                 <a:latin typeface="Arial" panose="020B0604020202020204" pitchFamily="34" charset="0"/>
                 <a:cs typeface="Arial" panose="020B0604020202020204" pitchFamily="34" charset="0"/>
               </a:rPr>
               <a:t>Linux bastion host</a:t>
             </a:r>
-            <a:endParaRPr lang="en-US" altLang="en-US" sz="1200" dirty="0">
-              <a:latin typeface="Arial" panose="020B0604020202020204" pitchFamily="34" charset="0"/>
-              <a:cs typeface="Arial" panose="020B0604020202020204" pitchFamily="34" charset="0"/>
-            </a:endParaRPr>
           </a:p>
         </p:txBody>
       </p:sp>
@@ -13672,16 +13546,12 @@
           <a:p>
             <a:pPr algn="ctr" eaLnBrk="1" hangingPunct="1"/>
             <a:r>
-              <a:rPr lang="en-US" altLang="en-US" sz="1200" dirty="0" smtClean="0">
+              <a:rPr lang="en-US" altLang="en-US" sz="1200" dirty="0">
                 <a:latin typeface="Arial" panose="020B0604020202020204" pitchFamily="34" charset="0"/>
                 <a:cs typeface="Arial" panose="020B0604020202020204" pitchFamily="34" charset="0"/>
               </a:rPr>
               <a:t>Darktrace vSensor</a:t>
             </a:r>
-            <a:endParaRPr lang="en-US" altLang="en-US" sz="1200" dirty="0">
-              <a:latin typeface="Arial" panose="020B0604020202020204" pitchFamily="34" charset="0"/>
-              <a:cs typeface="Arial" panose="020B0604020202020204" pitchFamily="34" charset="0"/>
-            </a:endParaRPr>
           </a:p>
         </p:txBody>
       </p:sp>
@@ -14088,16 +13958,12 @@
           <a:p>
             <a:pPr algn="ctr" eaLnBrk="1" hangingPunct="1"/>
             <a:r>
-              <a:rPr lang="en-US" altLang="en-US" sz="1200" dirty="0" smtClean="0">
+              <a:rPr lang="en-US" altLang="en-US" sz="1200" dirty="0">
                 <a:latin typeface="Arial" panose="020B0604020202020204" pitchFamily="34" charset="0"/>
                 <a:cs typeface="Arial" panose="020B0604020202020204" pitchFamily="34" charset="0"/>
               </a:rPr>
               <a:t>Linux bastion host</a:t>
             </a:r>
-            <a:endParaRPr lang="en-US" altLang="en-US" sz="1200" dirty="0">
-              <a:latin typeface="Arial" panose="020B0604020202020204" pitchFamily="34" charset="0"/>
-              <a:cs typeface="Arial" panose="020B0604020202020204" pitchFamily="34" charset="0"/>
-            </a:endParaRPr>
           </a:p>
         </p:txBody>
       </p:sp>
@@ -14166,25 +14032,8 @@
                 <a:latin typeface="Arial" panose="020B0604020202020204" pitchFamily="34" charset="0"/>
                 <a:cs typeface="Arial" panose="020B0604020202020204" pitchFamily="34" charset="0"/>
               </a:rPr>
-              <a:t>Availability </a:t>
+              <a:t>Availability Zone 1</a:t>
             </a:r>
-            <a:r>
-              <a:rPr lang="en-US" sz="1200" dirty="0" smtClean="0">
-                <a:solidFill>
-                  <a:srgbClr val="5B9CD5"/>
-                </a:solidFill>
-                <a:latin typeface="Arial" panose="020B0604020202020204" pitchFamily="34" charset="0"/>
-                <a:cs typeface="Arial" panose="020B0604020202020204" pitchFamily="34" charset="0"/>
-              </a:rPr>
-              <a:t>Zone 1</a:t>
-            </a:r>
-            <a:endParaRPr lang="en-US" sz="1200" dirty="0">
-              <a:solidFill>
-                <a:srgbClr val="5B9CD5"/>
-              </a:solidFill>
-              <a:latin typeface="Arial" panose="020B0604020202020204" pitchFamily="34" charset="0"/>
-              <a:cs typeface="Arial" panose="020B0604020202020204" pitchFamily="34" charset="0"/>
-            </a:endParaRPr>
           </a:p>
         </p:txBody>
       </p:sp>
@@ -14947,7 +14796,7 @@
         </p:blipFill>
         <p:spPr>
           <a:xfrm>
-            <a:off x="8593626" y="5676244"/>
+            <a:off x="6819170" y="5745683"/>
             <a:ext cx="1905000" cy="355600"/>
           </a:xfrm>
           <a:prstGeom prst="rect">
@@ -14963,7 +14812,7 @@
         </p:nvSpPr>
         <p:spPr>
           <a:xfrm>
-            <a:off x="8673963" y="6021839"/>
+            <a:off x="6899507" y="6091278"/>
             <a:ext cx="1744327" cy="461665"/>
           </a:xfrm>
           <a:prstGeom prst="rect">
@@ -14978,7 +14827,7 @@
           <a:p>
             <a:pPr algn="ctr"/>
             <a:r>
-              <a:rPr lang="en-US" sz="1200" b="0" i="0" dirty="0" smtClean="0">
+              <a:rPr lang="en-US" sz="1200" b="0" i="0" dirty="0">
                 <a:effectLst/>
                 <a:latin typeface="Arial" panose="020B0604020202020204" pitchFamily="34" charset="0"/>
                 <a:cs typeface="Arial" panose="020B0604020202020204" pitchFamily="34" charset="0"/>
@@ -15148,21 +14997,8 @@
                 <a:ea typeface="Amazon Ember" panose="020B0603020204020204" pitchFamily="34" charset="0"/>
                 <a:cs typeface="Arial" panose="020B0604020202020204" pitchFamily="34" charset="0"/>
               </a:rPr>
-              <a:t>Traffic </a:t>
+              <a:t>Traffic mirror session</a:t>
             </a:r>
-            <a:r>
-              <a:rPr lang="en-US" altLang="en-US" sz="1200" dirty="0" smtClean="0">
-                <a:latin typeface="Arial" panose="020B0604020202020204" pitchFamily="34" charset="0"/>
-                <a:ea typeface="Amazon Ember" panose="020B0603020204020204" pitchFamily="34" charset="0"/>
-                <a:cs typeface="Arial" panose="020B0604020202020204" pitchFamily="34" charset="0"/>
-              </a:rPr>
-              <a:t>mirror session</a:t>
-            </a:r>
-            <a:endParaRPr lang="en-US" altLang="en-US" sz="1200" dirty="0">
-              <a:latin typeface="Arial" panose="020B0604020202020204" pitchFamily="34" charset="0"/>
-              <a:ea typeface="Amazon Ember" panose="020B0603020204020204" pitchFamily="34" charset="0"/>
-              <a:cs typeface="Arial" panose="020B0604020202020204" pitchFamily="34" charset="0"/>
-            </a:endParaRPr>
           </a:p>
         </p:txBody>
       </p:sp>
@@ -15765,18 +15601,13 @@
           <a:p>
             <a:pPr algn="ctr" eaLnBrk="1" hangingPunct="1"/>
             <a:r>
-              <a:rPr lang="en-US" altLang="en-US" sz="1200" dirty="0" smtClean="0">
+              <a:rPr lang="en-US" altLang="en-US" sz="1200" dirty="0">
                 <a:latin typeface="Arial" panose="020B0604020202020204" pitchFamily="34" charset="0"/>
                 <a:ea typeface="Amazon Ember" panose="020B0603020204020204" pitchFamily="34" charset="0"/>
                 <a:cs typeface="Arial" panose="020B0604020202020204" pitchFamily="34" charset="0"/>
               </a:rPr>
               <a:t>Captured packets</a:t>
             </a:r>
-            <a:endParaRPr lang="en-US" altLang="en-US" sz="1200" dirty="0">
-              <a:latin typeface="Arial" panose="020B0604020202020204" pitchFamily="34" charset="0"/>
-              <a:ea typeface="Amazon Ember" panose="020B0603020204020204" pitchFamily="34" charset="0"/>
-              <a:cs typeface="Arial" panose="020B0604020202020204" pitchFamily="34" charset="0"/>
-            </a:endParaRPr>
           </a:p>
         </p:txBody>
       </p:sp>
@@ -15993,15 +15824,15 @@
             </a:extLst>
           </p:cNvPr>
           <p:cNvCxnSpPr>
+            <a:cxnSpLocks/>
             <a:stCxn id="13" idx="0"/>
-            <a:endCxn id="64" idx="2"/>
           </p:cNvCxnSpPr>
           <p:nvPr/>
         </p:nvCxnSpPr>
         <p:spPr>
           <a:xfrm flipV="1">
-            <a:off x="9546126" y="5025227"/>
-            <a:ext cx="0" cy="651017"/>
+            <a:off x="7771670" y="4824571"/>
+            <a:ext cx="0" cy="921112"/>
           </a:xfrm>
           <a:prstGeom prst="straightConnector1">
             <a:avLst/>
@@ -16412,16 +16243,12 @@
           <a:p>
             <a:pPr algn="ctr" eaLnBrk="1" hangingPunct="1"/>
             <a:r>
-              <a:rPr lang="en-US" altLang="en-US" sz="1200" dirty="0" smtClean="0">
+              <a:rPr lang="en-US" altLang="en-US" sz="1200" dirty="0">
                 <a:latin typeface="Arial" panose="020B0604020202020204" pitchFamily="34" charset="0"/>
                 <a:cs typeface="Arial" panose="020B0604020202020204" pitchFamily="34" charset="0"/>
               </a:rPr>
               <a:t>Darktrace vSensor</a:t>
             </a:r>
-            <a:endParaRPr lang="en-US" altLang="en-US" sz="1200" dirty="0">
-              <a:latin typeface="Arial" panose="020B0604020202020204" pitchFamily="34" charset="0"/>
-              <a:cs typeface="Arial" panose="020B0604020202020204" pitchFamily="34" charset="0"/>
-            </a:endParaRPr>
           </a:p>
         </p:txBody>
       </p:sp>
@@ -16828,16 +16655,12 @@
           <a:p>
             <a:pPr algn="ctr" eaLnBrk="1" hangingPunct="1"/>
             <a:r>
-              <a:rPr lang="en-US" altLang="en-US" sz="1200" dirty="0" smtClean="0">
+              <a:rPr lang="en-US" altLang="en-US" sz="1200" dirty="0">
                 <a:latin typeface="Arial" panose="020B0604020202020204" pitchFamily="34" charset="0"/>
                 <a:cs typeface="Arial" panose="020B0604020202020204" pitchFamily="34" charset="0"/>
               </a:rPr>
               <a:t>Linux bastion host</a:t>
             </a:r>
-            <a:endParaRPr lang="en-US" altLang="en-US" sz="1200" dirty="0">
-              <a:latin typeface="Arial" panose="020B0604020202020204" pitchFamily="34" charset="0"/>
-              <a:cs typeface="Arial" panose="020B0604020202020204" pitchFamily="34" charset="0"/>
-            </a:endParaRPr>
           </a:p>
         </p:txBody>
       </p:sp>
@@ -17535,16 +17358,12 @@
           <a:p>
             <a:pPr algn="ctr" eaLnBrk="1" hangingPunct="1"/>
             <a:r>
-              <a:rPr lang="en-US" altLang="en-US" sz="1200" dirty="0" smtClean="0">
+              <a:rPr lang="en-US" altLang="en-US" sz="1200" dirty="0">
                 <a:latin typeface="Arial" panose="020B0604020202020204" pitchFamily="34" charset="0"/>
                 <a:cs typeface="Arial" panose="020B0604020202020204" pitchFamily="34" charset="0"/>
               </a:rPr>
               <a:t>Darktrace vSensor</a:t>
             </a:r>
-            <a:endParaRPr lang="en-US" altLang="en-US" sz="1200" dirty="0">
-              <a:latin typeface="Arial" panose="020B0604020202020204" pitchFamily="34" charset="0"/>
-              <a:cs typeface="Arial" panose="020B0604020202020204" pitchFamily="34" charset="0"/>
-            </a:endParaRPr>
           </a:p>
         </p:txBody>
       </p:sp>
@@ -17951,16 +17770,12 @@
           <a:p>
             <a:pPr algn="ctr" eaLnBrk="1" hangingPunct="1"/>
             <a:r>
-              <a:rPr lang="en-US" altLang="en-US" sz="1200" dirty="0" smtClean="0">
+              <a:rPr lang="en-US" altLang="en-US" sz="1200" dirty="0">
                 <a:latin typeface="Arial" panose="020B0604020202020204" pitchFamily="34" charset="0"/>
                 <a:cs typeface="Arial" panose="020B0604020202020204" pitchFamily="34" charset="0"/>
               </a:rPr>
               <a:t>Linux bastion host</a:t>
             </a:r>
-            <a:endParaRPr lang="en-US" altLang="en-US" sz="1200" dirty="0">
-              <a:latin typeface="Arial" panose="020B0604020202020204" pitchFamily="34" charset="0"/>
-              <a:cs typeface="Arial" panose="020B0604020202020204" pitchFamily="34" charset="0"/>
-            </a:endParaRPr>
           </a:p>
         </p:txBody>
       </p:sp>
@@ -18029,25 +17844,8 @@
                 <a:latin typeface="Arial" panose="020B0604020202020204" pitchFamily="34" charset="0"/>
                 <a:cs typeface="Arial" panose="020B0604020202020204" pitchFamily="34" charset="0"/>
               </a:rPr>
-              <a:t>Availability </a:t>
+              <a:t>Availability Zone 1</a:t>
             </a:r>
-            <a:r>
-              <a:rPr lang="en-US" sz="1200" dirty="0" smtClean="0">
-                <a:solidFill>
-                  <a:srgbClr val="5B9CD5"/>
-                </a:solidFill>
-                <a:latin typeface="Arial" panose="020B0604020202020204" pitchFamily="34" charset="0"/>
-                <a:cs typeface="Arial" panose="020B0604020202020204" pitchFamily="34" charset="0"/>
-              </a:rPr>
-              <a:t>Zone 1</a:t>
-            </a:r>
-            <a:endParaRPr lang="en-US" sz="1200" dirty="0">
-              <a:solidFill>
-                <a:srgbClr val="5B9CD5"/>
-              </a:solidFill>
-              <a:latin typeface="Arial" panose="020B0604020202020204" pitchFamily="34" charset="0"/>
-              <a:cs typeface="Arial" panose="020B0604020202020204" pitchFamily="34" charset="0"/>
-            </a:endParaRPr>
           </a:p>
         </p:txBody>
       </p:sp>
@@ -18810,7 +18608,7 @@
         </p:blipFill>
         <p:spPr>
           <a:xfrm>
-            <a:off x="9632259" y="2362252"/>
+            <a:off x="5965805" y="5962767"/>
             <a:ext cx="1905000" cy="355600"/>
           </a:xfrm>
           <a:prstGeom prst="rect">
@@ -18826,7 +18624,7 @@
         </p:nvSpPr>
         <p:spPr>
           <a:xfrm>
-            <a:off x="9712595" y="2674299"/>
+            <a:off x="6046141" y="6274814"/>
             <a:ext cx="1744327" cy="276999"/>
           </a:xfrm>
           <a:prstGeom prst="rect">
@@ -18841,20 +18639,12 @@
           <a:p>
             <a:pPr algn="ctr"/>
             <a:r>
-              <a:rPr lang="en-US" sz="1200" b="0" i="0" dirty="0" smtClean="0">
+              <a:rPr lang="en-US" sz="1200" b="0" i="0" dirty="0">
                 <a:effectLst/>
                 <a:latin typeface="Arial" panose="020B0604020202020204" pitchFamily="34" charset="0"/>
                 <a:cs typeface="Arial" panose="020B0604020202020204" pitchFamily="34" charset="0"/>
               </a:rPr>
-              <a:t>Darktrace </a:t>
-            </a:r>
-            <a:r>
-              <a:rPr lang="en-US" sz="1200" b="0" i="0" dirty="0" smtClean="0">
-                <a:effectLst/>
-                <a:latin typeface="Arial" panose="020B0604020202020204" pitchFamily="34" charset="0"/>
-                <a:cs typeface="Arial" panose="020B0604020202020204" pitchFamily="34" charset="0"/>
-              </a:rPr>
-              <a:t>appliance</a:t>
+              <a:t>Darktrace appliance</a:t>
             </a:r>
             <a:endParaRPr lang="en-US" sz="1200" dirty="0">
               <a:latin typeface="Arial" panose="020B0604020202020204" pitchFamily="34" charset="0"/>
@@ -19014,18 +18804,13 @@
           <a:p>
             <a:pPr algn="ctr" eaLnBrk="1" hangingPunct="1"/>
             <a:r>
-              <a:rPr lang="en-US" altLang="en-US" sz="1200" dirty="0" smtClean="0">
+              <a:rPr lang="en-US" altLang="en-US" sz="1200" dirty="0">
                 <a:latin typeface="Arial" panose="020B0604020202020204" pitchFamily="34" charset="0"/>
                 <a:ea typeface="Amazon Ember" panose="020B0603020204020204" pitchFamily="34" charset="0"/>
                 <a:cs typeface="Arial" panose="020B0604020202020204" pitchFamily="34" charset="0"/>
               </a:rPr>
               <a:t>Captured packets</a:t>
             </a:r>
-            <a:endParaRPr lang="en-US" altLang="en-US" sz="1200" dirty="0">
-              <a:latin typeface="Arial" panose="020B0604020202020204" pitchFamily="34" charset="0"/>
-              <a:ea typeface="Amazon Ember" panose="020B0603020204020204" pitchFamily="34" charset="0"/>
-              <a:cs typeface="Arial" panose="020B0604020202020204" pitchFamily="34" charset="0"/>
-            </a:endParaRPr>
           </a:p>
         </p:txBody>
       </p:sp>
@@ -19287,18 +19072,13 @@
           <a:p>
             <a:pPr algn="ctr" eaLnBrk="1" hangingPunct="1"/>
             <a:r>
-              <a:rPr lang="en-US" altLang="en-US" sz="1200" dirty="0" smtClean="0">
+              <a:rPr lang="en-US" altLang="en-US" sz="1200" dirty="0">
                 <a:latin typeface="Arial" panose="020B0604020202020204" pitchFamily="34" charset="0"/>
                 <a:ea typeface="Amazon Ember" panose="020B0603020204020204" pitchFamily="34" charset="0"/>
                 <a:cs typeface="Arial" panose="020B0604020202020204" pitchFamily="34" charset="0"/>
               </a:rPr>
               <a:t>Traffic mirroring</a:t>
             </a:r>
-            <a:endParaRPr lang="en-US" altLang="en-US" sz="1200" dirty="0">
-              <a:latin typeface="Arial" panose="020B0604020202020204" pitchFamily="34" charset="0"/>
-              <a:ea typeface="Amazon Ember" panose="020B0603020204020204" pitchFamily="34" charset="0"/>
-              <a:cs typeface="Arial" panose="020B0604020202020204" pitchFamily="34" charset="0"/>
-            </a:endParaRPr>
           </a:p>
         </p:txBody>
       </p:sp>
@@ -19700,15 +19480,15 @@
             </a:extLst>
           </p:cNvPr>
           <p:cNvCxnSpPr>
-            <a:stCxn id="13" idx="1"/>
-            <a:endCxn id="102" idx="3"/>
+            <a:cxnSpLocks/>
+            <a:stCxn id="13" idx="0"/>
           </p:cNvCxnSpPr>
           <p:nvPr/>
         </p:nvCxnSpPr>
         <p:spPr>
-          <a:xfrm flipH="1">
-            <a:off x="7693435" y="2540052"/>
-            <a:ext cx="1938824" cy="0"/>
+          <a:xfrm flipV="1">
+            <a:off x="6918305" y="5230417"/>
+            <a:ext cx="0" cy="732350"/>
           </a:xfrm>
           <a:prstGeom prst="straightConnector1">
             <a:avLst/>

</xml_diff>

<commit_message>
edits part 1 081821
</commit_message>
<xml_diff>
--- a/docs/images/darktrace-vsensor-architecture-diagram.pptx
+++ b/docs/images/darktrace-vsensor-architecture-diagram.pptx
@@ -9,6 +9,7 @@
     <p:sldId id="260" r:id="rId3"/>
     <p:sldId id="262" r:id="rId4"/>
     <p:sldId id="264" r:id="rId5"/>
+    <p:sldId id="265" r:id="rId6"/>
   </p:sldIdLst>
   <p:sldSz cx="12192000" cy="6858000"/>
   <p:notesSz cx="6858000" cy="9144000"/>
@@ -246,7 +247,7 @@
           <a:p>
             <a:fld id="{091DC170-1660-4809-9A15-62445EB0C7B1}" type="datetimeFigureOut">
               <a:rPr lang="en-US" smtClean="0"/>
-              <a:t>7/26/2021</a:t>
+              <a:t>7/28/2021</a:t>
             </a:fld>
             <a:endParaRPr lang="en-US"/>
           </a:p>
@@ -416,7 +417,7 @@
           <a:p>
             <a:fld id="{091DC170-1660-4809-9A15-62445EB0C7B1}" type="datetimeFigureOut">
               <a:rPr lang="en-US" smtClean="0"/>
-              <a:t>7/26/2021</a:t>
+              <a:t>7/28/2021</a:t>
             </a:fld>
             <a:endParaRPr lang="en-US"/>
           </a:p>
@@ -596,7 +597,7 @@
           <a:p>
             <a:fld id="{091DC170-1660-4809-9A15-62445EB0C7B1}" type="datetimeFigureOut">
               <a:rPr lang="en-US" smtClean="0"/>
-              <a:t>7/26/2021</a:t>
+              <a:t>7/28/2021</a:t>
             </a:fld>
             <a:endParaRPr lang="en-US"/>
           </a:p>
@@ -766,7 +767,7 @@
           <a:p>
             <a:fld id="{091DC170-1660-4809-9A15-62445EB0C7B1}" type="datetimeFigureOut">
               <a:rPr lang="en-US" smtClean="0"/>
-              <a:t>7/26/2021</a:t>
+              <a:t>7/28/2021</a:t>
             </a:fld>
             <a:endParaRPr lang="en-US"/>
           </a:p>
@@ -1012,7 +1013,7 @@
           <a:p>
             <a:fld id="{091DC170-1660-4809-9A15-62445EB0C7B1}" type="datetimeFigureOut">
               <a:rPr lang="en-US" smtClean="0"/>
-              <a:t>7/26/2021</a:t>
+              <a:t>7/28/2021</a:t>
             </a:fld>
             <a:endParaRPr lang="en-US"/>
           </a:p>
@@ -1244,7 +1245,7 @@
           <a:p>
             <a:fld id="{091DC170-1660-4809-9A15-62445EB0C7B1}" type="datetimeFigureOut">
               <a:rPr lang="en-US" smtClean="0"/>
-              <a:t>7/26/2021</a:t>
+              <a:t>7/28/2021</a:t>
             </a:fld>
             <a:endParaRPr lang="en-US"/>
           </a:p>
@@ -1611,7 +1612,7 @@
           <a:p>
             <a:fld id="{091DC170-1660-4809-9A15-62445EB0C7B1}" type="datetimeFigureOut">
               <a:rPr lang="en-US" smtClean="0"/>
-              <a:t>7/26/2021</a:t>
+              <a:t>7/28/2021</a:t>
             </a:fld>
             <a:endParaRPr lang="en-US"/>
           </a:p>
@@ -1729,7 +1730,7 @@
           <a:p>
             <a:fld id="{091DC170-1660-4809-9A15-62445EB0C7B1}" type="datetimeFigureOut">
               <a:rPr lang="en-US" smtClean="0"/>
-              <a:t>7/26/2021</a:t>
+              <a:t>7/28/2021</a:t>
             </a:fld>
             <a:endParaRPr lang="en-US"/>
           </a:p>
@@ -1824,7 +1825,7 @@
           <a:p>
             <a:fld id="{091DC170-1660-4809-9A15-62445EB0C7B1}" type="datetimeFigureOut">
               <a:rPr lang="en-US" smtClean="0"/>
-              <a:t>7/26/2021</a:t>
+              <a:t>7/28/2021</a:t>
             </a:fld>
             <a:endParaRPr lang="en-US"/>
           </a:p>
@@ -2101,7 +2102,7 @@
           <a:p>
             <a:fld id="{091DC170-1660-4809-9A15-62445EB0C7B1}" type="datetimeFigureOut">
               <a:rPr lang="en-US" smtClean="0"/>
-              <a:t>7/26/2021</a:t>
+              <a:t>7/28/2021</a:t>
             </a:fld>
             <a:endParaRPr lang="en-US"/>
           </a:p>
@@ -2354,7 +2355,7 @@
           <a:p>
             <a:fld id="{091DC170-1660-4809-9A15-62445EB0C7B1}" type="datetimeFigureOut">
               <a:rPr lang="en-US" smtClean="0"/>
-              <a:t>7/26/2021</a:t>
+              <a:t>7/28/2021</a:t>
             </a:fld>
             <a:endParaRPr lang="en-US"/>
           </a:p>
@@ -2567,7 +2568,7 @@
           <a:p>
             <a:fld id="{091DC170-1660-4809-9A15-62445EB0C7B1}" type="datetimeFigureOut">
               <a:rPr lang="en-US" smtClean="0"/>
-              <a:t>7/26/2021</a:t>
+              <a:t>7/28/2021</a:t>
             </a:fld>
             <a:endParaRPr lang="en-US"/>
           </a:p>
@@ -18846,15 +18847,7 @@
                 <a:latin typeface="Arial" panose="020B0604020202020204" pitchFamily="34" charset="0"/>
                 <a:cs typeface="Arial" panose="020B0604020202020204" pitchFamily="34" charset="0"/>
               </a:rPr>
-              <a:t>Darktrace </a:t>
-            </a:r>
-            <a:r>
-              <a:rPr lang="en-US" sz="1200" b="0" i="0" dirty="0" smtClean="0">
-                <a:effectLst/>
-                <a:latin typeface="Arial" panose="020B0604020202020204" pitchFamily="34" charset="0"/>
-                <a:cs typeface="Arial" panose="020B0604020202020204" pitchFamily="34" charset="0"/>
-              </a:rPr>
-              <a:t>appliance</a:t>
+              <a:t>Darktrace appliance</a:t>
             </a:r>
             <a:endParaRPr lang="en-US" sz="1200" dirty="0">
               <a:latin typeface="Arial" panose="020B0604020202020204" pitchFamily="34" charset="0"/>
@@ -19846,6 +19839,3809 @@
     <p:extLst>
       <p:ext uri="{BB962C8B-B14F-4D97-AF65-F5344CB8AC3E}">
         <p14:creationId xmlns:p14="http://schemas.microsoft.com/office/powerpoint/2010/main" val="1980875994"/>
+      </p:ext>
+    </p:extLst>
+  </p:cSld>
+  <p:clrMapOvr>
+    <a:masterClrMapping/>
+  </p:clrMapOvr>
+</p:sld>
+</file>
+
+<file path=ppt/slides/slide5.xml><?xml version="1.0" encoding="utf-8"?>
+<p:sld xmlns:a="http://schemas.openxmlformats.org/drawingml/2006/main" xmlns:r="http://schemas.openxmlformats.org/officeDocument/2006/relationships" xmlns:p="http://schemas.openxmlformats.org/presentationml/2006/main">
+  <p:cSld>
+    <p:spTree>
+      <p:nvGrpSpPr>
+        <p:cNvPr id="1" name=""/>
+        <p:cNvGrpSpPr/>
+        <p:nvPr/>
+      </p:nvGrpSpPr>
+      <p:grpSpPr>
+        <a:xfrm>
+          <a:off x="0" y="0"/>
+          <a:ext cx="0" cy="0"/>
+          <a:chOff x="0" y="0"/>
+          <a:chExt cx="0" cy="0"/>
+        </a:xfrm>
+      </p:grpSpPr>
+      <p:sp>
+        <p:nvSpPr>
+          <p:cNvPr id="46" name="Rectangle 45">
+            <a:extLst>
+              <a:ext uri="{FF2B5EF4-FFF2-40B4-BE49-F238E27FC236}">
+                <a16:creationId xmlns:a16="http://schemas.microsoft.com/office/drawing/2014/main" id="{F5AD8509-7566-E946-9E5A-5557E62A6A29}"/>
+              </a:ext>
+            </a:extLst>
+          </p:cNvPr>
+          <p:cNvSpPr/>
+          <p:nvPr/>
+        </p:nvSpPr>
+        <p:spPr>
+          <a:xfrm>
+            <a:off x="2714653" y="3340396"/>
+            <a:ext cx="1645920" cy="2009369"/>
+          </a:xfrm>
+          <a:prstGeom prst="rect">
+            <a:avLst/>
+          </a:prstGeom>
+          <a:solidFill>
+            <a:srgbClr val="007CBC">
+              <a:alpha val="9804"/>
+            </a:srgbClr>
+          </a:solidFill>
+          <a:ln w="12700">
+            <a:noFill/>
+            <a:prstDash val="dash"/>
+          </a:ln>
+        </p:spPr>
+        <p:style>
+          <a:lnRef idx="2">
+            <a:schemeClr val="accent1">
+              <a:shade val="50000"/>
+            </a:schemeClr>
+          </a:lnRef>
+          <a:fillRef idx="1">
+            <a:schemeClr val="accent1"/>
+          </a:fillRef>
+          <a:effectRef idx="0">
+            <a:schemeClr val="accent1"/>
+          </a:effectRef>
+          <a:fontRef idx="minor">
+            <a:schemeClr val="lt1"/>
+          </a:fontRef>
+        </p:style>
+        <p:txBody>
+          <a:bodyPr lIns="338328"/>
+          <a:lstStyle/>
+          <a:p>
+            <a:pPr eaLnBrk="1" fontAlgn="auto" hangingPunct="1">
+              <a:spcBef>
+                <a:spcPts val="0"/>
+              </a:spcBef>
+              <a:spcAft>
+                <a:spcPts val="0"/>
+              </a:spcAft>
+              <a:defRPr/>
+            </a:pPr>
+            <a:r>
+              <a:rPr lang="en-US" sz="1200" dirty="0">
+                <a:solidFill>
+                  <a:srgbClr val="5B9CD5"/>
+                </a:solidFill>
+                <a:latin typeface="Arial" panose="020B0604020202020204" pitchFamily="34" charset="0"/>
+                <a:cs typeface="Arial" panose="020B0604020202020204" pitchFamily="34" charset="0"/>
+              </a:rPr>
+              <a:t>Private subnet</a:t>
+            </a:r>
+          </a:p>
+        </p:txBody>
+      </p:sp>
+      <p:sp>
+        <p:nvSpPr>
+          <p:cNvPr id="4" name="Rectangle 3">
+            <a:extLst>
+              <a:ext uri="{FF2B5EF4-FFF2-40B4-BE49-F238E27FC236}">
+                <a16:creationId xmlns:a16="http://schemas.microsoft.com/office/drawing/2014/main" id="{AE0DCB38-C38F-3E45-91A5-BC77EA90215A}"/>
+              </a:ext>
+            </a:extLst>
+          </p:cNvPr>
+          <p:cNvSpPr/>
+          <p:nvPr/>
+        </p:nvSpPr>
+        <p:spPr bwMode="auto">
+          <a:xfrm>
+            <a:off x="988624" y="1555531"/>
+            <a:ext cx="8050274" cy="3869086"/>
+          </a:xfrm>
+          <a:prstGeom prst="rect">
+            <a:avLst/>
+          </a:prstGeom>
+          <a:noFill/>
+          <a:ln w="12700">
+            <a:solidFill>
+              <a:srgbClr val="1E8900"/>
+            </a:solidFill>
+          </a:ln>
+        </p:spPr>
+        <p:style>
+          <a:lnRef idx="2">
+            <a:schemeClr val="accent1">
+              <a:shade val="50000"/>
+            </a:schemeClr>
+          </a:lnRef>
+          <a:fillRef idx="1">
+            <a:schemeClr val="accent1"/>
+          </a:fillRef>
+          <a:effectRef idx="0">
+            <a:schemeClr val="accent1"/>
+          </a:effectRef>
+          <a:fontRef idx="minor">
+            <a:schemeClr val="lt1"/>
+          </a:fontRef>
+        </p:style>
+        <p:txBody>
+          <a:bodyPr lIns="457200" tIns="91440"/>
+          <a:lstStyle/>
+          <a:p>
+            <a:pPr eaLnBrk="1" fontAlgn="auto" hangingPunct="1">
+              <a:spcBef>
+                <a:spcPts val="0"/>
+              </a:spcBef>
+              <a:spcAft>
+                <a:spcPts val="0"/>
+              </a:spcAft>
+              <a:defRPr/>
+            </a:pPr>
+            <a:r>
+              <a:rPr lang="en-US" sz="1200" dirty="0">
+                <a:ln w="0"/>
+                <a:solidFill>
+                  <a:srgbClr val="1E8900"/>
+                </a:solidFill>
+                <a:latin typeface="Arial" panose="020B0604020202020204" pitchFamily="34" charset="0"/>
+                <a:cs typeface="Arial" panose="020B0604020202020204" pitchFamily="34" charset="0"/>
+              </a:rPr>
+              <a:t>VPC</a:t>
+            </a:r>
+          </a:p>
+        </p:txBody>
+      </p:sp>
+      <p:pic>
+        <p:nvPicPr>
+          <p:cNvPr id="79" name="Graphic 17">
+            <a:extLst>
+              <a:ext uri="{FF2B5EF4-FFF2-40B4-BE49-F238E27FC236}">
+                <a16:creationId xmlns:a16="http://schemas.microsoft.com/office/drawing/2014/main" id="{8560CB5F-EA6E-8949-B816-4A4E6FE52E1E}"/>
+              </a:ext>
+            </a:extLst>
+          </p:cNvPr>
+          <p:cNvPicPr>
+            <a:picLocks noChangeAspect="1" noChangeArrowheads="1"/>
+          </p:cNvPicPr>
+          <p:nvPr/>
+        </p:nvPicPr>
+        <p:blipFill>
+          <a:blip r:embed="rId2" cstate="print">
+            <a:extLst>
+              <a:ext uri="{28A0092B-C50C-407E-A947-70E740481C1C}">
+                <a14:useLocalDpi xmlns:a14="http://schemas.microsoft.com/office/drawing/2010/main" val="0"/>
+              </a:ext>
+            </a:extLst>
+          </a:blip>
+          <a:srcRect/>
+          <a:stretch>
+            <a:fillRect/>
+          </a:stretch>
+        </p:blipFill>
+        <p:spPr bwMode="auto">
+          <a:xfrm>
+            <a:off x="3302663" y="4444596"/>
+            <a:ext cx="469900" cy="469900"/>
+          </a:xfrm>
+          <a:prstGeom prst="rect">
+            <a:avLst/>
+          </a:prstGeom>
+          <a:noFill/>
+          <a:ln>
+            <a:noFill/>
+          </a:ln>
+          <a:extLst>
+            <a:ext uri="{909E8E84-426E-40DD-AFC4-6F175D3DCCD1}">
+              <a14:hiddenFill xmlns:a14="http://schemas.microsoft.com/office/drawing/2010/main">
+                <a:solidFill>
+                  <a:srgbClr val="FFFFFF"/>
+                </a:solidFill>
+              </a14:hiddenFill>
+            </a:ext>
+            <a:ext uri="{91240B29-F687-4F45-9708-019B960494DF}">
+              <a14:hiddenLine xmlns:a14="http://schemas.microsoft.com/office/drawing/2010/main" w="9525">
+                <a:solidFill>
+                  <a:srgbClr val="000000"/>
+                </a:solidFill>
+                <a:miter lim="800000"/>
+                <a:headEnd/>
+                <a:tailEnd/>
+              </a14:hiddenLine>
+            </a:ext>
+          </a:extLst>
+        </p:spPr>
+      </p:pic>
+      <p:sp>
+        <p:nvSpPr>
+          <p:cNvPr id="80" name="TextBox 18">
+            <a:extLst>
+              <a:ext uri="{FF2B5EF4-FFF2-40B4-BE49-F238E27FC236}">
+                <a16:creationId xmlns:a16="http://schemas.microsoft.com/office/drawing/2014/main" id="{2E075880-4C60-1845-A45C-A49F05E20DD1}"/>
+              </a:ext>
+            </a:extLst>
+          </p:cNvPr>
+          <p:cNvSpPr txBox="1">
+            <a:spLocks noChangeArrowheads="1"/>
+          </p:cNvSpPr>
+          <p:nvPr/>
+        </p:nvSpPr>
+        <p:spPr bwMode="auto">
+          <a:xfrm>
+            <a:off x="2634758" y="4904532"/>
+            <a:ext cx="1805711" cy="276999"/>
+          </a:xfrm>
+          <a:prstGeom prst="rect">
+            <a:avLst/>
+          </a:prstGeom>
+          <a:noFill/>
+          <a:ln>
+            <a:noFill/>
+          </a:ln>
+          <a:extLst>
+            <a:ext uri="{909E8E84-426E-40DD-AFC4-6F175D3DCCD1}">
+              <a14:hiddenFill xmlns:a14="http://schemas.microsoft.com/office/drawing/2010/main">
+                <a:solidFill>
+                  <a:srgbClr val="FFFFFF"/>
+                </a:solidFill>
+              </a14:hiddenFill>
+            </a:ext>
+            <a:ext uri="{91240B29-F687-4F45-9708-019B960494DF}">
+              <a14:hiddenLine xmlns:a14="http://schemas.microsoft.com/office/drawing/2010/main" w="9525">
+                <a:solidFill>
+                  <a:srgbClr val="000000"/>
+                </a:solidFill>
+                <a:miter lim="800000"/>
+                <a:headEnd/>
+                <a:tailEnd/>
+              </a14:hiddenLine>
+            </a:ext>
+          </a:extLst>
+        </p:spPr>
+        <p:txBody>
+          <a:bodyPr wrap="square">
+            <a:spAutoFit/>
+          </a:bodyPr>
+          <a:lstStyle>
+            <a:lvl1pPr>
+              <a:defRPr>
+                <a:solidFill>
+                  <a:schemeClr val="tx1"/>
+                </a:solidFill>
+                <a:latin typeface="Calibri" panose="020F0502020204030204" pitchFamily="34" charset="0"/>
+              </a:defRPr>
+            </a:lvl1pPr>
+            <a:lvl2pPr marL="742950" indent="-285750">
+              <a:defRPr>
+                <a:solidFill>
+                  <a:schemeClr val="tx1"/>
+                </a:solidFill>
+                <a:latin typeface="Calibri" panose="020F0502020204030204" pitchFamily="34" charset="0"/>
+              </a:defRPr>
+            </a:lvl2pPr>
+            <a:lvl3pPr marL="1143000" indent="-228600">
+              <a:defRPr>
+                <a:solidFill>
+                  <a:schemeClr val="tx1"/>
+                </a:solidFill>
+                <a:latin typeface="Calibri" panose="020F0502020204030204" pitchFamily="34" charset="0"/>
+              </a:defRPr>
+            </a:lvl3pPr>
+            <a:lvl4pPr marL="1600200" indent="-228600">
+              <a:defRPr>
+                <a:solidFill>
+                  <a:schemeClr val="tx1"/>
+                </a:solidFill>
+                <a:latin typeface="Calibri" panose="020F0502020204030204" pitchFamily="34" charset="0"/>
+              </a:defRPr>
+            </a:lvl4pPr>
+            <a:lvl5pPr marL="2057400" indent="-228600">
+              <a:defRPr>
+                <a:solidFill>
+                  <a:schemeClr val="tx1"/>
+                </a:solidFill>
+                <a:latin typeface="Calibri" panose="020F0502020204030204" pitchFamily="34" charset="0"/>
+              </a:defRPr>
+            </a:lvl5pPr>
+            <a:lvl6pPr marL="2514600" indent="-228600" eaLnBrk="0" fontAlgn="base" hangingPunct="0">
+              <a:spcBef>
+                <a:spcPct val="0"/>
+              </a:spcBef>
+              <a:spcAft>
+                <a:spcPct val="0"/>
+              </a:spcAft>
+              <a:defRPr>
+                <a:solidFill>
+                  <a:schemeClr val="tx1"/>
+                </a:solidFill>
+                <a:latin typeface="Calibri" panose="020F0502020204030204" pitchFamily="34" charset="0"/>
+              </a:defRPr>
+            </a:lvl6pPr>
+            <a:lvl7pPr marL="2971800" indent="-228600" eaLnBrk="0" fontAlgn="base" hangingPunct="0">
+              <a:spcBef>
+                <a:spcPct val="0"/>
+              </a:spcBef>
+              <a:spcAft>
+                <a:spcPct val="0"/>
+              </a:spcAft>
+              <a:defRPr>
+                <a:solidFill>
+                  <a:schemeClr val="tx1"/>
+                </a:solidFill>
+                <a:latin typeface="Calibri" panose="020F0502020204030204" pitchFamily="34" charset="0"/>
+              </a:defRPr>
+            </a:lvl7pPr>
+            <a:lvl8pPr marL="3429000" indent="-228600" eaLnBrk="0" fontAlgn="base" hangingPunct="0">
+              <a:spcBef>
+                <a:spcPct val="0"/>
+              </a:spcBef>
+              <a:spcAft>
+                <a:spcPct val="0"/>
+              </a:spcAft>
+              <a:defRPr>
+                <a:solidFill>
+                  <a:schemeClr val="tx1"/>
+                </a:solidFill>
+                <a:latin typeface="Calibri" panose="020F0502020204030204" pitchFamily="34" charset="0"/>
+              </a:defRPr>
+            </a:lvl8pPr>
+            <a:lvl9pPr marL="3886200" indent="-228600" eaLnBrk="0" fontAlgn="base" hangingPunct="0">
+              <a:spcBef>
+                <a:spcPct val="0"/>
+              </a:spcBef>
+              <a:spcAft>
+                <a:spcPct val="0"/>
+              </a:spcAft>
+              <a:defRPr>
+                <a:solidFill>
+                  <a:schemeClr val="tx1"/>
+                </a:solidFill>
+                <a:latin typeface="Calibri" panose="020F0502020204030204" pitchFamily="34" charset="0"/>
+              </a:defRPr>
+            </a:lvl9pPr>
+          </a:lstStyle>
+          <a:p>
+            <a:pPr algn="ctr" eaLnBrk="1" hangingPunct="1"/>
+            <a:r>
+              <a:rPr lang="en-US" altLang="en-US" sz="1200" dirty="0" smtClean="0">
+                <a:latin typeface="Arial" panose="020B0604020202020204" pitchFamily="34" charset="0"/>
+                <a:cs typeface="Arial" panose="020B0604020202020204" pitchFamily="34" charset="0"/>
+              </a:rPr>
+              <a:t>Darktrace vSensor</a:t>
+            </a:r>
+            <a:endParaRPr lang="en-US" altLang="en-US" sz="1200" dirty="0">
+              <a:latin typeface="Arial" panose="020B0604020202020204" pitchFamily="34" charset="0"/>
+              <a:cs typeface="Arial" panose="020B0604020202020204" pitchFamily="34" charset="0"/>
+            </a:endParaRPr>
+          </a:p>
+        </p:txBody>
+      </p:sp>
+      <p:pic>
+        <p:nvPicPr>
+          <p:cNvPr id="81" name="Graphic 35">
+            <a:extLst>
+              <a:ext uri="{FF2B5EF4-FFF2-40B4-BE49-F238E27FC236}">
+                <a16:creationId xmlns:a16="http://schemas.microsoft.com/office/drawing/2014/main" id="{6FC3D56A-1081-9B43-9B9C-251CDE8593F4}"/>
+              </a:ext>
+            </a:extLst>
+          </p:cNvPr>
+          <p:cNvPicPr>
+            <a:picLocks noChangeAspect="1" noChangeArrowheads="1"/>
+          </p:cNvPicPr>
+          <p:nvPr/>
+        </p:nvPicPr>
+        <p:blipFill>
+          <a:blip r:embed="rId3" cstate="print">
+            <a:extLst>
+              <a:ext uri="{28A0092B-C50C-407E-A947-70E740481C1C}">
+                <a14:useLocalDpi xmlns:a14="http://schemas.microsoft.com/office/drawing/2010/main" val="0"/>
+              </a:ext>
+            </a:extLst>
+          </a:blip>
+          <a:srcRect/>
+          <a:stretch>
+            <a:fillRect/>
+          </a:stretch>
+        </p:blipFill>
+        <p:spPr bwMode="auto">
+          <a:xfrm>
+            <a:off x="2715768" y="3334157"/>
+            <a:ext cx="274637" cy="274638"/>
+          </a:xfrm>
+          <a:prstGeom prst="rect">
+            <a:avLst/>
+          </a:prstGeom>
+          <a:noFill/>
+          <a:ln>
+            <a:noFill/>
+          </a:ln>
+          <a:extLst>
+            <a:ext uri="{909E8E84-426E-40DD-AFC4-6F175D3DCCD1}">
+              <a14:hiddenFill xmlns:a14="http://schemas.microsoft.com/office/drawing/2010/main">
+                <a:solidFill>
+                  <a:srgbClr val="FFFFFF"/>
+                </a:solidFill>
+              </a14:hiddenFill>
+            </a:ext>
+            <a:ext uri="{91240B29-F687-4F45-9708-019B960494DF}">
+              <a14:hiddenLine xmlns:a14="http://schemas.microsoft.com/office/drawing/2010/main" w="9525">
+                <a:solidFill>
+                  <a:srgbClr val="000000"/>
+                </a:solidFill>
+                <a:miter lim="800000"/>
+                <a:headEnd/>
+                <a:tailEnd/>
+              </a14:hiddenLine>
+            </a:ext>
+          </a:extLst>
+        </p:spPr>
+      </p:pic>
+      <p:sp>
+        <p:nvSpPr>
+          <p:cNvPr id="82" name="Rectangle 81">
+            <a:extLst>
+              <a:ext uri="{FF2B5EF4-FFF2-40B4-BE49-F238E27FC236}">
+                <a16:creationId xmlns:a16="http://schemas.microsoft.com/office/drawing/2014/main" id="{B1844CBB-737E-C049-891C-1F2168761D96}"/>
+              </a:ext>
+            </a:extLst>
+          </p:cNvPr>
+          <p:cNvSpPr/>
+          <p:nvPr/>
+        </p:nvSpPr>
+        <p:spPr>
+          <a:xfrm>
+            <a:off x="2714653" y="1723570"/>
+            <a:ext cx="1645920" cy="1382334"/>
+          </a:xfrm>
+          <a:prstGeom prst="rect">
+            <a:avLst/>
+          </a:prstGeom>
+          <a:solidFill>
+            <a:srgbClr val="1D8900">
+              <a:alpha val="9804"/>
+            </a:srgbClr>
+          </a:solidFill>
+          <a:ln w="12700">
+            <a:noFill/>
+            <a:prstDash val="dash"/>
+          </a:ln>
+        </p:spPr>
+        <p:style>
+          <a:lnRef idx="2">
+            <a:schemeClr val="accent1">
+              <a:shade val="50000"/>
+            </a:schemeClr>
+          </a:lnRef>
+          <a:fillRef idx="1">
+            <a:schemeClr val="accent1"/>
+          </a:fillRef>
+          <a:effectRef idx="0">
+            <a:schemeClr val="accent1"/>
+          </a:effectRef>
+          <a:fontRef idx="minor">
+            <a:schemeClr val="lt1"/>
+          </a:fontRef>
+        </p:style>
+        <p:txBody>
+          <a:bodyPr lIns="338328"/>
+          <a:lstStyle/>
+          <a:p>
+            <a:pPr eaLnBrk="1" fontAlgn="auto" hangingPunct="1">
+              <a:spcBef>
+                <a:spcPts val="0"/>
+              </a:spcBef>
+              <a:spcAft>
+                <a:spcPts val="0"/>
+              </a:spcAft>
+              <a:defRPr/>
+            </a:pPr>
+            <a:r>
+              <a:rPr lang="en-US" sz="1200" dirty="0">
+                <a:solidFill>
+                  <a:srgbClr val="1E8900"/>
+                </a:solidFill>
+                <a:latin typeface="Arial" panose="020B0604020202020204" pitchFamily="34" charset="0"/>
+                <a:cs typeface="Arial" panose="020B0604020202020204" pitchFamily="34" charset="0"/>
+              </a:rPr>
+              <a:t>Public subnet</a:t>
+            </a:r>
+          </a:p>
+        </p:txBody>
+      </p:sp>
+      <p:pic>
+        <p:nvPicPr>
+          <p:cNvPr id="83" name="Graphic 34">
+            <a:extLst>
+              <a:ext uri="{FF2B5EF4-FFF2-40B4-BE49-F238E27FC236}">
+                <a16:creationId xmlns:a16="http://schemas.microsoft.com/office/drawing/2014/main" id="{41905C5A-FAE4-854F-8D41-4C3BCF9EA0F6}"/>
+              </a:ext>
+            </a:extLst>
+          </p:cNvPr>
+          <p:cNvPicPr>
+            <a:picLocks noChangeAspect="1" noChangeArrowheads="1"/>
+          </p:cNvPicPr>
+          <p:nvPr/>
+        </p:nvPicPr>
+        <p:blipFill>
+          <a:blip r:embed="rId4" cstate="print">
+            <a:extLst>
+              <a:ext uri="{28A0092B-C50C-407E-A947-70E740481C1C}">
+                <a14:useLocalDpi xmlns:a14="http://schemas.microsoft.com/office/drawing/2010/main" val="0"/>
+              </a:ext>
+            </a:extLst>
+          </a:blip>
+          <a:srcRect/>
+          <a:stretch>
+            <a:fillRect/>
+          </a:stretch>
+        </p:blipFill>
+        <p:spPr bwMode="auto">
+          <a:xfrm>
+            <a:off x="2715768" y="1720856"/>
+            <a:ext cx="274638" cy="274638"/>
+          </a:xfrm>
+          <a:prstGeom prst="rect">
+            <a:avLst/>
+          </a:prstGeom>
+          <a:noFill/>
+          <a:ln>
+            <a:noFill/>
+          </a:ln>
+          <a:extLst>
+            <a:ext uri="{909E8E84-426E-40DD-AFC4-6F175D3DCCD1}">
+              <a14:hiddenFill xmlns:a14="http://schemas.microsoft.com/office/drawing/2010/main">
+                <a:solidFill>
+                  <a:srgbClr val="FFFFFF"/>
+                </a:solidFill>
+              </a14:hiddenFill>
+            </a:ext>
+            <a:ext uri="{91240B29-F687-4F45-9708-019B960494DF}">
+              <a14:hiddenLine xmlns:a14="http://schemas.microsoft.com/office/drawing/2010/main" w="9525">
+                <a:solidFill>
+                  <a:srgbClr val="000000"/>
+                </a:solidFill>
+                <a:miter lim="800000"/>
+                <a:headEnd/>
+                <a:tailEnd/>
+              </a14:hiddenLine>
+            </a:ext>
+          </a:extLst>
+        </p:spPr>
+      </p:pic>
+      <p:pic>
+        <p:nvPicPr>
+          <p:cNvPr id="84" name="Graphic 17">
+            <a:extLst>
+              <a:ext uri="{FF2B5EF4-FFF2-40B4-BE49-F238E27FC236}">
+                <a16:creationId xmlns:a16="http://schemas.microsoft.com/office/drawing/2014/main" id="{8560CB5F-EA6E-8949-B816-4A4E6FE52E1E}"/>
+              </a:ext>
+            </a:extLst>
+          </p:cNvPr>
+          <p:cNvPicPr>
+            <a:picLocks noChangeAspect="1" noChangeArrowheads="1"/>
+          </p:cNvPicPr>
+          <p:nvPr/>
+        </p:nvPicPr>
+        <p:blipFill>
+          <a:blip r:embed="rId2" cstate="print">
+            <a:extLst>
+              <a:ext uri="{28A0092B-C50C-407E-A947-70E740481C1C}">
+                <a14:useLocalDpi xmlns:a14="http://schemas.microsoft.com/office/drawing/2010/main" val="0"/>
+              </a:ext>
+            </a:extLst>
+          </a:blip>
+          <a:srcRect/>
+          <a:stretch>
+            <a:fillRect/>
+          </a:stretch>
+        </p:blipFill>
+        <p:spPr bwMode="auto">
+          <a:xfrm>
+            <a:off x="3302663" y="2193879"/>
+            <a:ext cx="469900" cy="469900"/>
+          </a:xfrm>
+          <a:prstGeom prst="rect">
+            <a:avLst/>
+          </a:prstGeom>
+          <a:noFill/>
+          <a:ln>
+            <a:noFill/>
+          </a:ln>
+          <a:extLst>
+            <a:ext uri="{909E8E84-426E-40DD-AFC4-6F175D3DCCD1}">
+              <a14:hiddenFill xmlns:a14="http://schemas.microsoft.com/office/drawing/2010/main">
+                <a:solidFill>
+                  <a:srgbClr val="FFFFFF"/>
+                </a:solidFill>
+              </a14:hiddenFill>
+            </a:ext>
+            <a:ext uri="{91240B29-F687-4F45-9708-019B960494DF}">
+              <a14:hiddenLine xmlns:a14="http://schemas.microsoft.com/office/drawing/2010/main" w="9525">
+                <a:solidFill>
+                  <a:srgbClr val="000000"/>
+                </a:solidFill>
+                <a:miter lim="800000"/>
+                <a:headEnd/>
+                <a:tailEnd/>
+              </a14:hiddenLine>
+            </a:ext>
+          </a:extLst>
+        </p:spPr>
+      </p:pic>
+      <p:sp>
+        <p:nvSpPr>
+          <p:cNvPr id="85" name="TextBox 18">
+            <a:extLst>
+              <a:ext uri="{FF2B5EF4-FFF2-40B4-BE49-F238E27FC236}">
+                <a16:creationId xmlns:a16="http://schemas.microsoft.com/office/drawing/2014/main" id="{2E075880-4C60-1845-A45C-A49F05E20DD1}"/>
+              </a:ext>
+            </a:extLst>
+          </p:cNvPr>
+          <p:cNvSpPr txBox="1">
+            <a:spLocks noChangeArrowheads="1"/>
+          </p:cNvSpPr>
+          <p:nvPr/>
+        </p:nvSpPr>
+        <p:spPr bwMode="auto">
+          <a:xfrm>
+            <a:off x="2798948" y="2637417"/>
+            <a:ext cx="1477330" cy="286820"/>
+          </a:xfrm>
+          <a:prstGeom prst="rect">
+            <a:avLst/>
+          </a:prstGeom>
+          <a:noFill/>
+          <a:ln>
+            <a:noFill/>
+          </a:ln>
+          <a:extLst>
+            <a:ext uri="{909E8E84-426E-40DD-AFC4-6F175D3DCCD1}">
+              <a14:hiddenFill xmlns:a14="http://schemas.microsoft.com/office/drawing/2010/main">
+                <a:solidFill>
+                  <a:srgbClr val="FFFFFF"/>
+                </a:solidFill>
+              </a14:hiddenFill>
+            </a:ext>
+            <a:ext uri="{91240B29-F687-4F45-9708-019B960494DF}">
+              <a14:hiddenLine xmlns:a14="http://schemas.microsoft.com/office/drawing/2010/main" w="9525">
+                <a:solidFill>
+                  <a:srgbClr val="000000"/>
+                </a:solidFill>
+                <a:miter lim="800000"/>
+                <a:headEnd/>
+                <a:tailEnd/>
+              </a14:hiddenLine>
+            </a:ext>
+          </a:extLst>
+        </p:spPr>
+        <p:txBody>
+          <a:bodyPr wrap="square">
+            <a:spAutoFit/>
+          </a:bodyPr>
+          <a:lstStyle>
+            <a:lvl1pPr>
+              <a:defRPr>
+                <a:solidFill>
+                  <a:schemeClr val="tx1"/>
+                </a:solidFill>
+                <a:latin typeface="Calibri" panose="020F0502020204030204" pitchFamily="34" charset="0"/>
+              </a:defRPr>
+            </a:lvl1pPr>
+            <a:lvl2pPr marL="742950" indent="-285750">
+              <a:defRPr>
+                <a:solidFill>
+                  <a:schemeClr val="tx1"/>
+                </a:solidFill>
+                <a:latin typeface="Calibri" panose="020F0502020204030204" pitchFamily="34" charset="0"/>
+              </a:defRPr>
+            </a:lvl2pPr>
+            <a:lvl3pPr marL="1143000" indent="-228600">
+              <a:defRPr>
+                <a:solidFill>
+                  <a:schemeClr val="tx1"/>
+                </a:solidFill>
+                <a:latin typeface="Calibri" panose="020F0502020204030204" pitchFamily="34" charset="0"/>
+              </a:defRPr>
+            </a:lvl3pPr>
+            <a:lvl4pPr marL="1600200" indent="-228600">
+              <a:defRPr>
+                <a:solidFill>
+                  <a:schemeClr val="tx1"/>
+                </a:solidFill>
+                <a:latin typeface="Calibri" panose="020F0502020204030204" pitchFamily="34" charset="0"/>
+              </a:defRPr>
+            </a:lvl4pPr>
+            <a:lvl5pPr marL="2057400" indent="-228600">
+              <a:defRPr>
+                <a:solidFill>
+                  <a:schemeClr val="tx1"/>
+                </a:solidFill>
+                <a:latin typeface="Calibri" panose="020F0502020204030204" pitchFamily="34" charset="0"/>
+              </a:defRPr>
+            </a:lvl5pPr>
+            <a:lvl6pPr marL="2514600" indent="-228600" eaLnBrk="0" fontAlgn="base" hangingPunct="0">
+              <a:spcBef>
+                <a:spcPct val="0"/>
+              </a:spcBef>
+              <a:spcAft>
+                <a:spcPct val="0"/>
+              </a:spcAft>
+              <a:defRPr>
+                <a:solidFill>
+                  <a:schemeClr val="tx1"/>
+                </a:solidFill>
+                <a:latin typeface="Calibri" panose="020F0502020204030204" pitchFamily="34" charset="0"/>
+              </a:defRPr>
+            </a:lvl6pPr>
+            <a:lvl7pPr marL="2971800" indent="-228600" eaLnBrk="0" fontAlgn="base" hangingPunct="0">
+              <a:spcBef>
+                <a:spcPct val="0"/>
+              </a:spcBef>
+              <a:spcAft>
+                <a:spcPct val="0"/>
+              </a:spcAft>
+              <a:defRPr>
+                <a:solidFill>
+                  <a:schemeClr val="tx1"/>
+                </a:solidFill>
+                <a:latin typeface="Calibri" panose="020F0502020204030204" pitchFamily="34" charset="0"/>
+              </a:defRPr>
+            </a:lvl7pPr>
+            <a:lvl8pPr marL="3429000" indent="-228600" eaLnBrk="0" fontAlgn="base" hangingPunct="0">
+              <a:spcBef>
+                <a:spcPct val="0"/>
+              </a:spcBef>
+              <a:spcAft>
+                <a:spcPct val="0"/>
+              </a:spcAft>
+              <a:defRPr>
+                <a:solidFill>
+                  <a:schemeClr val="tx1"/>
+                </a:solidFill>
+                <a:latin typeface="Calibri" panose="020F0502020204030204" pitchFamily="34" charset="0"/>
+              </a:defRPr>
+            </a:lvl8pPr>
+            <a:lvl9pPr marL="3886200" indent="-228600" eaLnBrk="0" fontAlgn="base" hangingPunct="0">
+              <a:spcBef>
+                <a:spcPct val="0"/>
+              </a:spcBef>
+              <a:spcAft>
+                <a:spcPct val="0"/>
+              </a:spcAft>
+              <a:defRPr>
+                <a:solidFill>
+                  <a:schemeClr val="tx1"/>
+                </a:solidFill>
+                <a:latin typeface="Calibri" panose="020F0502020204030204" pitchFamily="34" charset="0"/>
+              </a:defRPr>
+            </a:lvl9pPr>
+          </a:lstStyle>
+          <a:p>
+            <a:pPr algn="ctr" eaLnBrk="1" hangingPunct="1"/>
+            <a:r>
+              <a:rPr lang="en-US" altLang="en-US" sz="1200" dirty="0" smtClean="0">
+                <a:latin typeface="Arial" panose="020B0604020202020204" pitchFamily="34" charset="0"/>
+                <a:cs typeface="Arial" panose="020B0604020202020204" pitchFamily="34" charset="0"/>
+              </a:rPr>
+              <a:t>Linux bastion host</a:t>
+            </a:r>
+            <a:endParaRPr lang="en-US" altLang="en-US" sz="1200" dirty="0">
+              <a:latin typeface="Arial" panose="020B0604020202020204" pitchFamily="34" charset="0"/>
+              <a:cs typeface="Arial" panose="020B0604020202020204" pitchFamily="34" charset="0"/>
+            </a:endParaRPr>
+          </a:p>
+        </p:txBody>
+      </p:sp>
+      <p:pic>
+        <p:nvPicPr>
+          <p:cNvPr id="8" name="Graphic 9">
+            <a:extLst>
+              <a:ext uri="{FF2B5EF4-FFF2-40B4-BE49-F238E27FC236}">
+                <a16:creationId xmlns:a16="http://schemas.microsoft.com/office/drawing/2014/main" id="{8219DCE8-247C-1049-BE53-921770E89315}"/>
+              </a:ext>
+            </a:extLst>
+          </p:cNvPr>
+          <p:cNvPicPr>
+            <a:picLocks noChangeAspect="1" noChangeArrowheads="1"/>
+          </p:cNvPicPr>
+          <p:nvPr/>
+        </p:nvPicPr>
+        <p:blipFill>
+          <a:blip r:embed="rId5" cstate="print">
+            <a:extLst>
+              <a:ext uri="{28A0092B-C50C-407E-A947-70E740481C1C}">
+                <a14:useLocalDpi xmlns:a14="http://schemas.microsoft.com/office/drawing/2010/main" val="0"/>
+              </a:ext>
+            </a:extLst>
+          </a:blip>
+          <a:srcRect/>
+          <a:stretch>
+            <a:fillRect/>
+          </a:stretch>
+        </p:blipFill>
+        <p:spPr bwMode="auto">
+          <a:xfrm>
+            <a:off x="983525" y="1555756"/>
+            <a:ext cx="330200" cy="330200"/>
+          </a:xfrm>
+          <a:prstGeom prst="rect">
+            <a:avLst/>
+          </a:prstGeom>
+          <a:noFill/>
+          <a:ln>
+            <a:noFill/>
+          </a:ln>
+          <a:extLst>
+            <a:ext uri="{909E8E84-426E-40DD-AFC4-6F175D3DCCD1}">
+              <a14:hiddenFill xmlns:a14="http://schemas.microsoft.com/office/drawing/2010/main">
+                <a:solidFill>
+                  <a:srgbClr val="FFFFFF"/>
+                </a:solidFill>
+              </a14:hiddenFill>
+            </a:ext>
+            <a:ext uri="{91240B29-F687-4F45-9708-019B960494DF}">
+              <a14:hiddenLine xmlns:a14="http://schemas.microsoft.com/office/drawing/2010/main" w="9525">
+                <a:solidFill>
+                  <a:srgbClr val="000000"/>
+                </a:solidFill>
+                <a:miter lim="800000"/>
+                <a:headEnd/>
+                <a:tailEnd/>
+              </a14:hiddenLine>
+            </a:ext>
+          </a:extLst>
+        </p:spPr>
+      </p:pic>
+      <p:pic>
+        <p:nvPicPr>
+          <p:cNvPr id="30" name="Graphic 18">
+            <a:extLst>
+              <a:ext uri="{FF2B5EF4-FFF2-40B4-BE49-F238E27FC236}">
+                <a16:creationId xmlns:a16="http://schemas.microsoft.com/office/drawing/2014/main" id="{E0668E3F-1457-E041-A92E-2FF0C60C21C1}"/>
+              </a:ext>
+            </a:extLst>
+          </p:cNvPr>
+          <p:cNvPicPr>
+            <a:picLocks noChangeAspect="1" noChangeArrowheads="1"/>
+          </p:cNvPicPr>
+          <p:nvPr/>
+        </p:nvPicPr>
+        <p:blipFill>
+          <a:blip r:embed="rId6" cstate="print">
+            <a:extLst>
+              <a:ext uri="{28A0092B-C50C-407E-A947-70E740481C1C}">
+                <a14:useLocalDpi xmlns:a14="http://schemas.microsoft.com/office/drawing/2010/main" val="0"/>
+              </a:ext>
+            </a:extLst>
+          </a:blip>
+          <a:srcRect/>
+          <a:stretch>
+            <a:fillRect/>
+          </a:stretch>
+        </p:blipFill>
+        <p:spPr bwMode="auto">
+          <a:xfrm>
+            <a:off x="5117797" y="4365611"/>
+            <a:ext cx="330200" cy="330200"/>
+          </a:xfrm>
+          <a:prstGeom prst="rect">
+            <a:avLst/>
+          </a:prstGeom>
+          <a:noFill/>
+          <a:ln>
+            <a:noFill/>
+          </a:ln>
+          <a:extLst>
+            <a:ext uri="{909E8E84-426E-40DD-AFC4-6F175D3DCCD1}">
+              <a14:hiddenFill xmlns:a14="http://schemas.microsoft.com/office/drawing/2010/main">
+                <a:solidFill>
+                  <a:srgbClr val="FFFFFF"/>
+                </a:solidFill>
+              </a14:hiddenFill>
+            </a:ext>
+            <a:ext uri="{91240B29-F687-4F45-9708-019B960494DF}">
+              <a14:hiddenLine xmlns:a14="http://schemas.microsoft.com/office/drawing/2010/main" w="9525">
+                <a:solidFill>
+                  <a:srgbClr val="000000"/>
+                </a:solidFill>
+                <a:miter lim="800000"/>
+                <a:headEnd/>
+                <a:tailEnd/>
+              </a14:hiddenLine>
+            </a:ext>
+          </a:extLst>
+        </p:spPr>
+      </p:pic>
+      <p:pic>
+        <p:nvPicPr>
+          <p:cNvPr id="35" name="Graphic 17">
+            <a:extLst>
+              <a:ext uri="{FF2B5EF4-FFF2-40B4-BE49-F238E27FC236}">
+                <a16:creationId xmlns:a16="http://schemas.microsoft.com/office/drawing/2014/main" id="{443A8EDD-16C2-6848-83A6-4582C7B74B70}"/>
+              </a:ext>
+            </a:extLst>
+          </p:cNvPr>
+          <p:cNvPicPr>
+            <a:picLocks noChangeAspect="1" noChangeArrowheads="1"/>
+          </p:cNvPicPr>
+          <p:nvPr/>
+        </p:nvPicPr>
+        <p:blipFill>
+          <a:blip r:embed="rId7" cstate="print">
+            <a:extLst>
+              <a:ext uri="{28A0092B-C50C-407E-A947-70E740481C1C}">
+                <a14:useLocalDpi xmlns:a14="http://schemas.microsoft.com/office/drawing/2010/main" val="0"/>
+              </a:ext>
+            </a:extLst>
+          </a:blip>
+          <a:srcRect/>
+          <a:stretch>
+            <a:fillRect/>
+          </a:stretch>
+        </p:blipFill>
+        <p:spPr bwMode="auto">
+          <a:xfrm>
+            <a:off x="1426229" y="4307628"/>
+            <a:ext cx="643919" cy="643919"/>
+          </a:xfrm>
+          <a:prstGeom prst="rect">
+            <a:avLst/>
+          </a:prstGeom>
+          <a:noFill/>
+          <a:ln>
+            <a:noFill/>
+          </a:ln>
+          <a:extLst>
+            <a:ext uri="{909E8E84-426E-40DD-AFC4-6F175D3DCCD1}">
+              <a14:hiddenFill xmlns:a14="http://schemas.microsoft.com/office/drawing/2010/main">
+                <a:solidFill>
+                  <a:srgbClr val="FFFFFF"/>
+                </a:solidFill>
+              </a14:hiddenFill>
+            </a:ext>
+            <a:ext uri="{91240B29-F687-4F45-9708-019B960494DF}">
+              <a14:hiddenLine xmlns:a14="http://schemas.microsoft.com/office/drawing/2010/main" w="9525">
+                <a:solidFill>
+                  <a:srgbClr val="000000"/>
+                </a:solidFill>
+                <a:miter lim="800000"/>
+                <a:headEnd/>
+                <a:tailEnd/>
+              </a14:hiddenLine>
+            </a:ext>
+          </a:extLst>
+        </p:spPr>
+      </p:pic>
+      <p:sp>
+        <p:nvSpPr>
+          <p:cNvPr id="36" name="TextBox 9">
+            <a:extLst>
+              <a:ext uri="{FF2B5EF4-FFF2-40B4-BE49-F238E27FC236}">
+                <a16:creationId xmlns:a16="http://schemas.microsoft.com/office/drawing/2014/main" id="{F9D6EE48-441C-334D-8184-61EA0808B9C5}"/>
+              </a:ext>
+            </a:extLst>
+          </p:cNvPr>
+          <p:cNvSpPr txBox="1">
+            <a:spLocks noChangeArrowheads="1"/>
+          </p:cNvSpPr>
+          <p:nvPr/>
+        </p:nvSpPr>
+        <p:spPr bwMode="auto">
+          <a:xfrm>
+            <a:off x="938225" y="4953418"/>
+            <a:ext cx="1619927" cy="276999"/>
+          </a:xfrm>
+          <a:prstGeom prst="rect">
+            <a:avLst/>
+          </a:prstGeom>
+          <a:noFill/>
+          <a:ln>
+            <a:noFill/>
+          </a:ln>
+          <a:extLst>
+            <a:ext uri="{909E8E84-426E-40DD-AFC4-6F175D3DCCD1}">
+              <a14:hiddenFill xmlns:a14="http://schemas.microsoft.com/office/drawing/2010/main">
+                <a:solidFill>
+                  <a:srgbClr val="FFFFFF"/>
+                </a:solidFill>
+              </a14:hiddenFill>
+            </a:ext>
+            <a:ext uri="{91240B29-F687-4F45-9708-019B960494DF}">
+              <a14:hiddenLine xmlns:a14="http://schemas.microsoft.com/office/drawing/2010/main" w="9525">
+                <a:solidFill>
+                  <a:srgbClr val="000000"/>
+                </a:solidFill>
+                <a:miter lim="800000"/>
+                <a:headEnd/>
+                <a:tailEnd/>
+              </a14:hiddenLine>
+            </a:ext>
+          </a:extLst>
+        </p:spPr>
+        <p:txBody>
+          <a:bodyPr wrap="square">
+            <a:spAutoFit/>
+          </a:bodyPr>
+          <a:lstStyle>
+            <a:lvl1pPr>
+              <a:defRPr>
+                <a:solidFill>
+                  <a:schemeClr val="tx1"/>
+                </a:solidFill>
+                <a:latin typeface="Calibri" panose="020F0502020204030204" pitchFamily="34" charset="0"/>
+              </a:defRPr>
+            </a:lvl1pPr>
+            <a:lvl2pPr marL="742950" indent="-285750">
+              <a:defRPr>
+                <a:solidFill>
+                  <a:schemeClr val="tx1"/>
+                </a:solidFill>
+                <a:latin typeface="Calibri" panose="020F0502020204030204" pitchFamily="34" charset="0"/>
+              </a:defRPr>
+            </a:lvl2pPr>
+            <a:lvl3pPr marL="1143000" indent="-228600">
+              <a:defRPr>
+                <a:solidFill>
+                  <a:schemeClr val="tx1"/>
+                </a:solidFill>
+                <a:latin typeface="Calibri" panose="020F0502020204030204" pitchFamily="34" charset="0"/>
+              </a:defRPr>
+            </a:lvl3pPr>
+            <a:lvl4pPr marL="1600200" indent="-228600">
+              <a:defRPr>
+                <a:solidFill>
+                  <a:schemeClr val="tx1"/>
+                </a:solidFill>
+                <a:latin typeface="Calibri" panose="020F0502020204030204" pitchFamily="34" charset="0"/>
+              </a:defRPr>
+            </a:lvl4pPr>
+            <a:lvl5pPr marL="2057400" indent="-228600">
+              <a:defRPr>
+                <a:solidFill>
+                  <a:schemeClr val="tx1"/>
+                </a:solidFill>
+                <a:latin typeface="Calibri" panose="020F0502020204030204" pitchFamily="34" charset="0"/>
+              </a:defRPr>
+            </a:lvl5pPr>
+            <a:lvl6pPr marL="2514600" indent="-228600" eaLnBrk="0" fontAlgn="base" hangingPunct="0">
+              <a:spcBef>
+                <a:spcPct val="0"/>
+              </a:spcBef>
+              <a:spcAft>
+                <a:spcPct val="0"/>
+              </a:spcAft>
+              <a:defRPr>
+                <a:solidFill>
+                  <a:schemeClr val="tx1"/>
+                </a:solidFill>
+                <a:latin typeface="Calibri" panose="020F0502020204030204" pitchFamily="34" charset="0"/>
+              </a:defRPr>
+            </a:lvl6pPr>
+            <a:lvl7pPr marL="2971800" indent="-228600" eaLnBrk="0" fontAlgn="base" hangingPunct="0">
+              <a:spcBef>
+                <a:spcPct val="0"/>
+              </a:spcBef>
+              <a:spcAft>
+                <a:spcPct val="0"/>
+              </a:spcAft>
+              <a:defRPr>
+                <a:solidFill>
+                  <a:schemeClr val="tx1"/>
+                </a:solidFill>
+                <a:latin typeface="Calibri" panose="020F0502020204030204" pitchFamily="34" charset="0"/>
+              </a:defRPr>
+            </a:lvl7pPr>
+            <a:lvl8pPr marL="3429000" indent="-228600" eaLnBrk="0" fontAlgn="base" hangingPunct="0">
+              <a:spcBef>
+                <a:spcPct val="0"/>
+              </a:spcBef>
+              <a:spcAft>
+                <a:spcPct val="0"/>
+              </a:spcAft>
+              <a:defRPr>
+                <a:solidFill>
+                  <a:schemeClr val="tx1"/>
+                </a:solidFill>
+                <a:latin typeface="Calibri" panose="020F0502020204030204" pitchFamily="34" charset="0"/>
+              </a:defRPr>
+            </a:lvl8pPr>
+            <a:lvl9pPr marL="3886200" indent="-228600" eaLnBrk="0" fontAlgn="base" hangingPunct="0">
+              <a:spcBef>
+                <a:spcPct val="0"/>
+              </a:spcBef>
+              <a:spcAft>
+                <a:spcPct val="0"/>
+              </a:spcAft>
+              <a:defRPr>
+                <a:solidFill>
+                  <a:schemeClr val="tx1"/>
+                </a:solidFill>
+                <a:latin typeface="Calibri" panose="020F0502020204030204" pitchFamily="34" charset="0"/>
+              </a:defRPr>
+            </a:lvl9pPr>
+          </a:lstStyle>
+          <a:p>
+            <a:pPr algn="ctr" eaLnBrk="1" hangingPunct="1"/>
+            <a:r>
+              <a:rPr lang="en-US" altLang="en-US" sz="1200" dirty="0">
+                <a:latin typeface="Arial" panose="020B0604020202020204" pitchFamily="34" charset="0"/>
+                <a:ea typeface="Amazon Ember" panose="020B0603020204020204" pitchFamily="34" charset="0"/>
+                <a:cs typeface="Arial" panose="020B0604020202020204" pitchFamily="34" charset="0"/>
+              </a:rPr>
+              <a:t>Amazon CloudWatch</a:t>
+            </a:r>
+          </a:p>
+        </p:txBody>
+      </p:sp>
+      <p:sp>
+        <p:nvSpPr>
+          <p:cNvPr id="9" name="Rectangle 8">
+            <a:extLst>
+              <a:ext uri="{FF2B5EF4-FFF2-40B4-BE49-F238E27FC236}">
+                <a16:creationId xmlns:a16="http://schemas.microsoft.com/office/drawing/2014/main" id="{0356EB0E-773F-E048-9282-D7A38A3BC486}"/>
+              </a:ext>
+            </a:extLst>
+          </p:cNvPr>
+          <p:cNvSpPr/>
+          <p:nvPr/>
+        </p:nvSpPr>
+        <p:spPr bwMode="auto">
+          <a:xfrm>
+            <a:off x="5907020" y="1135116"/>
+            <a:ext cx="2095500" cy="4445876"/>
+          </a:xfrm>
+          <a:prstGeom prst="rect">
+            <a:avLst/>
+          </a:prstGeom>
+          <a:noFill/>
+          <a:ln w="12700">
+            <a:solidFill>
+              <a:srgbClr val="5B9CD5"/>
+            </a:solidFill>
+            <a:prstDash val="dash"/>
+          </a:ln>
+        </p:spPr>
+        <p:style>
+          <a:lnRef idx="2">
+            <a:schemeClr val="accent1">
+              <a:shade val="50000"/>
+            </a:schemeClr>
+          </a:lnRef>
+          <a:fillRef idx="1">
+            <a:schemeClr val="accent1"/>
+          </a:fillRef>
+          <a:effectRef idx="0">
+            <a:schemeClr val="accent1"/>
+          </a:effectRef>
+          <a:fontRef idx="minor">
+            <a:schemeClr val="lt1"/>
+          </a:fontRef>
+        </p:style>
+        <p:txBody>
+          <a:bodyPr tIns="91440"/>
+          <a:lstStyle/>
+          <a:p>
+            <a:pPr algn="ctr" eaLnBrk="1" fontAlgn="auto" hangingPunct="1">
+              <a:spcBef>
+                <a:spcPts val="0"/>
+              </a:spcBef>
+              <a:spcAft>
+                <a:spcPts val="0"/>
+              </a:spcAft>
+              <a:defRPr/>
+            </a:pPr>
+            <a:r>
+              <a:rPr lang="en-US" sz="1200" dirty="0">
+                <a:solidFill>
+                  <a:srgbClr val="5B9CD5"/>
+                </a:solidFill>
+                <a:latin typeface="Arial" panose="020B0604020202020204" pitchFamily="34" charset="0"/>
+                <a:cs typeface="Arial" panose="020B0604020202020204" pitchFamily="34" charset="0"/>
+              </a:rPr>
+              <a:t>Availability Zone 2</a:t>
+            </a:r>
+          </a:p>
+        </p:txBody>
+      </p:sp>
+      <p:sp>
+        <p:nvSpPr>
+          <p:cNvPr id="31" name="Rectangle 30">
+            <a:extLst>
+              <a:ext uri="{FF2B5EF4-FFF2-40B4-BE49-F238E27FC236}">
+                <a16:creationId xmlns:a16="http://schemas.microsoft.com/office/drawing/2014/main" id="{F5AD8509-7566-E946-9E5A-5557E62A6A29}"/>
+              </a:ext>
+            </a:extLst>
+          </p:cNvPr>
+          <p:cNvSpPr/>
+          <p:nvPr/>
+        </p:nvSpPr>
+        <p:spPr>
+          <a:xfrm>
+            <a:off x="6131810" y="3335743"/>
+            <a:ext cx="1645920" cy="2014021"/>
+          </a:xfrm>
+          <a:prstGeom prst="rect">
+            <a:avLst/>
+          </a:prstGeom>
+          <a:solidFill>
+            <a:srgbClr val="007CBC">
+              <a:alpha val="9804"/>
+            </a:srgbClr>
+          </a:solidFill>
+          <a:ln w="12700">
+            <a:noFill/>
+            <a:prstDash val="dash"/>
+          </a:ln>
+        </p:spPr>
+        <p:style>
+          <a:lnRef idx="2">
+            <a:schemeClr val="accent1">
+              <a:shade val="50000"/>
+            </a:schemeClr>
+          </a:lnRef>
+          <a:fillRef idx="1">
+            <a:schemeClr val="accent1"/>
+          </a:fillRef>
+          <a:effectRef idx="0">
+            <a:schemeClr val="accent1"/>
+          </a:effectRef>
+          <a:fontRef idx="minor">
+            <a:schemeClr val="lt1"/>
+          </a:fontRef>
+        </p:style>
+        <p:txBody>
+          <a:bodyPr lIns="338328"/>
+          <a:lstStyle/>
+          <a:p>
+            <a:pPr eaLnBrk="1" fontAlgn="auto" hangingPunct="1">
+              <a:spcBef>
+                <a:spcPts val="0"/>
+              </a:spcBef>
+              <a:spcAft>
+                <a:spcPts val="0"/>
+              </a:spcAft>
+              <a:defRPr/>
+            </a:pPr>
+            <a:r>
+              <a:rPr lang="en-US" sz="1200" dirty="0">
+                <a:solidFill>
+                  <a:srgbClr val="5B9CD5"/>
+                </a:solidFill>
+                <a:latin typeface="Arial" panose="020B0604020202020204" pitchFamily="34" charset="0"/>
+                <a:cs typeface="Arial" panose="020B0604020202020204" pitchFamily="34" charset="0"/>
+              </a:rPr>
+              <a:t>Private subnet</a:t>
+            </a:r>
+          </a:p>
+        </p:txBody>
+      </p:sp>
+      <p:pic>
+        <p:nvPicPr>
+          <p:cNvPr id="32" name="Graphic 17">
+            <a:extLst>
+              <a:ext uri="{FF2B5EF4-FFF2-40B4-BE49-F238E27FC236}">
+                <a16:creationId xmlns:a16="http://schemas.microsoft.com/office/drawing/2014/main" id="{8560CB5F-EA6E-8949-B816-4A4E6FE52E1E}"/>
+              </a:ext>
+            </a:extLst>
+          </p:cNvPr>
+          <p:cNvPicPr>
+            <a:picLocks noChangeAspect="1" noChangeArrowheads="1"/>
+          </p:cNvPicPr>
+          <p:nvPr/>
+        </p:nvPicPr>
+        <p:blipFill>
+          <a:blip r:embed="rId2" cstate="print">
+            <a:extLst>
+              <a:ext uri="{28A0092B-C50C-407E-A947-70E740481C1C}">
+                <a14:useLocalDpi xmlns:a14="http://schemas.microsoft.com/office/drawing/2010/main" val="0"/>
+              </a:ext>
+            </a:extLst>
+          </a:blip>
+          <a:srcRect/>
+          <a:stretch>
+            <a:fillRect/>
+          </a:stretch>
+        </p:blipFill>
+        <p:spPr bwMode="auto">
+          <a:xfrm>
+            <a:off x="6719820" y="4444596"/>
+            <a:ext cx="469900" cy="469900"/>
+          </a:xfrm>
+          <a:prstGeom prst="rect">
+            <a:avLst/>
+          </a:prstGeom>
+          <a:noFill/>
+          <a:ln>
+            <a:noFill/>
+          </a:ln>
+          <a:extLst>
+            <a:ext uri="{909E8E84-426E-40DD-AFC4-6F175D3DCCD1}">
+              <a14:hiddenFill xmlns:a14="http://schemas.microsoft.com/office/drawing/2010/main">
+                <a:solidFill>
+                  <a:srgbClr val="FFFFFF"/>
+                </a:solidFill>
+              </a14:hiddenFill>
+            </a:ext>
+            <a:ext uri="{91240B29-F687-4F45-9708-019B960494DF}">
+              <a14:hiddenLine xmlns:a14="http://schemas.microsoft.com/office/drawing/2010/main" w="9525">
+                <a:solidFill>
+                  <a:srgbClr val="000000"/>
+                </a:solidFill>
+                <a:miter lim="800000"/>
+                <a:headEnd/>
+                <a:tailEnd/>
+              </a14:hiddenLine>
+            </a:ext>
+          </a:extLst>
+        </p:spPr>
+      </p:pic>
+      <p:sp>
+        <p:nvSpPr>
+          <p:cNvPr id="33" name="TextBox 18">
+            <a:extLst>
+              <a:ext uri="{FF2B5EF4-FFF2-40B4-BE49-F238E27FC236}">
+                <a16:creationId xmlns:a16="http://schemas.microsoft.com/office/drawing/2014/main" id="{2E075880-4C60-1845-A45C-A49F05E20DD1}"/>
+              </a:ext>
+            </a:extLst>
+          </p:cNvPr>
+          <p:cNvSpPr txBox="1">
+            <a:spLocks noChangeArrowheads="1"/>
+          </p:cNvSpPr>
+          <p:nvPr/>
+        </p:nvSpPr>
+        <p:spPr bwMode="auto">
+          <a:xfrm>
+            <a:off x="6051915" y="4904532"/>
+            <a:ext cx="1805711" cy="276999"/>
+          </a:xfrm>
+          <a:prstGeom prst="rect">
+            <a:avLst/>
+          </a:prstGeom>
+          <a:noFill/>
+          <a:ln>
+            <a:noFill/>
+          </a:ln>
+          <a:extLst>
+            <a:ext uri="{909E8E84-426E-40DD-AFC4-6F175D3DCCD1}">
+              <a14:hiddenFill xmlns:a14="http://schemas.microsoft.com/office/drawing/2010/main">
+                <a:solidFill>
+                  <a:srgbClr val="FFFFFF"/>
+                </a:solidFill>
+              </a14:hiddenFill>
+            </a:ext>
+            <a:ext uri="{91240B29-F687-4F45-9708-019B960494DF}">
+              <a14:hiddenLine xmlns:a14="http://schemas.microsoft.com/office/drawing/2010/main" w="9525">
+                <a:solidFill>
+                  <a:srgbClr val="000000"/>
+                </a:solidFill>
+                <a:miter lim="800000"/>
+                <a:headEnd/>
+                <a:tailEnd/>
+              </a14:hiddenLine>
+            </a:ext>
+          </a:extLst>
+        </p:spPr>
+        <p:txBody>
+          <a:bodyPr wrap="square">
+            <a:spAutoFit/>
+          </a:bodyPr>
+          <a:lstStyle>
+            <a:lvl1pPr>
+              <a:defRPr>
+                <a:solidFill>
+                  <a:schemeClr val="tx1"/>
+                </a:solidFill>
+                <a:latin typeface="Calibri" panose="020F0502020204030204" pitchFamily="34" charset="0"/>
+              </a:defRPr>
+            </a:lvl1pPr>
+            <a:lvl2pPr marL="742950" indent="-285750">
+              <a:defRPr>
+                <a:solidFill>
+                  <a:schemeClr val="tx1"/>
+                </a:solidFill>
+                <a:latin typeface="Calibri" panose="020F0502020204030204" pitchFamily="34" charset="0"/>
+              </a:defRPr>
+            </a:lvl2pPr>
+            <a:lvl3pPr marL="1143000" indent="-228600">
+              <a:defRPr>
+                <a:solidFill>
+                  <a:schemeClr val="tx1"/>
+                </a:solidFill>
+                <a:latin typeface="Calibri" panose="020F0502020204030204" pitchFamily="34" charset="0"/>
+              </a:defRPr>
+            </a:lvl3pPr>
+            <a:lvl4pPr marL="1600200" indent="-228600">
+              <a:defRPr>
+                <a:solidFill>
+                  <a:schemeClr val="tx1"/>
+                </a:solidFill>
+                <a:latin typeface="Calibri" panose="020F0502020204030204" pitchFamily="34" charset="0"/>
+              </a:defRPr>
+            </a:lvl4pPr>
+            <a:lvl5pPr marL="2057400" indent="-228600">
+              <a:defRPr>
+                <a:solidFill>
+                  <a:schemeClr val="tx1"/>
+                </a:solidFill>
+                <a:latin typeface="Calibri" panose="020F0502020204030204" pitchFamily="34" charset="0"/>
+              </a:defRPr>
+            </a:lvl5pPr>
+            <a:lvl6pPr marL="2514600" indent="-228600" eaLnBrk="0" fontAlgn="base" hangingPunct="0">
+              <a:spcBef>
+                <a:spcPct val="0"/>
+              </a:spcBef>
+              <a:spcAft>
+                <a:spcPct val="0"/>
+              </a:spcAft>
+              <a:defRPr>
+                <a:solidFill>
+                  <a:schemeClr val="tx1"/>
+                </a:solidFill>
+                <a:latin typeface="Calibri" panose="020F0502020204030204" pitchFamily="34" charset="0"/>
+              </a:defRPr>
+            </a:lvl6pPr>
+            <a:lvl7pPr marL="2971800" indent="-228600" eaLnBrk="0" fontAlgn="base" hangingPunct="0">
+              <a:spcBef>
+                <a:spcPct val="0"/>
+              </a:spcBef>
+              <a:spcAft>
+                <a:spcPct val="0"/>
+              </a:spcAft>
+              <a:defRPr>
+                <a:solidFill>
+                  <a:schemeClr val="tx1"/>
+                </a:solidFill>
+                <a:latin typeface="Calibri" panose="020F0502020204030204" pitchFamily="34" charset="0"/>
+              </a:defRPr>
+            </a:lvl7pPr>
+            <a:lvl8pPr marL="3429000" indent="-228600" eaLnBrk="0" fontAlgn="base" hangingPunct="0">
+              <a:spcBef>
+                <a:spcPct val="0"/>
+              </a:spcBef>
+              <a:spcAft>
+                <a:spcPct val="0"/>
+              </a:spcAft>
+              <a:defRPr>
+                <a:solidFill>
+                  <a:schemeClr val="tx1"/>
+                </a:solidFill>
+                <a:latin typeface="Calibri" panose="020F0502020204030204" pitchFamily="34" charset="0"/>
+              </a:defRPr>
+            </a:lvl8pPr>
+            <a:lvl9pPr marL="3886200" indent="-228600" eaLnBrk="0" fontAlgn="base" hangingPunct="0">
+              <a:spcBef>
+                <a:spcPct val="0"/>
+              </a:spcBef>
+              <a:spcAft>
+                <a:spcPct val="0"/>
+              </a:spcAft>
+              <a:defRPr>
+                <a:solidFill>
+                  <a:schemeClr val="tx1"/>
+                </a:solidFill>
+                <a:latin typeface="Calibri" panose="020F0502020204030204" pitchFamily="34" charset="0"/>
+              </a:defRPr>
+            </a:lvl9pPr>
+          </a:lstStyle>
+          <a:p>
+            <a:pPr algn="ctr" eaLnBrk="1" hangingPunct="1"/>
+            <a:r>
+              <a:rPr lang="en-US" altLang="en-US" sz="1200" dirty="0" smtClean="0">
+                <a:latin typeface="Arial" panose="020B0604020202020204" pitchFamily="34" charset="0"/>
+                <a:cs typeface="Arial" panose="020B0604020202020204" pitchFamily="34" charset="0"/>
+              </a:rPr>
+              <a:t>Darktrace vSensor</a:t>
+            </a:r>
+            <a:endParaRPr lang="en-US" altLang="en-US" sz="1200" dirty="0">
+              <a:latin typeface="Arial" panose="020B0604020202020204" pitchFamily="34" charset="0"/>
+              <a:cs typeface="Arial" panose="020B0604020202020204" pitchFamily="34" charset="0"/>
+            </a:endParaRPr>
+          </a:p>
+        </p:txBody>
+      </p:sp>
+      <p:pic>
+        <p:nvPicPr>
+          <p:cNvPr id="34" name="Graphic 35">
+            <a:extLst>
+              <a:ext uri="{FF2B5EF4-FFF2-40B4-BE49-F238E27FC236}">
+                <a16:creationId xmlns:a16="http://schemas.microsoft.com/office/drawing/2014/main" id="{6FC3D56A-1081-9B43-9B9C-251CDE8593F4}"/>
+              </a:ext>
+            </a:extLst>
+          </p:cNvPr>
+          <p:cNvPicPr>
+            <a:picLocks noChangeAspect="1" noChangeArrowheads="1"/>
+          </p:cNvPicPr>
+          <p:nvPr/>
+        </p:nvPicPr>
+        <p:blipFill>
+          <a:blip r:embed="rId3" cstate="print">
+            <a:extLst>
+              <a:ext uri="{28A0092B-C50C-407E-A947-70E740481C1C}">
+                <a14:useLocalDpi xmlns:a14="http://schemas.microsoft.com/office/drawing/2010/main" val="0"/>
+              </a:ext>
+            </a:extLst>
+          </a:blip>
+          <a:srcRect/>
+          <a:stretch>
+            <a:fillRect/>
+          </a:stretch>
+        </p:blipFill>
+        <p:spPr bwMode="auto">
+          <a:xfrm>
+            <a:off x="6131105" y="3334157"/>
+            <a:ext cx="274637" cy="274638"/>
+          </a:xfrm>
+          <a:prstGeom prst="rect">
+            <a:avLst/>
+          </a:prstGeom>
+          <a:noFill/>
+          <a:ln>
+            <a:noFill/>
+          </a:ln>
+          <a:extLst>
+            <a:ext uri="{909E8E84-426E-40DD-AFC4-6F175D3DCCD1}">
+              <a14:hiddenFill xmlns:a14="http://schemas.microsoft.com/office/drawing/2010/main">
+                <a:solidFill>
+                  <a:srgbClr val="FFFFFF"/>
+                </a:solidFill>
+              </a14:hiddenFill>
+            </a:ext>
+            <a:ext uri="{91240B29-F687-4F45-9708-019B960494DF}">
+              <a14:hiddenLine xmlns:a14="http://schemas.microsoft.com/office/drawing/2010/main" w="9525">
+                <a:solidFill>
+                  <a:srgbClr val="000000"/>
+                </a:solidFill>
+                <a:miter lim="800000"/>
+                <a:headEnd/>
+                <a:tailEnd/>
+              </a14:hiddenLine>
+            </a:ext>
+          </a:extLst>
+        </p:spPr>
+      </p:pic>
+      <p:sp>
+        <p:nvSpPr>
+          <p:cNvPr id="54" name="Rectangle 53">
+            <a:extLst>
+              <a:ext uri="{FF2B5EF4-FFF2-40B4-BE49-F238E27FC236}">
+                <a16:creationId xmlns:a16="http://schemas.microsoft.com/office/drawing/2014/main" id="{B1844CBB-737E-C049-891C-1F2168761D96}"/>
+              </a:ext>
+            </a:extLst>
+          </p:cNvPr>
+          <p:cNvSpPr/>
+          <p:nvPr/>
+        </p:nvSpPr>
+        <p:spPr>
+          <a:xfrm>
+            <a:off x="6131810" y="1723570"/>
+            <a:ext cx="1645920" cy="1382333"/>
+          </a:xfrm>
+          <a:prstGeom prst="rect">
+            <a:avLst/>
+          </a:prstGeom>
+          <a:solidFill>
+            <a:srgbClr val="1D8900">
+              <a:alpha val="9804"/>
+            </a:srgbClr>
+          </a:solidFill>
+          <a:ln w="12700">
+            <a:noFill/>
+            <a:prstDash val="dash"/>
+          </a:ln>
+        </p:spPr>
+        <p:style>
+          <a:lnRef idx="2">
+            <a:schemeClr val="accent1">
+              <a:shade val="50000"/>
+            </a:schemeClr>
+          </a:lnRef>
+          <a:fillRef idx="1">
+            <a:schemeClr val="accent1"/>
+          </a:fillRef>
+          <a:effectRef idx="0">
+            <a:schemeClr val="accent1"/>
+          </a:effectRef>
+          <a:fontRef idx="minor">
+            <a:schemeClr val="lt1"/>
+          </a:fontRef>
+        </p:style>
+        <p:txBody>
+          <a:bodyPr lIns="338328"/>
+          <a:lstStyle/>
+          <a:p>
+            <a:pPr eaLnBrk="1" fontAlgn="auto" hangingPunct="1">
+              <a:spcBef>
+                <a:spcPts val="0"/>
+              </a:spcBef>
+              <a:spcAft>
+                <a:spcPts val="0"/>
+              </a:spcAft>
+              <a:defRPr/>
+            </a:pPr>
+            <a:r>
+              <a:rPr lang="en-US" sz="1200" dirty="0">
+                <a:solidFill>
+                  <a:srgbClr val="1E8900"/>
+                </a:solidFill>
+                <a:latin typeface="Arial" panose="020B0604020202020204" pitchFamily="34" charset="0"/>
+                <a:cs typeface="Arial" panose="020B0604020202020204" pitchFamily="34" charset="0"/>
+              </a:rPr>
+              <a:t>Public subnet</a:t>
+            </a:r>
+          </a:p>
+        </p:txBody>
+      </p:sp>
+      <p:pic>
+        <p:nvPicPr>
+          <p:cNvPr id="55" name="Graphic 34">
+            <a:extLst>
+              <a:ext uri="{FF2B5EF4-FFF2-40B4-BE49-F238E27FC236}">
+                <a16:creationId xmlns:a16="http://schemas.microsoft.com/office/drawing/2014/main" id="{41905C5A-FAE4-854F-8D41-4C3BCF9EA0F6}"/>
+              </a:ext>
+            </a:extLst>
+          </p:cNvPr>
+          <p:cNvPicPr>
+            <a:picLocks noChangeAspect="1" noChangeArrowheads="1"/>
+          </p:cNvPicPr>
+          <p:nvPr/>
+        </p:nvPicPr>
+        <p:blipFill>
+          <a:blip r:embed="rId4" cstate="print">
+            <a:extLst>
+              <a:ext uri="{28A0092B-C50C-407E-A947-70E740481C1C}">
+                <a14:useLocalDpi xmlns:a14="http://schemas.microsoft.com/office/drawing/2010/main" val="0"/>
+              </a:ext>
+            </a:extLst>
+          </a:blip>
+          <a:srcRect/>
+          <a:stretch>
+            <a:fillRect/>
+          </a:stretch>
+        </p:blipFill>
+        <p:spPr bwMode="auto">
+          <a:xfrm>
+            <a:off x="6131105" y="1720856"/>
+            <a:ext cx="274638" cy="274638"/>
+          </a:xfrm>
+          <a:prstGeom prst="rect">
+            <a:avLst/>
+          </a:prstGeom>
+          <a:noFill/>
+          <a:ln>
+            <a:noFill/>
+          </a:ln>
+          <a:extLst>
+            <a:ext uri="{909E8E84-426E-40DD-AFC4-6F175D3DCCD1}">
+              <a14:hiddenFill xmlns:a14="http://schemas.microsoft.com/office/drawing/2010/main">
+                <a:solidFill>
+                  <a:srgbClr val="FFFFFF"/>
+                </a:solidFill>
+              </a14:hiddenFill>
+            </a:ext>
+            <a:ext uri="{91240B29-F687-4F45-9708-019B960494DF}">
+              <a14:hiddenLine xmlns:a14="http://schemas.microsoft.com/office/drawing/2010/main" w="9525">
+                <a:solidFill>
+                  <a:srgbClr val="000000"/>
+                </a:solidFill>
+                <a:miter lim="800000"/>
+                <a:headEnd/>
+                <a:tailEnd/>
+              </a14:hiddenLine>
+            </a:ext>
+          </a:extLst>
+        </p:spPr>
+      </p:pic>
+      <p:pic>
+        <p:nvPicPr>
+          <p:cNvPr id="62" name="Graphic 17">
+            <a:extLst>
+              <a:ext uri="{FF2B5EF4-FFF2-40B4-BE49-F238E27FC236}">
+                <a16:creationId xmlns:a16="http://schemas.microsoft.com/office/drawing/2014/main" id="{8560CB5F-EA6E-8949-B816-4A4E6FE52E1E}"/>
+              </a:ext>
+            </a:extLst>
+          </p:cNvPr>
+          <p:cNvPicPr>
+            <a:picLocks noChangeAspect="1" noChangeArrowheads="1"/>
+          </p:cNvPicPr>
+          <p:nvPr/>
+        </p:nvPicPr>
+        <p:blipFill>
+          <a:blip r:embed="rId2" cstate="print">
+            <a:extLst>
+              <a:ext uri="{28A0092B-C50C-407E-A947-70E740481C1C}">
+                <a14:useLocalDpi xmlns:a14="http://schemas.microsoft.com/office/drawing/2010/main" val="0"/>
+              </a:ext>
+            </a:extLst>
+          </a:blip>
+          <a:srcRect/>
+          <a:stretch>
+            <a:fillRect/>
+          </a:stretch>
+        </p:blipFill>
+        <p:spPr bwMode="auto">
+          <a:xfrm>
+            <a:off x="6719820" y="2193879"/>
+            <a:ext cx="469900" cy="469900"/>
+          </a:xfrm>
+          <a:prstGeom prst="rect">
+            <a:avLst/>
+          </a:prstGeom>
+          <a:noFill/>
+          <a:ln>
+            <a:noFill/>
+          </a:ln>
+          <a:extLst>
+            <a:ext uri="{909E8E84-426E-40DD-AFC4-6F175D3DCCD1}">
+              <a14:hiddenFill xmlns:a14="http://schemas.microsoft.com/office/drawing/2010/main">
+                <a:solidFill>
+                  <a:srgbClr val="FFFFFF"/>
+                </a:solidFill>
+              </a14:hiddenFill>
+            </a:ext>
+            <a:ext uri="{91240B29-F687-4F45-9708-019B960494DF}">
+              <a14:hiddenLine xmlns:a14="http://schemas.microsoft.com/office/drawing/2010/main" w="9525">
+                <a:solidFill>
+                  <a:srgbClr val="000000"/>
+                </a:solidFill>
+                <a:miter lim="800000"/>
+                <a:headEnd/>
+                <a:tailEnd/>
+              </a14:hiddenLine>
+            </a:ext>
+          </a:extLst>
+        </p:spPr>
+      </p:pic>
+      <p:sp>
+        <p:nvSpPr>
+          <p:cNvPr id="63" name="TextBox 18">
+            <a:extLst>
+              <a:ext uri="{FF2B5EF4-FFF2-40B4-BE49-F238E27FC236}">
+                <a16:creationId xmlns:a16="http://schemas.microsoft.com/office/drawing/2014/main" id="{2E075880-4C60-1845-A45C-A49F05E20DD1}"/>
+              </a:ext>
+            </a:extLst>
+          </p:cNvPr>
+          <p:cNvSpPr txBox="1">
+            <a:spLocks noChangeArrowheads="1"/>
+          </p:cNvSpPr>
+          <p:nvPr/>
+        </p:nvSpPr>
+        <p:spPr bwMode="auto">
+          <a:xfrm>
+            <a:off x="6216105" y="2637417"/>
+            <a:ext cx="1477330" cy="286820"/>
+          </a:xfrm>
+          <a:prstGeom prst="rect">
+            <a:avLst/>
+          </a:prstGeom>
+          <a:noFill/>
+          <a:ln>
+            <a:noFill/>
+          </a:ln>
+          <a:extLst>
+            <a:ext uri="{909E8E84-426E-40DD-AFC4-6F175D3DCCD1}">
+              <a14:hiddenFill xmlns:a14="http://schemas.microsoft.com/office/drawing/2010/main">
+                <a:solidFill>
+                  <a:srgbClr val="FFFFFF"/>
+                </a:solidFill>
+              </a14:hiddenFill>
+            </a:ext>
+            <a:ext uri="{91240B29-F687-4F45-9708-019B960494DF}">
+              <a14:hiddenLine xmlns:a14="http://schemas.microsoft.com/office/drawing/2010/main" w="9525">
+                <a:solidFill>
+                  <a:srgbClr val="000000"/>
+                </a:solidFill>
+                <a:miter lim="800000"/>
+                <a:headEnd/>
+                <a:tailEnd/>
+              </a14:hiddenLine>
+            </a:ext>
+          </a:extLst>
+        </p:spPr>
+        <p:txBody>
+          <a:bodyPr wrap="square">
+            <a:spAutoFit/>
+          </a:bodyPr>
+          <a:lstStyle>
+            <a:lvl1pPr>
+              <a:defRPr>
+                <a:solidFill>
+                  <a:schemeClr val="tx1"/>
+                </a:solidFill>
+                <a:latin typeface="Calibri" panose="020F0502020204030204" pitchFamily="34" charset="0"/>
+              </a:defRPr>
+            </a:lvl1pPr>
+            <a:lvl2pPr marL="742950" indent="-285750">
+              <a:defRPr>
+                <a:solidFill>
+                  <a:schemeClr val="tx1"/>
+                </a:solidFill>
+                <a:latin typeface="Calibri" panose="020F0502020204030204" pitchFamily="34" charset="0"/>
+              </a:defRPr>
+            </a:lvl2pPr>
+            <a:lvl3pPr marL="1143000" indent="-228600">
+              <a:defRPr>
+                <a:solidFill>
+                  <a:schemeClr val="tx1"/>
+                </a:solidFill>
+                <a:latin typeface="Calibri" panose="020F0502020204030204" pitchFamily="34" charset="0"/>
+              </a:defRPr>
+            </a:lvl3pPr>
+            <a:lvl4pPr marL="1600200" indent="-228600">
+              <a:defRPr>
+                <a:solidFill>
+                  <a:schemeClr val="tx1"/>
+                </a:solidFill>
+                <a:latin typeface="Calibri" panose="020F0502020204030204" pitchFamily="34" charset="0"/>
+              </a:defRPr>
+            </a:lvl4pPr>
+            <a:lvl5pPr marL="2057400" indent="-228600">
+              <a:defRPr>
+                <a:solidFill>
+                  <a:schemeClr val="tx1"/>
+                </a:solidFill>
+                <a:latin typeface="Calibri" panose="020F0502020204030204" pitchFamily="34" charset="0"/>
+              </a:defRPr>
+            </a:lvl5pPr>
+            <a:lvl6pPr marL="2514600" indent="-228600" eaLnBrk="0" fontAlgn="base" hangingPunct="0">
+              <a:spcBef>
+                <a:spcPct val="0"/>
+              </a:spcBef>
+              <a:spcAft>
+                <a:spcPct val="0"/>
+              </a:spcAft>
+              <a:defRPr>
+                <a:solidFill>
+                  <a:schemeClr val="tx1"/>
+                </a:solidFill>
+                <a:latin typeface="Calibri" panose="020F0502020204030204" pitchFamily="34" charset="0"/>
+              </a:defRPr>
+            </a:lvl6pPr>
+            <a:lvl7pPr marL="2971800" indent="-228600" eaLnBrk="0" fontAlgn="base" hangingPunct="0">
+              <a:spcBef>
+                <a:spcPct val="0"/>
+              </a:spcBef>
+              <a:spcAft>
+                <a:spcPct val="0"/>
+              </a:spcAft>
+              <a:defRPr>
+                <a:solidFill>
+                  <a:schemeClr val="tx1"/>
+                </a:solidFill>
+                <a:latin typeface="Calibri" panose="020F0502020204030204" pitchFamily="34" charset="0"/>
+              </a:defRPr>
+            </a:lvl7pPr>
+            <a:lvl8pPr marL="3429000" indent="-228600" eaLnBrk="0" fontAlgn="base" hangingPunct="0">
+              <a:spcBef>
+                <a:spcPct val="0"/>
+              </a:spcBef>
+              <a:spcAft>
+                <a:spcPct val="0"/>
+              </a:spcAft>
+              <a:defRPr>
+                <a:solidFill>
+                  <a:schemeClr val="tx1"/>
+                </a:solidFill>
+                <a:latin typeface="Calibri" panose="020F0502020204030204" pitchFamily="34" charset="0"/>
+              </a:defRPr>
+            </a:lvl8pPr>
+            <a:lvl9pPr marL="3886200" indent="-228600" eaLnBrk="0" fontAlgn="base" hangingPunct="0">
+              <a:spcBef>
+                <a:spcPct val="0"/>
+              </a:spcBef>
+              <a:spcAft>
+                <a:spcPct val="0"/>
+              </a:spcAft>
+              <a:defRPr>
+                <a:solidFill>
+                  <a:schemeClr val="tx1"/>
+                </a:solidFill>
+                <a:latin typeface="Calibri" panose="020F0502020204030204" pitchFamily="34" charset="0"/>
+              </a:defRPr>
+            </a:lvl9pPr>
+          </a:lstStyle>
+          <a:p>
+            <a:pPr algn="ctr" eaLnBrk="1" hangingPunct="1"/>
+            <a:r>
+              <a:rPr lang="en-US" altLang="en-US" sz="1200" dirty="0" smtClean="0">
+                <a:latin typeface="Arial" panose="020B0604020202020204" pitchFamily="34" charset="0"/>
+                <a:cs typeface="Arial" panose="020B0604020202020204" pitchFamily="34" charset="0"/>
+              </a:rPr>
+              <a:t>Linux bastion host</a:t>
+            </a:r>
+            <a:endParaRPr lang="en-US" altLang="en-US" sz="1200" dirty="0">
+              <a:latin typeface="Arial" panose="020B0604020202020204" pitchFamily="34" charset="0"/>
+              <a:cs typeface="Arial" panose="020B0604020202020204" pitchFamily="34" charset="0"/>
+            </a:endParaRPr>
+          </a:p>
+        </p:txBody>
+      </p:sp>
+      <p:sp>
+        <p:nvSpPr>
+          <p:cNvPr id="76" name="Rectangle 75">
+            <a:extLst>
+              <a:ext uri="{FF2B5EF4-FFF2-40B4-BE49-F238E27FC236}">
+                <a16:creationId xmlns:a16="http://schemas.microsoft.com/office/drawing/2014/main" id="{0356EB0E-773F-E048-9282-D7A38A3BC486}"/>
+              </a:ext>
+            </a:extLst>
+          </p:cNvPr>
+          <p:cNvSpPr/>
+          <p:nvPr/>
+        </p:nvSpPr>
+        <p:spPr bwMode="auto">
+          <a:xfrm>
+            <a:off x="2489863" y="1135116"/>
+            <a:ext cx="2095500" cy="4445875"/>
+          </a:xfrm>
+          <a:prstGeom prst="rect">
+            <a:avLst/>
+          </a:prstGeom>
+          <a:noFill/>
+          <a:ln w="12700">
+            <a:solidFill>
+              <a:srgbClr val="5B9CD5"/>
+            </a:solidFill>
+            <a:prstDash val="dash"/>
+          </a:ln>
+        </p:spPr>
+        <p:style>
+          <a:lnRef idx="2">
+            <a:schemeClr val="accent1">
+              <a:shade val="50000"/>
+            </a:schemeClr>
+          </a:lnRef>
+          <a:fillRef idx="1">
+            <a:schemeClr val="accent1"/>
+          </a:fillRef>
+          <a:effectRef idx="0">
+            <a:schemeClr val="accent1"/>
+          </a:effectRef>
+          <a:fontRef idx="minor">
+            <a:schemeClr val="lt1"/>
+          </a:fontRef>
+        </p:style>
+        <p:txBody>
+          <a:bodyPr tIns="91440"/>
+          <a:lstStyle/>
+          <a:p>
+            <a:pPr algn="ctr" eaLnBrk="1" fontAlgn="auto" hangingPunct="1">
+              <a:spcBef>
+                <a:spcPts val="0"/>
+              </a:spcBef>
+              <a:spcAft>
+                <a:spcPts val="0"/>
+              </a:spcAft>
+              <a:defRPr/>
+            </a:pPr>
+            <a:r>
+              <a:rPr lang="en-US" sz="1200" dirty="0">
+                <a:solidFill>
+                  <a:srgbClr val="5B9CD5"/>
+                </a:solidFill>
+                <a:latin typeface="Arial" panose="020B0604020202020204" pitchFamily="34" charset="0"/>
+                <a:cs typeface="Arial" panose="020B0604020202020204" pitchFamily="34" charset="0"/>
+              </a:rPr>
+              <a:t>Availability </a:t>
+            </a:r>
+            <a:r>
+              <a:rPr lang="en-US" sz="1200" dirty="0" smtClean="0">
+                <a:solidFill>
+                  <a:srgbClr val="5B9CD5"/>
+                </a:solidFill>
+                <a:latin typeface="Arial" panose="020B0604020202020204" pitchFamily="34" charset="0"/>
+                <a:cs typeface="Arial" panose="020B0604020202020204" pitchFamily="34" charset="0"/>
+              </a:rPr>
+              <a:t>Zone 1</a:t>
+            </a:r>
+            <a:endParaRPr lang="en-US" sz="1200" dirty="0">
+              <a:solidFill>
+                <a:srgbClr val="5B9CD5"/>
+              </a:solidFill>
+              <a:latin typeface="Arial" panose="020B0604020202020204" pitchFamily="34" charset="0"/>
+              <a:cs typeface="Arial" panose="020B0604020202020204" pitchFamily="34" charset="0"/>
+            </a:endParaRPr>
+          </a:p>
+        </p:txBody>
+      </p:sp>
+      <p:sp>
+        <p:nvSpPr>
+          <p:cNvPr id="102" name="Rectangle 101">
+            <a:extLst>
+              <a:ext uri="{FF2B5EF4-FFF2-40B4-BE49-F238E27FC236}">
+                <a16:creationId xmlns:a16="http://schemas.microsoft.com/office/drawing/2014/main" id="{39EEFFD5-B07A-CD4C-A9C4-8DBFAB9447D6}"/>
+              </a:ext>
+            </a:extLst>
+          </p:cNvPr>
+          <p:cNvSpPr/>
+          <p:nvPr/>
+        </p:nvSpPr>
+        <p:spPr>
+          <a:xfrm>
+            <a:off x="2798948" y="2146180"/>
+            <a:ext cx="4894487" cy="787744"/>
+          </a:xfrm>
+          <a:prstGeom prst="rect">
+            <a:avLst/>
+          </a:prstGeom>
+          <a:noFill/>
+          <a:ln w="12700">
+            <a:solidFill>
+              <a:srgbClr val="D86613"/>
+            </a:solidFill>
+            <a:prstDash val="dash"/>
+          </a:ln>
+        </p:spPr>
+        <p:style>
+          <a:lnRef idx="2">
+            <a:schemeClr val="accent1">
+              <a:shade val="50000"/>
+            </a:schemeClr>
+          </a:lnRef>
+          <a:fillRef idx="1">
+            <a:schemeClr val="accent1"/>
+          </a:fillRef>
+          <a:effectRef idx="0">
+            <a:schemeClr val="accent1"/>
+          </a:effectRef>
+          <a:fontRef idx="minor">
+            <a:schemeClr val="lt1"/>
+          </a:fontRef>
+        </p:style>
+        <p:txBody>
+          <a:bodyPr tIns="91440"/>
+          <a:lstStyle/>
+          <a:p>
+            <a:pPr algn="ctr" eaLnBrk="1" fontAlgn="auto" hangingPunct="1">
+              <a:spcBef>
+                <a:spcPts val="0"/>
+              </a:spcBef>
+              <a:spcAft>
+                <a:spcPts val="0"/>
+              </a:spcAft>
+              <a:defRPr/>
+            </a:pPr>
+            <a:endParaRPr lang="en-US" sz="1200" dirty="0">
+              <a:solidFill>
+                <a:srgbClr val="D86613"/>
+              </a:solidFill>
+              <a:latin typeface="Arial" panose="020B0604020202020204" pitchFamily="34" charset="0"/>
+              <a:cs typeface="Arial" panose="020B0604020202020204" pitchFamily="34" charset="0"/>
+            </a:endParaRPr>
+          </a:p>
+          <a:p>
+            <a:pPr algn="ctr" eaLnBrk="1" fontAlgn="auto" hangingPunct="1">
+              <a:spcBef>
+                <a:spcPts val="0"/>
+              </a:spcBef>
+              <a:spcAft>
+                <a:spcPts val="0"/>
+              </a:spcAft>
+              <a:defRPr/>
+            </a:pPr>
+            <a:endParaRPr lang="en-US" sz="1200" dirty="0">
+              <a:solidFill>
+                <a:srgbClr val="D86613"/>
+              </a:solidFill>
+              <a:latin typeface="Arial" panose="020B0604020202020204" pitchFamily="34" charset="0"/>
+              <a:cs typeface="Arial" panose="020B0604020202020204" pitchFamily="34" charset="0"/>
+            </a:endParaRPr>
+          </a:p>
+          <a:p>
+            <a:pPr algn="ctr" eaLnBrk="1" fontAlgn="auto" hangingPunct="1">
+              <a:spcBef>
+                <a:spcPts val="0"/>
+              </a:spcBef>
+              <a:spcAft>
+                <a:spcPts val="0"/>
+              </a:spcAft>
+              <a:defRPr/>
+            </a:pPr>
+            <a:r>
+              <a:rPr lang="en-US" sz="1200" dirty="0">
+                <a:solidFill>
+                  <a:srgbClr val="D86613"/>
+                </a:solidFill>
+                <a:latin typeface="Arial" panose="020B0604020202020204" pitchFamily="34" charset="0"/>
+                <a:cs typeface="Arial" panose="020B0604020202020204" pitchFamily="34" charset="0"/>
+              </a:rPr>
+              <a:t>Auto Scaling group</a:t>
+            </a:r>
+          </a:p>
+        </p:txBody>
+      </p:sp>
+      <p:pic>
+        <p:nvPicPr>
+          <p:cNvPr id="103" name="Graphic 18">
+            <a:extLst>
+              <a:ext uri="{FF2B5EF4-FFF2-40B4-BE49-F238E27FC236}">
+                <a16:creationId xmlns:a16="http://schemas.microsoft.com/office/drawing/2014/main" id="{E0668E3F-1457-E041-A92E-2FF0C60C21C1}"/>
+              </a:ext>
+            </a:extLst>
+          </p:cNvPr>
+          <p:cNvPicPr>
+            <a:picLocks noChangeAspect="1" noChangeArrowheads="1"/>
+          </p:cNvPicPr>
+          <p:nvPr/>
+        </p:nvPicPr>
+        <p:blipFill>
+          <a:blip r:embed="rId6" cstate="print">
+            <a:extLst>
+              <a:ext uri="{28A0092B-C50C-407E-A947-70E740481C1C}">
+                <a14:useLocalDpi xmlns:a14="http://schemas.microsoft.com/office/drawing/2010/main" val="0"/>
+              </a:ext>
+            </a:extLst>
+          </a:blip>
+          <a:srcRect/>
+          <a:stretch>
+            <a:fillRect/>
+          </a:stretch>
+        </p:blipFill>
+        <p:spPr bwMode="auto">
+          <a:xfrm>
+            <a:off x="5117797" y="2142846"/>
+            <a:ext cx="330200" cy="330200"/>
+          </a:xfrm>
+          <a:prstGeom prst="rect">
+            <a:avLst/>
+          </a:prstGeom>
+          <a:noFill/>
+          <a:ln>
+            <a:noFill/>
+          </a:ln>
+          <a:extLst>
+            <a:ext uri="{909E8E84-426E-40DD-AFC4-6F175D3DCCD1}">
+              <a14:hiddenFill xmlns:a14="http://schemas.microsoft.com/office/drawing/2010/main">
+                <a:solidFill>
+                  <a:srgbClr val="FFFFFF"/>
+                </a:solidFill>
+              </a14:hiddenFill>
+            </a:ext>
+            <a:ext uri="{91240B29-F687-4F45-9708-019B960494DF}">
+              <a14:hiddenLine xmlns:a14="http://schemas.microsoft.com/office/drawing/2010/main" w="9525">
+                <a:solidFill>
+                  <a:srgbClr val="000000"/>
+                </a:solidFill>
+                <a:miter lim="800000"/>
+                <a:headEnd/>
+                <a:tailEnd/>
+              </a14:hiddenLine>
+            </a:ext>
+          </a:extLst>
+        </p:spPr>
+      </p:pic>
+      <p:sp>
+        <p:nvSpPr>
+          <p:cNvPr id="41" name="TextBox 17">
+            <a:extLst>
+              <a:ext uri="{FF2B5EF4-FFF2-40B4-BE49-F238E27FC236}">
+                <a16:creationId xmlns:a16="http://schemas.microsoft.com/office/drawing/2014/main" id="{904494F6-B2AD-884E-92AE-5BF2490D7EDB}"/>
+              </a:ext>
+            </a:extLst>
+          </p:cNvPr>
+          <p:cNvSpPr txBox="1">
+            <a:spLocks noChangeArrowheads="1"/>
+          </p:cNvSpPr>
+          <p:nvPr/>
+        </p:nvSpPr>
+        <p:spPr bwMode="auto">
+          <a:xfrm>
+            <a:off x="2920230" y="4076799"/>
+            <a:ext cx="1234766" cy="276999"/>
+          </a:xfrm>
+          <a:prstGeom prst="rect">
+            <a:avLst/>
+          </a:prstGeom>
+          <a:noFill/>
+          <a:ln>
+            <a:noFill/>
+          </a:ln>
+          <a:extLst>
+            <a:ext uri="{909E8E84-426E-40DD-AFC4-6F175D3DCCD1}">
+              <a14:hiddenFill xmlns:a14="http://schemas.microsoft.com/office/drawing/2010/main">
+                <a:solidFill>
+                  <a:srgbClr val="FFFFFF"/>
+                </a:solidFill>
+              </a14:hiddenFill>
+            </a:ext>
+            <a:ext uri="{91240B29-F687-4F45-9708-019B960494DF}">
+              <a14:hiddenLine xmlns:a14="http://schemas.microsoft.com/office/drawing/2010/main" w="9525">
+                <a:solidFill>
+                  <a:srgbClr val="000000"/>
+                </a:solidFill>
+                <a:miter lim="800000"/>
+                <a:headEnd/>
+                <a:tailEnd/>
+              </a14:hiddenLine>
+            </a:ext>
+          </a:extLst>
+        </p:spPr>
+        <p:txBody>
+          <a:bodyPr wrap="square">
+            <a:spAutoFit/>
+          </a:bodyPr>
+          <a:lstStyle>
+            <a:lvl1pPr>
+              <a:defRPr>
+                <a:solidFill>
+                  <a:schemeClr val="tx1"/>
+                </a:solidFill>
+                <a:latin typeface="Calibri" panose="020F0502020204030204" pitchFamily="34" charset="0"/>
+              </a:defRPr>
+            </a:lvl1pPr>
+            <a:lvl2pPr marL="742950" indent="-285750">
+              <a:defRPr>
+                <a:solidFill>
+                  <a:schemeClr val="tx1"/>
+                </a:solidFill>
+                <a:latin typeface="Calibri" panose="020F0502020204030204" pitchFamily="34" charset="0"/>
+              </a:defRPr>
+            </a:lvl2pPr>
+            <a:lvl3pPr marL="1143000" indent="-228600">
+              <a:defRPr>
+                <a:solidFill>
+                  <a:schemeClr val="tx1"/>
+                </a:solidFill>
+                <a:latin typeface="Calibri" panose="020F0502020204030204" pitchFamily="34" charset="0"/>
+              </a:defRPr>
+            </a:lvl3pPr>
+            <a:lvl4pPr marL="1600200" indent="-228600">
+              <a:defRPr>
+                <a:solidFill>
+                  <a:schemeClr val="tx1"/>
+                </a:solidFill>
+                <a:latin typeface="Calibri" panose="020F0502020204030204" pitchFamily="34" charset="0"/>
+              </a:defRPr>
+            </a:lvl4pPr>
+            <a:lvl5pPr marL="2057400" indent="-228600">
+              <a:defRPr>
+                <a:solidFill>
+                  <a:schemeClr val="tx1"/>
+                </a:solidFill>
+                <a:latin typeface="Calibri" panose="020F0502020204030204" pitchFamily="34" charset="0"/>
+              </a:defRPr>
+            </a:lvl5pPr>
+            <a:lvl6pPr marL="2514600" indent="-228600" eaLnBrk="0" fontAlgn="base" hangingPunct="0">
+              <a:spcBef>
+                <a:spcPct val="0"/>
+              </a:spcBef>
+              <a:spcAft>
+                <a:spcPct val="0"/>
+              </a:spcAft>
+              <a:defRPr>
+                <a:solidFill>
+                  <a:schemeClr val="tx1"/>
+                </a:solidFill>
+                <a:latin typeface="Calibri" panose="020F0502020204030204" pitchFamily="34" charset="0"/>
+              </a:defRPr>
+            </a:lvl6pPr>
+            <a:lvl7pPr marL="2971800" indent="-228600" eaLnBrk="0" fontAlgn="base" hangingPunct="0">
+              <a:spcBef>
+                <a:spcPct val="0"/>
+              </a:spcBef>
+              <a:spcAft>
+                <a:spcPct val="0"/>
+              </a:spcAft>
+              <a:defRPr>
+                <a:solidFill>
+                  <a:schemeClr val="tx1"/>
+                </a:solidFill>
+                <a:latin typeface="Calibri" panose="020F0502020204030204" pitchFamily="34" charset="0"/>
+              </a:defRPr>
+            </a:lvl7pPr>
+            <a:lvl8pPr marL="3429000" indent="-228600" eaLnBrk="0" fontAlgn="base" hangingPunct="0">
+              <a:spcBef>
+                <a:spcPct val="0"/>
+              </a:spcBef>
+              <a:spcAft>
+                <a:spcPct val="0"/>
+              </a:spcAft>
+              <a:defRPr>
+                <a:solidFill>
+                  <a:schemeClr val="tx1"/>
+                </a:solidFill>
+                <a:latin typeface="Calibri" panose="020F0502020204030204" pitchFamily="34" charset="0"/>
+              </a:defRPr>
+            </a:lvl8pPr>
+            <a:lvl9pPr marL="3886200" indent="-228600" eaLnBrk="0" fontAlgn="base" hangingPunct="0">
+              <a:spcBef>
+                <a:spcPct val="0"/>
+              </a:spcBef>
+              <a:spcAft>
+                <a:spcPct val="0"/>
+              </a:spcAft>
+              <a:defRPr>
+                <a:solidFill>
+                  <a:schemeClr val="tx1"/>
+                </a:solidFill>
+                <a:latin typeface="Calibri" panose="020F0502020204030204" pitchFamily="34" charset="0"/>
+              </a:defRPr>
+            </a:lvl9pPr>
+          </a:lstStyle>
+          <a:p>
+            <a:pPr algn="ctr" eaLnBrk="1" hangingPunct="1"/>
+            <a:r>
+              <a:rPr lang="en-US" altLang="en-US" sz="1200" dirty="0">
+                <a:latin typeface="Arial" panose="020B0604020202020204" pitchFamily="34" charset="0"/>
+                <a:ea typeface="Amazon Ember" panose="020B0603020204020204" pitchFamily="34" charset="0"/>
+                <a:cs typeface="Arial" panose="020B0604020202020204" pitchFamily="34" charset="0"/>
+              </a:rPr>
+              <a:t>NAT gateway</a:t>
+            </a:r>
+          </a:p>
+        </p:txBody>
+      </p:sp>
+      <p:pic>
+        <p:nvPicPr>
+          <p:cNvPr id="42" name="Graphic 35">
+            <a:extLst>
+              <a:ext uri="{FF2B5EF4-FFF2-40B4-BE49-F238E27FC236}">
+                <a16:creationId xmlns:a16="http://schemas.microsoft.com/office/drawing/2014/main" id="{A5BA7256-6A27-CE46-BA90-6D710A383720}"/>
+              </a:ext>
+            </a:extLst>
+          </p:cNvPr>
+          <p:cNvPicPr>
+            <a:picLocks noChangeAspect="1" noChangeArrowheads="1"/>
+          </p:cNvPicPr>
+          <p:nvPr/>
+        </p:nvPicPr>
+        <p:blipFill>
+          <a:blip r:embed="rId8" cstate="print">
+            <a:extLst>
+              <a:ext uri="{28A0092B-C50C-407E-A947-70E740481C1C}">
+                <a14:useLocalDpi xmlns:a14="http://schemas.microsoft.com/office/drawing/2010/main" val="0"/>
+              </a:ext>
+            </a:extLst>
+          </a:blip>
+          <a:srcRect/>
+          <a:stretch>
+            <a:fillRect/>
+          </a:stretch>
+        </p:blipFill>
+        <p:spPr bwMode="auto">
+          <a:xfrm>
+            <a:off x="3309013" y="3618012"/>
+            <a:ext cx="457200" cy="457200"/>
+          </a:xfrm>
+          <a:prstGeom prst="rect">
+            <a:avLst/>
+          </a:prstGeom>
+          <a:noFill/>
+          <a:ln>
+            <a:noFill/>
+          </a:ln>
+          <a:extLst>
+            <a:ext uri="{909E8E84-426E-40DD-AFC4-6F175D3DCCD1}">
+              <a14:hiddenFill xmlns:a14="http://schemas.microsoft.com/office/drawing/2010/main">
+                <a:solidFill>
+                  <a:srgbClr val="FFFFFF"/>
+                </a:solidFill>
+              </a14:hiddenFill>
+            </a:ext>
+            <a:ext uri="{91240B29-F687-4F45-9708-019B960494DF}">
+              <a14:hiddenLine xmlns:a14="http://schemas.microsoft.com/office/drawing/2010/main" w="9525">
+                <a:solidFill>
+                  <a:srgbClr val="000000"/>
+                </a:solidFill>
+                <a:miter lim="800000"/>
+                <a:headEnd/>
+                <a:tailEnd/>
+              </a14:hiddenLine>
+            </a:ext>
+          </a:extLst>
+        </p:spPr>
+      </p:pic>
+      <p:sp>
+        <p:nvSpPr>
+          <p:cNvPr id="43" name="TextBox 17">
+            <a:extLst>
+              <a:ext uri="{FF2B5EF4-FFF2-40B4-BE49-F238E27FC236}">
+                <a16:creationId xmlns:a16="http://schemas.microsoft.com/office/drawing/2014/main" id="{904494F6-B2AD-884E-92AE-5BF2490D7EDB}"/>
+              </a:ext>
+            </a:extLst>
+          </p:cNvPr>
+          <p:cNvSpPr txBox="1">
+            <a:spLocks noChangeArrowheads="1"/>
+          </p:cNvSpPr>
+          <p:nvPr/>
+        </p:nvSpPr>
+        <p:spPr bwMode="auto">
+          <a:xfrm>
+            <a:off x="6337387" y="4076799"/>
+            <a:ext cx="1234766" cy="276999"/>
+          </a:xfrm>
+          <a:prstGeom prst="rect">
+            <a:avLst/>
+          </a:prstGeom>
+          <a:noFill/>
+          <a:ln>
+            <a:noFill/>
+          </a:ln>
+          <a:extLst>
+            <a:ext uri="{909E8E84-426E-40DD-AFC4-6F175D3DCCD1}">
+              <a14:hiddenFill xmlns:a14="http://schemas.microsoft.com/office/drawing/2010/main">
+                <a:solidFill>
+                  <a:srgbClr val="FFFFFF"/>
+                </a:solidFill>
+              </a14:hiddenFill>
+            </a:ext>
+            <a:ext uri="{91240B29-F687-4F45-9708-019B960494DF}">
+              <a14:hiddenLine xmlns:a14="http://schemas.microsoft.com/office/drawing/2010/main" w="9525">
+                <a:solidFill>
+                  <a:srgbClr val="000000"/>
+                </a:solidFill>
+                <a:miter lim="800000"/>
+                <a:headEnd/>
+                <a:tailEnd/>
+              </a14:hiddenLine>
+            </a:ext>
+          </a:extLst>
+        </p:spPr>
+        <p:txBody>
+          <a:bodyPr wrap="square">
+            <a:spAutoFit/>
+          </a:bodyPr>
+          <a:lstStyle>
+            <a:lvl1pPr>
+              <a:defRPr>
+                <a:solidFill>
+                  <a:schemeClr val="tx1"/>
+                </a:solidFill>
+                <a:latin typeface="Calibri" panose="020F0502020204030204" pitchFamily="34" charset="0"/>
+              </a:defRPr>
+            </a:lvl1pPr>
+            <a:lvl2pPr marL="742950" indent="-285750">
+              <a:defRPr>
+                <a:solidFill>
+                  <a:schemeClr val="tx1"/>
+                </a:solidFill>
+                <a:latin typeface="Calibri" panose="020F0502020204030204" pitchFamily="34" charset="0"/>
+              </a:defRPr>
+            </a:lvl2pPr>
+            <a:lvl3pPr marL="1143000" indent="-228600">
+              <a:defRPr>
+                <a:solidFill>
+                  <a:schemeClr val="tx1"/>
+                </a:solidFill>
+                <a:latin typeface="Calibri" panose="020F0502020204030204" pitchFamily="34" charset="0"/>
+              </a:defRPr>
+            </a:lvl3pPr>
+            <a:lvl4pPr marL="1600200" indent="-228600">
+              <a:defRPr>
+                <a:solidFill>
+                  <a:schemeClr val="tx1"/>
+                </a:solidFill>
+                <a:latin typeface="Calibri" panose="020F0502020204030204" pitchFamily="34" charset="0"/>
+              </a:defRPr>
+            </a:lvl4pPr>
+            <a:lvl5pPr marL="2057400" indent="-228600">
+              <a:defRPr>
+                <a:solidFill>
+                  <a:schemeClr val="tx1"/>
+                </a:solidFill>
+                <a:latin typeface="Calibri" panose="020F0502020204030204" pitchFamily="34" charset="0"/>
+              </a:defRPr>
+            </a:lvl5pPr>
+            <a:lvl6pPr marL="2514600" indent="-228600" eaLnBrk="0" fontAlgn="base" hangingPunct="0">
+              <a:spcBef>
+                <a:spcPct val="0"/>
+              </a:spcBef>
+              <a:spcAft>
+                <a:spcPct val="0"/>
+              </a:spcAft>
+              <a:defRPr>
+                <a:solidFill>
+                  <a:schemeClr val="tx1"/>
+                </a:solidFill>
+                <a:latin typeface="Calibri" panose="020F0502020204030204" pitchFamily="34" charset="0"/>
+              </a:defRPr>
+            </a:lvl6pPr>
+            <a:lvl7pPr marL="2971800" indent="-228600" eaLnBrk="0" fontAlgn="base" hangingPunct="0">
+              <a:spcBef>
+                <a:spcPct val="0"/>
+              </a:spcBef>
+              <a:spcAft>
+                <a:spcPct val="0"/>
+              </a:spcAft>
+              <a:defRPr>
+                <a:solidFill>
+                  <a:schemeClr val="tx1"/>
+                </a:solidFill>
+                <a:latin typeface="Calibri" panose="020F0502020204030204" pitchFamily="34" charset="0"/>
+              </a:defRPr>
+            </a:lvl7pPr>
+            <a:lvl8pPr marL="3429000" indent="-228600" eaLnBrk="0" fontAlgn="base" hangingPunct="0">
+              <a:spcBef>
+                <a:spcPct val="0"/>
+              </a:spcBef>
+              <a:spcAft>
+                <a:spcPct val="0"/>
+              </a:spcAft>
+              <a:defRPr>
+                <a:solidFill>
+                  <a:schemeClr val="tx1"/>
+                </a:solidFill>
+                <a:latin typeface="Calibri" panose="020F0502020204030204" pitchFamily="34" charset="0"/>
+              </a:defRPr>
+            </a:lvl8pPr>
+            <a:lvl9pPr marL="3886200" indent="-228600" eaLnBrk="0" fontAlgn="base" hangingPunct="0">
+              <a:spcBef>
+                <a:spcPct val="0"/>
+              </a:spcBef>
+              <a:spcAft>
+                <a:spcPct val="0"/>
+              </a:spcAft>
+              <a:defRPr>
+                <a:solidFill>
+                  <a:schemeClr val="tx1"/>
+                </a:solidFill>
+                <a:latin typeface="Calibri" panose="020F0502020204030204" pitchFamily="34" charset="0"/>
+              </a:defRPr>
+            </a:lvl9pPr>
+          </a:lstStyle>
+          <a:p>
+            <a:pPr algn="ctr" eaLnBrk="1" hangingPunct="1"/>
+            <a:r>
+              <a:rPr lang="en-US" altLang="en-US" sz="1200" dirty="0">
+                <a:latin typeface="Arial" panose="020B0604020202020204" pitchFamily="34" charset="0"/>
+                <a:ea typeface="Amazon Ember" panose="020B0603020204020204" pitchFamily="34" charset="0"/>
+                <a:cs typeface="Arial" panose="020B0604020202020204" pitchFamily="34" charset="0"/>
+              </a:rPr>
+              <a:t>NAT gateway</a:t>
+            </a:r>
+          </a:p>
+        </p:txBody>
+      </p:sp>
+      <p:pic>
+        <p:nvPicPr>
+          <p:cNvPr id="44" name="Graphic 35">
+            <a:extLst>
+              <a:ext uri="{FF2B5EF4-FFF2-40B4-BE49-F238E27FC236}">
+                <a16:creationId xmlns:a16="http://schemas.microsoft.com/office/drawing/2014/main" id="{A5BA7256-6A27-CE46-BA90-6D710A383720}"/>
+              </a:ext>
+            </a:extLst>
+          </p:cNvPr>
+          <p:cNvPicPr>
+            <a:picLocks noChangeAspect="1" noChangeArrowheads="1"/>
+          </p:cNvPicPr>
+          <p:nvPr/>
+        </p:nvPicPr>
+        <p:blipFill>
+          <a:blip r:embed="rId8" cstate="print">
+            <a:extLst>
+              <a:ext uri="{28A0092B-C50C-407E-A947-70E740481C1C}">
+                <a14:useLocalDpi xmlns:a14="http://schemas.microsoft.com/office/drawing/2010/main" val="0"/>
+              </a:ext>
+            </a:extLst>
+          </a:blip>
+          <a:srcRect/>
+          <a:stretch>
+            <a:fillRect/>
+          </a:stretch>
+        </p:blipFill>
+        <p:spPr bwMode="auto">
+          <a:xfrm>
+            <a:off x="6726170" y="3618012"/>
+            <a:ext cx="457200" cy="457200"/>
+          </a:xfrm>
+          <a:prstGeom prst="rect">
+            <a:avLst/>
+          </a:prstGeom>
+          <a:noFill/>
+          <a:ln>
+            <a:noFill/>
+          </a:ln>
+          <a:extLst>
+            <a:ext uri="{909E8E84-426E-40DD-AFC4-6F175D3DCCD1}">
+              <a14:hiddenFill xmlns:a14="http://schemas.microsoft.com/office/drawing/2010/main">
+                <a:solidFill>
+                  <a:srgbClr val="FFFFFF"/>
+                </a:solidFill>
+              </a14:hiddenFill>
+            </a:ext>
+            <a:ext uri="{91240B29-F687-4F45-9708-019B960494DF}">
+              <a14:hiddenLine xmlns:a14="http://schemas.microsoft.com/office/drawing/2010/main" w="9525">
+                <a:solidFill>
+                  <a:srgbClr val="000000"/>
+                </a:solidFill>
+                <a:miter lim="800000"/>
+                <a:headEnd/>
+                <a:tailEnd/>
+              </a14:hiddenLine>
+            </a:ext>
+          </a:extLst>
+        </p:spPr>
+      </p:pic>
+      <p:sp>
+        <p:nvSpPr>
+          <p:cNvPr id="49" name="Rectangle 48">
+            <a:extLst>
+              <a:ext uri="{FF2B5EF4-FFF2-40B4-BE49-F238E27FC236}">
+                <a16:creationId xmlns:a16="http://schemas.microsoft.com/office/drawing/2014/main" id="{EBD78DDC-6CA6-8B4C-8030-D09C702BCE2A}"/>
+              </a:ext>
+            </a:extLst>
+          </p:cNvPr>
+          <p:cNvSpPr/>
+          <p:nvPr/>
+        </p:nvSpPr>
+        <p:spPr bwMode="auto">
+          <a:xfrm>
+            <a:off x="746235" y="827773"/>
+            <a:ext cx="8628994" cy="4921384"/>
+          </a:xfrm>
+          <a:prstGeom prst="rect">
+            <a:avLst/>
+          </a:prstGeom>
+          <a:noFill/>
+          <a:ln w="12700">
+            <a:solidFill>
+              <a:schemeClr val="tx1"/>
+            </a:solidFill>
+          </a:ln>
+        </p:spPr>
+        <p:style>
+          <a:lnRef idx="2">
+            <a:schemeClr val="accent1">
+              <a:shade val="50000"/>
+            </a:schemeClr>
+          </a:lnRef>
+          <a:fillRef idx="1">
+            <a:schemeClr val="accent1"/>
+          </a:fillRef>
+          <a:effectRef idx="0">
+            <a:schemeClr val="accent1"/>
+          </a:effectRef>
+          <a:fontRef idx="minor">
+            <a:schemeClr val="lt1"/>
+          </a:fontRef>
+        </p:style>
+        <p:txBody>
+          <a:bodyPr lIns="457200" tIns="91440"/>
+          <a:lstStyle/>
+          <a:p>
+            <a:pPr eaLnBrk="1" fontAlgn="auto" hangingPunct="1">
+              <a:spcBef>
+                <a:spcPts val="0"/>
+              </a:spcBef>
+              <a:spcAft>
+                <a:spcPts val="0"/>
+              </a:spcAft>
+              <a:defRPr/>
+            </a:pPr>
+            <a:r>
+              <a:rPr lang="en-US" sz="1200" dirty="0">
+                <a:solidFill>
+                  <a:sysClr val="windowText" lastClr="000000"/>
+                </a:solidFill>
+                <a:latin typeface="Arial" panose="020B0604020202020204" pitchFamily="34" charset="0"/>
+                <a:cs typeface="Arial" panose="020B0604020202020204" pitchFamily="34" charset="0"/>
+              </a:rPr>
+              <a:t>AWS Cloud</a:t>
+            </a:r>
+          </a:p>
+        </p:txBody>
+      </p:sp>
+      <p:pic>
+        <p:nvPicPr>
+          <p:cNvPr id="50" name="Graphic 8">
+            <a:extLst>
+              <a:ext uri="{FF2B5EF4-FFF2-40B4-BE49-F238E27FC236}">
+                <a16:creationId xmlns:a16="http://schemas.microsoft.com/office/drawing/2014/main" id="{546222F9-4B37-E847-81D0-112B1B2B353A}"/>
+              </a:ext>
+            </a:extLst>
+          </p:cNvPr>
+          <p:cNvPicPr>
+            <a:picLocks noChangeAspect="1" noChangeArrowheads="1"/>
+          </p:cNvPicPr>
+          <p:nvPr/>
+        </p:nvPicPr>
+        <p:blipFill>
+          <a:blip r:embed="rId9" cstate="print">
+            <a:extLst>
+              <a:ext uri="{28A0092B-C50C-407E-A947-70E740481C1C}">
+                <a14:useLocalDpi xmlns:a14="http://schemas.microsoft.com/office/drawing/2010/main" val="0"/>
+              </a:ext>
+            </a:extLst>
+          </a:blip>
+          <a:srcRect/>
+          <a:stretch>
+            <a:fillRect/>
+          </a:stretch>
+        </p:blipFill>
+        <p:spPr bwMode="auto">
+          <a:xfrm>
+            <a:off x="746235" y="827773"/>
+            <a:ext cx="330200" cy="330200"/>
+          </a:xfrm>
+          <a:prstGeom prst="rect">
+            <a:avLst/>
+          </a:prstGeom>
+          <a:noFill/>
+          <a:ln>
+            <a:noFill/>
+          </a:ln>
+          <a:extLst>
+            <a:ext uri="{909E8E84-426E-40DD-AFC4-6F175D3DCCD1}">
+              <a14:hiddenFill xmlns:a14="http://schemas.microsoft.com/office/drawing/2010/main">
+                <a:solidFill>
+                  <a:srgbClr val="FFFFFF"/>
+                </a:solidFill>
+              </a14:hiddenFill>
+            </a:ext>
+            <a:ext uri="{91240B29-F687-4F45-9708-019B960494DF}">
+              <a14:hiddenLine xmlns:a14="http://schemas.microsoft.com/office/drawing/2010/main" w="9525">
+                <a:solidFill>
+                  <a:srgbClr val="000000"/>
+                </a:solidFill>
+                <a:miter lim="800000"/>
+                <a:headEnd/>
+                <a:tailEnd/>
+              </a14:hiddenLine>
+            </a:ext>
+          </a:extLst>
+        </p:spPr>
+      </p:pic>
+      <p:pic>
+        <p:nvPicPr>
+          <p:cNvPr id="13" name="Picture 12"/>
+          <p:cNvPicPr>
+            <a:picLocks noChangeAspect="1"/>
+          </p:cNvPicPr>
+          <p:nvPr/>
+        </p:nvPicPr>
+        <p:blipFill>
+          <a:blip r:embed="rId10">
+            <a:extLst>
+              <a:ext uri="{28A0092B-C50C-407E-A947-70E740481C1C}">
+                <a14:useLocalDpi xmlns:a14="http://schemas.microsoft.com/office/drawing/2010/main" val="0"/>
+              </a:ext>
+            </a:extLst>
+          </a:blip>
+          <a:stretch>
+            <a:fillRect/>
+          </a:stretch>
+        </p:blipFill>
+        <p:spPr>
+          <a:xfrm>
+            <a:off x="9632259" y="2362252"/>
+            <a:ext cx="1905000" cy="355600"/>
+          </a:xfrm>
+          <a:prstGeom prst="rect">
+            <a:avLst/>
+          </a:prstGeom>
+        </p:spPr>
+      </p:pic>
+      <p:sp>
+        <p:nvSpPr>
+          <p:cNvPr id="57" name="Rectangle 56"/>
+          <p:cNvSpPr/>
+          <p:nvPr/>
+        </p:nvSpPr>
+        <p:spPr>
+          <a:xfrm>
+            <a:off x="9712595" y="2674299"/>
+            <a:ext cx="1744327" cy="276999"/>
+          </a:xfrm>
+          <a:prstGeom prst="rect">
+            <a:avLst/>
+          </a:prstGeom>
+        </p:spPr>
+        <p:txBody>
+          <a:bodyPr wrap="square">
+            <a:spAutoFit/>
+          </a:bodyPr>
+          <a:lstStyle/>
+          <a:p>
+            <a:pPr algn="ctr"/>
+            <a:r>
+              <a:rPr lang="en-US" sz="1200" b="0" i="0" dirty="0" smtClean="0">
+                <a:effectLst/>
+                <a:latin typeface="Arial" panose="020B0604020202020204" pitchFamily="34" charset="0"/>
+                <a:cs typeface="Arial" panose="020B0604020202020204" pitchFamily="34" charset="0"/>
+              </a:rPr>
+              <a:t>Darktrace appliance</a:t>
+            </a:r>
+            <a:endParaRPr lang="en-US" sz="1200" dirty="0">
+              <a:latin typeface="Arial" panose="020B0604020202020204" pitchFamily="34" charset="0"/>
+              <a:cs typeface="Arial" panose="020B0604020202020204" pitchFamily="34" charset="0"/>
+            </a:endParaRPr>
+          </a:p>
+        </p:txBody>
+      </p:sp>
+      <p:sp>
+        <p:nvSpPr>
+          <p:cNvPr id="64" name="TextBox 20">
+            <a:extLst>
+              <a:ext uri="{FF2B5EF4-FFF2-40B4-BE49-F238E27FC236}">
+                <a16:creationId xmlns:a16="http://schemas.microsoft.com/office/drawing/2014/main" id="{873A5151-4A7B-9A48-9996-CBCA1C63BD62}"/>
+              </a:ext>
+            </a:extLst>
+          </p:cNvPr>
+          <p:cNvSpPr txBox="1">
+            <a:spLocks noChangeArrowheads="1"/>
+          </p:cNvSpPr>
+          <p:nvPr/>
+        </p:nvSpPr>
+        <p:spPr bwMode="auto">
+          <a:xfrm>
+            <a:off x="7870805" y="4962952"/>
+            <a:ext cx="1290638" cy="461665"/>
+          </a:xfrm>
+          <a:prstGeom prst="rect">
+            <a:avLst/>
+          </a:prstGeom>
+          <a:noFill/>
+          <a:ln>
+            <a:noFill/>
+          </a:ln>
+          <a:extLst>
+            <a:ext uri="{909E8E84-426E-40DD-AFC4-6F175D3DCCD1}">
+              <a14:hiddenFill xmlns:a14="http://schemas.microsoft.com/office/drawing/2010/main">
+                <a:solidFill>
+                  <a:srgbClr val="FFFFFF"/>
+                </a:solidFill>
+              </a14:hiddenFill>
+            </a:ext>
+            <a:ext uri="{91240B29-F687-4F45-9708-019B960494DF}">
+              <a14:hiddenLine xmlns:a14="http://schemas.microsoft.com/office/drawing/2010/main" w="9525">
+                <a:solidFill>
+                  <a:srgbClr val="000000"/>
+                </a:solidFill>
+                <a:miter lim="800000"/>
+                <a:headEnd/>
+                <a:tailEnd/>
+              </a14:hiddenLine>
+            </a:ext>
+          </a:extLst>
+        </p:spPr>
+        <p:txBody>
+          <a:bodyPr wrap="square">
+            <a:spAutoFit/>
+          </a:bodyPr>
+          <a:lstStyle>
+            <a:lvl1pPr>
+              <a:defRPr>
+                <a:solidFill>
+                  <a:schemeClr val="tx1"/>
+                </a:solidFill>
+                <a:latin typeface="Calibri" panose="020F0502020204030204" pitchFamily="34" charset="0"/>
+              </a:defRPr>
+            </a:lvl1pPr>
+            <a:lvl2pPr marL="742950" indent="-285750">
+              <a:defRPr>
+                <a:solidFill>
+                  <a:schemeClr val="tx1"/>
+                </a:solidFill>
+                <a:latin typeface="Calibri" panose="020F0502020204030204" pitchFamily="34" charset="0"/>
+              </a:defRPr>
+            </a:lvl2pPr>
+            <a:lvl3pPr marL="1143000" indent="-228600">
+              <a:defRPr>
+                <a:solidFill>
+                  <a:schemeClr val="tx1"/>
+                </a:solidFill>
+                <a:latin typeface="Calibri" panose="020F0502020204030204" pitchFamily="34" charset="0"/>
+              </a:defRPr>
+            </a:lvl3pPr>
+            <a:lvl4pPr marL="1600200" indent="-228600">
+              <a:defRPr>
+                <a:solidFill>
+                  <a:schemeClr val="tx1"/>
+                </a:solidFill>
+                <a:latin typeface="Calibri" panose="020F0502020204030204" pitchFamily="34" charset="0"/>
+              </a:defRPr>
+            </a:lvl4pPr>
+            <a:lvl5pPr marL="2057400" indent="-228600">
+              <a:defRPr>
+                <a:solidFill>
+                  <a:schemeClr val="tx1"/>
+                </a:solidFill>
+                <a:latin typeface="Calibri" panose="020F0502020204030204" pitchFamily="34" charset="0"/>
+              </a:defRPr>
+            </a:lvl5pPr>
+            <a:lvl6pPr marL="2514600" indent="-228600" eaLnBrk="0" fontAlgn="base" hangingPunct="0">
+              <a:spcBef>
+                <a:spcPct val="0"/>
+              </a:spcBef>
+              <a:spcAft>
+                <a:spcPct val="0"/>
+              </a:spcAft>
+              <a:defRPr>
+                <a:solidFill>
+                  <a:schemeClr val="tx1"/>
+                </a:solidFill>
+                <a:latin typeface="Calibri" panose="020F0502020204030204" pitchFamily="34" charset="0"/>
+              </a:defRPr>
+            </a:lvl6pPr>
+            <a:lvl7pPr marL="2971800" indent="-228600" eaLnBrk="0" fontAlgn="base" hangingPunct="0">
+              <a:spcBef>
+                <a:spcPct val="0"/>
+              </a:spcBef>
+              <a:spcAft>
+                <a:spcPct val="0"/>
+              </a:spcAft>
+              <a:defRPr>
+                <a:solidFill>
+                  <a:schemeClr val="tx1"/>
+                </a:solidFill>
+                <a:latin typeface="Calibri" panose="020F0502020204030204" pitchFamily="34" charset="0"/>
+              </a:defRPr>
+            </a:lvl7pPr>
+            <a:lvl8pPr marL="3429000" indent="-228600" eaLnBrk="0" fontAlgn="base" hangingPunct="0">
+              <a:spcBef>
+                <a:spcPct val="0"/>
+              </a:spcBef>
+              <a:spcAft>
+                <a:spcPct val="0"/>
+              </a:spcAft>
+              <a:defRPr>
+                <a:solidFill>
+                  <a:schemeClr val="tx1"/>
+                </a:solidFill>
+                <a:latin typeface="Calibri" panose="020F0502020204030204" pitchFamily="34" charset="0"/>
+              </a:defRPr>
+            </a:lvl8pPr>
+            <a:lvl9pPr marL="3886200" indent="-228600" eaLnBrk="0" fontAlgn="base" hangingPunct="0">
+              <a:spcBef>
+                <a:spcPct val="0"/>
+              </a:spcBef>
+              <a:spcAft>
+                <a:spcPct val="0"/>
+              </a:spcAft>
+              <a:defRPr>
+                <a:solidFill>
+                  <a:schemeClr val="tx1"/>
+                </a:solidFill>
+                <a:latin typeface="Calibri" panose="020F0502020204030204" pitchFamily="34" charset="0"/>
+              </a:defRPr>
+            </a:lvl9pPr>
+          </a:lstStyle>
+          <a:p>
+            <a:pPr algn="ctr" eaLnBrk="1" hangingPunct="1"/>
+            <a:r>
+              <a:rPr lang="en-US" altLang="en-US" sz="1200" dirty="0" smtClean="0">
+                <a:latin typeface="Arial" panose="020B0604020202020204" pitchFamily="34" charset="0"/>
+                <a:ea typeface="Amazon Ember" panose="020B0603020204020204" pitchFamily="34" charset="0"/>
+                <a:cs typeface="Arial" panose="020B0604020202020204" pitchFamily="34" charset="0"/>
+              </a:rPr>
+              <a:t>Captured packets</a:t>
+            </a:r>
+            <a:endParaRPr lang="en-US" altLang="en-US" sz="1200" dirty="0">
+              <a:latin typeface="Arial" panose="020B0604020202020204" pitchFamily="34" charset="0"/>
+              <a:ea typeface="Amazon Ember" panose="020B0603020204020204" pitchFamily="34" charset="0"/>
+              <a:cs typeface="Arial" panose="020B0604020202020204" pitchFamily="34" charset="0"/>
+            </a:endParaRPr>
+          </a:p>
+        </p:txBody>
+      </p:sp>
+      <p:pic>
+        <p:nvPicPr>
+          <p:cNvPr id="65" name="Graphic 31">
+            <a:extLst>
+              <a:ext uri="{FF2B5EF4-FFF2-40B4-BE49-F238E27FC236}">
+                <a16:creationId xmlns:a16="http://schemas.microsoft.com/office/drawing/2014/main" id="{5E4317A3-C947-2E4A-BF3D-D754AD5BF363}"/>
+              </a:ext>
+            </a:extLst>
+          </p:cNvPr>
+          <p:cNvPicPr>
+            <a:picLocks noChangeAspect="1" noChangeArrowheads="1"/>
+          </p:cNvPicPr>
+          <p:nvPr/>
+        </p:nvPicPr>
+        <p:blipFill>
+          <a:blip r:embed="rId11" cstate="print">
+            <a:extLst>
+              <a:ext uri="{28A0092B-C50C-407E-A947-70E740481C1C}">
+                <a14:useLocalDpi xmlns:a14="http://schemas.microsoft.com/office/drawing/2010/main" val="0"/>
+              </a:ext>
+            </a:extLst>
+          </a:blip>
+          <a:srcRect/>
+          <a:stretch>
+            <a:fillRect/>
+          </a:stretch>
+        </p:blipFill>
+        <p:spPr bwMode="auto">
+          <a:xfrm>
+            <a:off x="8287524" y="4561383"/>
+            <a:ext cx="457200" cy="457200"/>
+          </a:xfrm>
+          <a:prstGeom prst="rect">
+            <a:avLst/>
+          </a:prstGeom>
+          <a:noFill/>
+          <a:ln>
+            <a:noFill/>
+          </a:ln>
+          <a:extLst>
+            <a:ext uri="{909E8E84-426E-40DD-AFC4-6F175D3DCCD1}">
+              <a14:hiddenFill xmlns:a14="http://schemas.microsoft.com/office/drawing/2010/main">
+                <a:solidFill>
+                  <a:srgbClr val="FFFFFF"/>
+                </a:solidFill>
+              </a14:hiddenFill>
+            </a:ext>
+            <a:ext uri="{91240B29-F687-4F45-9708-019B960494DF}">
+              <a14:hiddenLine xmlns:a14="http://schemas.microsoft.com/office/drawing/2010/main" w="9525">
+                <a:solidFill>
+                  <a:srgbClr val="000000"/>
+                </a:solidFill>
+                <a:miter lim="800000"/>
+                <a:headEnd/>
+                <a:tailEnd/>
+              </a14:hiddenLine>
+            </a:ext>
+          </a:extLst>
+        </p:spPr>
+      </p:pic>
+      <p:cxnSp>
+        <p:nvCxnSpPr>
+          <p:cNvPr id="66" name="Straight Arrow Connector 65">
+            <a:extLst>
+              <a:ext uri="{FF2B5EF4-FFF2-40B4-BE49-F238E27FC236}">
+                <a16:creationId xmlns:a16="http://schemas.microsoft.com/office/drawing/2014/main" id="{9E8BEF15-E8C4-2242-949A-672EF8C74E91}"/>
+              </a:ext>
+            </a:extLst>
+          </p:cNvPr>
+          <p:cNvCxnSpPr>
+            <a:cxnSpLocks/>
+            <a:stCxn id="24" idx="3"/>
+            <a:endCxn id="65" idx="1"/>
+          </p:cNvCxnSpPr>
+          <p:nvPr/>
+        </p:nvCxnSpPr>
+        <p:spPr>
+          <a:xfrm>
+            <a:off x="7693435" y="4789983"/>
+            <a:ext cx="594089" cy="0"/>
+          </a:xfrm>
+          <a:prstGeom prst="straightConnector1">
+            <a:avLst/>
+          </a:prstGeom>
+          <a:ln w="12700">
+            <a:solidFill>
+              <a:srgbClr val="545B64"/>
+            </a:solidFill>
+            <a:headEnd type="none" w="med" len="sm"/>
+            <a:tailEnd type="arrow" w="med" len="sm"/>
+          </a:ln>
+        </p:spPr>
+        <p:style>
+          <a:lnRef idx="1">
+            <a:schemeClr val="accent1"/>
+          </a:lnRef>
+          <a:fillRef idx="0">
+            <a:schemeClr val="accent1"/>
+          </a:fillRef>
+          <a:effectRef idx="0">
+            <a:schemeClr val="accent1"/>
+          </a:effectRef>
+          <a:fontRef idx="minor">
+            <a:schemeClr val="tx1"/>
+          </a:fontRef>
+        </p:style>
+      </p:cxnSp>
+      <p:sp>
+        <p:nvSpPr>
+          <p:cNvPr id="47" name="TextBox 16">
+            <a:extLst>
+              <a:ext uri="{FF2B5EF4-FFF2-40B4-BE49-F238E27FC236}">
+                <a16:creationId xmlns:a16="http://schemas.microsoft.com/office/drawing/2014/main" id="{D050FDAD-5D06-8649-AA21-DF5CB049C237}"/>
+              </a:ext>
+            </a:extLst>
+          </p:cNvPr>
+          <p:cNvSpPr txBox="1">
+            <a:spLocks noChangeArrowheads="1"/>
+          </p:cNvSpPr>
+          <p:nvPr/>
+        </p:nvSpPr>
+        <p:spPr bwMode="auto">
+          <a:xfrm>
+            <a:off x="992538" y="3538068"/>
+            <a:ext cx="1511300" cy="276999"/>
+          </a:xfrm>
+          <a:prstGeom prst="rect">
+            <a:avLst/>
+          </a:prstGeom>
+          <a:noFill/>
+          <a:ln>
+            <a:noFill/>
+          </a:ln>
+          <a:extLst>
+            <a:ext uri="{909E8E84-426E-40DD-AFC4-6F175D3DCCD1}">
+              <a14:hiddenFill xmlns:a14="http://schemas.microsoft.com/office/drawing/2010/main">
+                <a:solidFill>
+                  <a:srgbClr val="FFFFFF"/>
+                </a:solidFill>
+              </a14:hiddenFill>
+            </a:ext>
+            <a:ext uri="{91240B29-F687-4F45-9708-019B960494DF}">
+              <a14:hiddenLine xmlns:a14="http://schemas.microsoft.com/office/drawing/2010/main" w="9525">
+                <a:solidFill>
+                  <a:srgbClr val="000000"/>
+                </a:solidFill>
+                <a:miter lim="800000"/>
+                <a:headEnd/>
+                <a:tailEnd/>
+              </a14:hiddenLine>
+            </a:ext>
+          </a:extLst>
+        </p:spPr>
+        <p:txBody>
+          <a:bodyPr>
+            <a:spAutoFit/>
+          </a:bodyPr>
+          <a:lstStyle>
+            <a:lvl1pPr>
+              <a:defRPr>
+                <a:solidFill>
+                  <a:schemeClr val="tx1"/>
+                </a:solidFill>
+                <a:latin typeface="Calibri" panose="020F0502020204030204" pitchFamily="34" charset="0"/>
+              </a:defRPr>
+            </a:lvl1pPr>
+            <a:lvl2pPr marL="742950" indent="-285750">
+              <a:defRPr>
+                <a:solidFill>
+                  <a:schemeClr val="tx1"/>
+                </a:solidFill>
+                <a:latin typeface="Calibri" panose="020F0502020204030204" pitchFamily="34" charset="0"/>
+              </a:defRPr>
+            </a:lvl2pPr>
+            <a:lvl3pPr marL="1143000" indent="-228600">
+              <a:defRPr>
+                <a:solidFill>
+                  <a:schemeClr val="tx1"/>
+                </a:solidFill>
+                <a:latin typeface="Calibri" panose="020F0502020204030204" pitchFamily="34" charset="0"/>
+              </a:defRPr>
+            </a:lvl3pPr>
+            <a:lvl4pPr marL="1600200" indent="-228600">
+              <a:defRPr>
+                <a:solidFill>
+                  <a:schemeClr val="tx1"/>
+                </a:solidFill>
+                <a:latin typeface="Calibri" panose="020F0502020204030204" pitchFamily="34" charset="0"/>
+              </a:defRPr>
+            </a:lvl4pPr>
+            <a:lvl5pPr marL="2057400" indent="-228600">
+              <a:defRPr>
+                <a:solidFill>
+                  <a:schemeClr val="tx1"/>
+                </a:solidFill>
+                <a:latin typeface="Calibri" panose="020F0502020204030204" pitchFamily="34" charset="0"/>
+              </a:defRPr>
+            </a:lvl5pPr>
+            <a:lvl6pPr marL="2514600" indent="-228600" eaLnBrk="0" fontAlgn="base" hangingPunct="0">
+              <a:spcBef>
+                <a:spcPct val="0"/>
+              </a:spcBef>
+              <a:spcAft>
+                <a:spcPct val="0"/>
+              </a:spcAft>
+              <a:defRPr>
+                <a:solidFill>
+                  <a:schemeClr val="tx1"/>
+                </a:solidFill>
+                <a:latin typeface="Calibri" panose="020F0502020204030204" pitchFamily="34" charset="0"/>
+              </a:defRPr>
+            </a:lvl6pPr>
+            <a:lvl7pPr marL="2971800" indent="-228600" eaLnBrk="0" fontAlgn="base" hangingPunct="0">
+              <a:spcBef>
+                <a:spcPct val="0"/>
+              </a:spcBef>
+              <a:spcAft>
+                <a:spcPct val="0"/>
+              </a:spcAft>
+              <a:defRPr>
+                <a:solidFill>
+                  <a:schemeClr val="tx1"/>
+                </a:solidFill>
+                <a:latin typeface="Calibri" panose="020F0502020204030204" pitchFamily="34" charset="0"/>
+              </a:defRPr>
+            </a:lvl7pPr>
+            <a:lvl8pPr marL="3429000" indent="-228600" eaLnBrk="0" fontAlgn="base" hangingPunct="0">
+              <a:spcBef>
+                <a:spcPct val="0"/>
+              </a:spcBef>
+              <a:spcAft>
+                <a:spcPct val="0"/>
+              </a:spcAft>
+              <a:defRPr>
+                <a:solidFill>
+                  <a:schemeClr val="tx1"/>
+                </a:solidFill>
+                <a:latin typeface="Calibri" panose="020F0502020204030204" pitchFamily="34" charset="0"/>
+              </a:defRPr>
+            </a:lvl8pPr>
+            <a:lvl9pPr marL="3886200" indent="-228600" eaLnBrk="0" fontAlgn="base" hangingPunct="0">
+              <a:spcBef>
+                <a:spcPct val="0"/>
+              </a:spcBef>
+              <a:spcAft>
+                <a:spcPct val="0"/>
+              </a:spcAft>
+              <a:defRPr>
+                <a:solidFill>
+                  <a:schemeClr val="tx1"/>
+                </a:solidFill>
+                <a:latin typeface="Calibri" panose="020F0502020204030204" pitchFamily="34" charset="0"/>
+              </a:defRPr>
+            </a:lvl9pPr>
+          </a:lstStyle>
+          <a:p>
+            <a:pPr algn="ctr" eaLnBrk="1" hangingPunct="1"/>
+            <a:r>
+              <a:rPr lang="en-US" altLang="en-US" sz="1200" dirty="0" smtClean="0">
+                <a:latin typeface="Arial" panose="020B0604020202020204" pitchFamily="34" charset="0"/>
+                <a:ea typeface="Amazon Ember" panose="020B0603020204020204" pitchFamily="34" charset="0"/>
+                <a:cs typeface="Arial" panose="020B0604020202020204" pitchFamily="34" charset="0"/>
+              </a:rPr>
+              <a:t>Traffic mirroring</a:t>
+            </a:r>
+            <a:endParaRPr lang="en-US" altLang="en-US" sz="1200" dirty="0">
+              <a:latin typeface="Arial" panose="020B0604020202020204" pitchFamily="34" charset="0"/>
+              <a:ea typeface="Amazon Ember" panose="020B0603020204020204" pitchFamily="34" charset="0"/>
+              <a:cs typeface="Arial" panose="020B0604020202020204" pitchFamily="34" charset="0"/>
+            </a:endParaRPr>
+          </a:p>
+        </p:txBody>
+      </p:sp>
+      <p:pic>
+        <p:nvPicPr>
+          <p:cNvPr id="48" name="Graphic 33">
+            <a:extLst>
+              <a:ext uri="{FF2B5EF4-FFF2-40B4-BE49-F238E27FC236}">
+                <a16:creationId xmlns:a16="http://schemas.microsoft.com/office/drawing/2014/main" id="{E778F0F4-1E1E-344E-9953-189B0363285A}"/>
+              </a:ext>
+            </a:extLst>
+          </p:cNvPr>
+          <p:cNvPicPr>
+            <a:picLocks noChangeAspect="1" noChangeArrowheads="1"/>
+          </p:cNvPicPr>
+          <p:nvPr/>
+        </p:nvPicPr>
+        <p:blipFill>
+          <a:blip r:embed="rId12" cstate="print">
+            <a:extLst>
+              <a:ext uri="{28A0092B-C50C-407E-A947-70E740481C1C}">
+                <a14:useLocalDpi xmlns:a14="http://schemas.microsoft.com/office/drawing/2010/main" val="0"/>
+              </a:ext>
+            </a:extLst>
+          </a:blip>
+          <a:srcRect/>
+          <a:stretch>
+            <a:fillRect/>
+          </a:stretch>
+        </p:blipFill>
+        <p:spPr bwMode="auto">
+          <a:xfrm>
+            <a:off x="1519588" y="3087826"/>
+            <a:ext cx="457200" cy="457200"/>
+          </a:xfrm>
+          <a:prstGeom prst="rect">
+            <a:avLst/>
+          </a:prstGeom>
+          <a:noFill/>
+          <a:ln>
+            <a:noFill/>
+          </a:ln>
+          <a:extLst>
+            <a:ext uri="{909E8E84-426E-40DD-AFC4-6F175D3DCCD1}">
+              <a14:hiddenFill xmlns:a14="http://schemas.microsoft.com/office/drawing/2010/main">
+                <a:solidFill>
+                  <a:srgbClr val="FFFFFF"/>
+                </a:solidFill>
+              </a14:hiddenFill>
+            </a:ext>
+            <a:ext uri="{91240B29-F687-4F45-9708-019B960494DF}">
+              <a14:hiddenLine xmlns:a14="http://schemas.microsoft.com/office/drawing/2010/main" w="9525">
+                <a:solidFill>
+                  <a:srgbClr val="000000"/>
+                </a:solidFill>
+                <a:miter lim="800000"/>
+                <a:headEnd/>
+                <a:tailEnd/>
+              </a14:hiddenLine>
+            </a:ext>
+          </a:extLst>
+        </p:spPr>
+      </p:pic>
+      <p:sp>
+        <p:nvSpPr>
+          <p:cNvPr id="52" name="TextBox 22">
+            <a:extLst>
+              <a:ext uri="{FF2B5EF4-FFF2-40B4-BE49-F238E27FC236}">
+                <a16:creationId xmlns:a16="http://schemas.microsoft.com/office/drawing/2014/main" id="{F957C4EB-E925-CD46-B6E6-5F934B6F593C}"/>
+              </a:ext>
+            </a:extLst>
+          </p:cNvPr>
+          <p:cNvSpPr txBox="1">
+            <a:spLocks noChangeArrowheads="1"/>
+          </p:cNvSpPr>
+          <p:nvPr/>
+        </p:nvSpPr>
+        <p:spPr bwMode="auto">
+          <a:xfrm>
+            <a:off x="4612972" y="3538068"/>
+            <a:ext cx="1339850" cy="461665"/>
+          </a:xfrm>
+          <a:prstGeom prst="rect">
+            <a:avLst/>
+          </a:prstGeom>
+          <a:noFill/>
+          <a:ln>
+            <a:noFill/>
+          </a:ln>
+          <a:extLst>
+            <a:ext uri="{909E8E84-426E-40DD-AFC4-6F175D3DCCD1}">
+              <a14:hiddenFill xmlns:a14="http://schemas.microsoft.com/office/drawing/2010/main">
+                <a:solidFill>
+                  <a:srgbClr val="FFFFFF"/>
+                </a:solidFill>
+              </a14:hiddenFill>
+            </a:ext>
+            <a:ext uri="{91240B29-F687-4F45-9708-019B960494DF}">
+              <a14:hiddenLine xmlns:a14="http://schemas.microsoft.com/office/drawing/2010/main" w="9525">
+                <a:solidFill>
+                  <a:srgbClr val="000000"/>
+                </a:solidFill>
+                <a:miter lim="800000"/>
+                <a:headEnd/>
+                <a:tailEnd/>
+              </a14:hiddenLine>
+            </a:ext>
+          </a:extLst>
+        </p:spPr>
+        <p:txBody>
+          <a:bodyPr wrap="square">
+            <a:spAutoFit/>
+          </a:bodyPr>
+          <a:lstStyle>
+            <a:lvl1pPr>
+              <a:defRPr>
+                <a:solidFill>
+                  <a:schemeClr val="tx1"/>
+                </a:solidFill>
+                <a:latin typeface="Calibri" panose="020F0502020204030204" pitchFamily="34" charset="0"/>
+              </a:defRPr>
+            </a:lvl1pPr>
+            <a:lvl2pPr marL="742950" indent="-285750">
+              <a:defRPr>
+                <a:solidFill>
+                  <a:schemeClr val="tx1"/>
+                </a:solidFill>
+                <a:latin typeface="Calibri" panose="020F0502020204030204" pitchFamily="34" charset="0"/>
+              </a:defRPr>
+            </a:lvl2pPr>
+            <a:lvl3pPr marL="1143000" indent="-228600">
+              <a:defRPr>
+                <a:solidFill>
+                  <a:schemeClr val="tx1"/>
+                </a:solidFill>
+                <a:latin typeface="Calibri" panose="020F0502020204030204" pitchFamily="34" charset="0"/>
+              </a:defRPr>
+            </a:lvl3pPr>
+            <a:lvl4pPr marL="1600200" indent="-228600">
+              <a:defRPr>
+                <a:solidFill>
+                  <a:schemeClr val="tx1"/>
+                </a:solidFill>
+                <a:latin typeface="Calibri" panose="020F0502020204030204" pitchFamily="34" charset="0"/>
+              </a:defRPr>
+            </a:lvl4pPr>
+            <a:lvl5pPr marL="2057400" indent="-228600">
+              <a:defRPr>
+                <a:solidFill>
+                  <a:schemeClr val="tx1"/>
+                </a:solidFill>
+                <a:latin typeface="Calibri" panose="020F0502020204030204" pitchFamily="34" charset="0"/>
+              </a:defRPr>
+            </a:lvl5pPr>
+            <a:lvl6pPr marL="2514600" indent="-228600" eaLnBrk="0" fontAlgn="base" hangingPunct="0">
+              <a:spcBef>
+                <a:spcPct val="0"/>
+              </a:spcBef>
+              <a:spcAft>
+                <a:spcPct val="0"/>
+              </a:spcAft>
+              <a:defRPr>
+                <a:solidFill>
+                  <a:schemeClr val="tx1"/>
+                </a:solidFill>
+                <a:latin typeface="Calibri" panose="020F0502020204030204" pitchFamily="34" charset="0"/>
+              </a:defRPr>
+            </a:lvl6pPr>
+            <a:lvl7pPr marL="2971800" indent="-228600" eaLnBrk="0" fontAlgn="base" hangingPunct="0">
+              <a:spcBef>
+                <a:spcPct val="0"/>
+              </a:spcBef>
+              <a:spcAft>
+                <a:spcPct val="0"/>
+              </a:spcAft>
+              <a:defRPr>
+                <a:solidFill>
+                  <a:schemeClr val="tx1"/>
+                </a:solidFill>
+                <a:latin typeface="Calibri" panose="020F0502020204030204" pitchFamily="34" charset="0"/>
+              </a:defRPr>
+            </a:lvl7pPr>
+            <a:lvl8pPr marL="3429000" indent="-228600" eaLnBrk="0" fontAlgn="base" hangingPunct="0">
+              <a:spcBef>
+                <a:spcPct val="0"/>
+              </a:spcBef>
+              <a:spcAft>
+                <a:spcPct val="0"/>
+              </a:spcAft>
+              <a:defRPr>
+                <a:solidFill>
+                  <a:schemeClr val="tx1"/>
+                </a:solidFill>
+                <a:latin typeface="Calibri" panose="020F0502020204030204" pitchFamily="34" charset="0"/>
+              </a:defRPr>
+            </a:lvl8pPr>
+            <a:lvl9pPr marL="3886200" indent="-228600" eaLnBrk="0" fontAlgn="base" hangingPunct="0">
+              <a:spcBef>
+                <a:spcPct val="0"/>
+              </a:spcBef>
+              <a:spcAft>
+                <a:spcPct val="0"/>
+              </a:spcAft>
+              <a:defRPr>
+                <a:solidFill>
+                  <a:schemeClr val="tx1"/>
+                </a:solidFill>
+                <a:latin typeface="Calibri" panose="020F0502020204030204" pitchFamily="34" charset="0"/>
+              </a:defRPr>
+            </a:lvl9pPr>
+          </a:lstStyle>
+          <a:p>
+            <a:pPr algn="ctr" eaLnBrk="1" hangingPunct="1"/>
+            <a:r>
+              <a:rPr lang="en-US" altLang="en-US" sz="1200" dirty="0">
+                <a:latin typeface="Arial" panose="020B0604020202020204" pitchFamily="34" charset="0"/>
+                <a:ea typeface="Amazon Ember" panose="020B0603020204020204" pitchFamily="34" charset="0"/>
+                <a:cs typeface="Arial" panose="020B0604020202020204" pitchFamily="34" charset="0"/>
+              </a:rPr>
+              <a:t>Network Load </a:t>
+            </a:r>
+            <a:br>
+              <a:rPr lang="en-US" altLang="en-US" sz="1200" dirty="0">
+                <a:latin typeface="Arial" panose="020B0604020202020204" pitchFamily="34" charset="0"/>
+                <a:ea typeface="Amazon Ember" panose="020B0603020204020204" pitchFamily="34" charset="0"/>
+                <a:cs typeface="Arial" panose="020B0604020202020204" pitchFamily="34" charset="0"/>
+              </a:rPr>
+            </a:br>
+            <a:r>
+              <a:rPr lang="en-US" altLang="en-US" sz="1200" dirty="0">
+                <a:latin typeface="Arial" panose="020B0604020202020204" pitchFamily="34" charset="0"/>
+                <a:ea typeface="Amazon Ember" panose="020B0603020204020204" pitchFamily="34" charset="0"/>
+                <a:cs typeface="Arial" panose="020B0604020202020204" pitchFamily="34" charset="0"/>
+              </a:rPr>
+              <a:t>Balancer</a:t>
+            </a:r>
+          </a:p>
+        </p:txBody>
+      </p:sp>
+      <p:pic>
+        <p:nvPicPr>
+          <p:cNvPr id="53" name="Graphic 24">
+            <a:extLst>
+              <a:ext uri="{FF2B5EF4-FFF2-40B4-BE49-F238E27FC236}">
+                <a16:creationId xmlns:a16="http://schemas.microsoft.com/office/drawing/2014/main" id="{F98FFE17-32E0-0245-9C99-4566C0E254A6}"/>
+              </a:ext>
+            </a:extLst>
+          </p:cNvPr>
+          <p:cNvPicPr>
+            <a:picLocks noChangeAspect="1" noChangeArrowheads="1"/>
+          </p:cNvPicPr>
+          <p:nvPr/>
+        </p:nvPicPr>
+        <p:blipFill>
+          <a:blip r:embed="rId13" cstate="print">
+            <a:extLst>
+              <a:ext uri="{28A0092B-C50C-407E-A947-70E740481C1C}">
+                <a14:useLocalDpi xmlns:a14="http://schemas.microsoft.com/office/drawing/2010/main" val="0"/>
+              </a:ext>
+            </a:extLst>
+          </a:blip>
+          <a:srcRect/>
+          <a:stretch>
+            <a:fillRect/>
+          </a:stretch>
+        </p:blipFill>
+        <p:spPr bwMode="auto">
+          <a:xfrm>
+            <a:off x="5054297" y="3087826"/>
+            <a:ext cx="457200" cy="457200"/>
+          </a:xfrm>
+          <a:prstGeom prst="rect">
+            <a:avLst/>
+          </a:prstGeom>
+          <a:noFill/>
+          <a:ln>
+            <a:noFill/>
+          </a:ln>
+          <a:extLst>
+            <a:ext uri="{909E8E84-426E-40DD-AFC4-6F175D3DCCD1}">
+              <a14:hiddenFill xmlns:a14="http://schemas.microsoft.com/office/drawing/2010/main">
+                <a:solidFill>
+                  <a:srgbClr val="FFFFFF"/>
+                </a:solidFill>
+              </a14:hiddenFill>
+            </a:ext>
+            <a:ext uri="{91240B29-F687-4F45-9708-019B960494DF}">
+              <a14:hiddenLine xmlns:a14="http://schemas.microsoft.com/office/drawing/2010/main" w="9525">
+                <a:solidFill>
+                  <a:srgbClr val="000000"/>
+                </a:solidFill>
+                <a:miter lim="800000"/>
+                <a:headEnd/>
+                <a:tailEnd/>
+              </a14:hiddenLine>
+            </a:ext>
+          </a:extLst>
+        </p:spPr>
+      </p:pic>
+      <p:cxnSp>
+        <p:nvCxnSpPr>
+          <p:cNvPr id="58" name="Straight Arrow Connector 57">
+            <a:extLst>
+              <a:ext uri="{FF2B5EF4-FFF2-40B4-BE49-F238E27FC236}">
+                <a16:creationId xmlns:a16="http://schemas.microsoft.com/office/drawing/2014/main" id="{5A9D33BB-F7AF-C044-9BA5-6F98953C5C41}"/>
+              </a:ext>
+            </a:extLst>
+          </p:cNvPr>
+          <p:cNvCxnSpPr>
+            <a:stCxn id="30" idx="0"/>
+            <a:endCxn id="52" idx="2"/>
+          </p:cNvCxnSpPr>
+          <p:nvPr/>
+        </p:nvCxnSpPr>
+        <p:spPr>
+          <a:xfrm flipV="1">
+            <a:off x="5282897" y="3903483"/>
+            <a:ext cx="0" cy="462128"/>
+          </a:xfrm>
+          <a:prstGeom prst="straightConnector1">
+            <a:avLst/>
+          </a:prstGeom>
+          <a:ln w="12700">
+            <a:solidFill>
+              <a:schemeClr val="tx2"/>
+            </a:solidFill>
+            <a:headEnd type="arrow" w="med" len="sm"/>
+            <a:tailEnd type="none" w="med" len="sm"/>
+          </a:ln>
+        </p:spPr>
+        <p:style>
+          <a:lnRef idx="1">
+            <a:schemeClr val="accent1"/>
+          </a:lnRef>
+          <a:fillRef idx="0">
+            <a:schemeClr val="accent1"/>
+          </a:fillRef>
+          <a:effectRef idx="0">
+            <a:schemeClr val="accent1"/>
+          </a:effectRef>
+          <a:fontRef idx="minor">
+            <a:schemeClr val="tx1"/>
+          </a:fontRef>
+        </p:style>
+      </p:cxnSp>
+      <p:cxnSp>
+        <p:nvCxnSpPr>
+          <p:cNvPr id="61" name="Straight Arrow Connector 60">
+            <a:extLst>
+              <a:ext uri="{FF2B5EF4-FFF2-40B4-BE49-F238E27FC236}">
+                <a16:creationId xmlns:a16="http://schemas.microsoft.com/office/drawing/2014/main" id="{5A9D33BB-F7AF-C044-9BA5-6F98953C5C41}"/>
+              </a:ext>
+            </a:extLst>
+          </p:cNvPr>
+          <p:cNvCxnSpPr>
+            <a:stCxn id="13" idx="1"/>
+            <a:endCxn id="102" idx="3"/>
+          </p:cNvCxnSpPr>
+          <p:nvPr/>
+        </p:nvCxnSpPr>
+        <p:spPr>
+          <a:xfrm flipH="1">
+            <a:off x="7693435" y="2540052"/>
+            <a:ext cx="1938824" cy="0"/>
+          </a:xfrm>
+          <a:prstGeom prst="straightConnector1">
+            <a:avLst/>
+          </a:prstGeom>
+          <a:ln w="12700">
+            <a:solidFill>
+              <a:schemeClr val="tx2"/>
+            </a:solidFill>
+            <a:headEnd type="arrow" w="med" len="sm"/>
+            <a:tailEnd type="none" w="med" len="sm"/>
+          </a:ln>
+        </p:spPr>
+        <p:style>
+          <a:lnRef idx="1">
+            <a:schemeClr val="accent1"/>
+          </a:lnRef>
+          <a:fillRef idx="0">
+            <a:schemeClr val="accent1"/>
+          </a:fillRef>
+          <a:effectRef idx="0">
+            <a:schemeClr val="accent1"/>
+          </a:effectRef>
+          <a:fontRef idx="minor">
+            <a:schemeClr val="tx1"/>
+          </a:fontRef>
+        </p:style>
+      </p:cxnSp>
+      <p:sp>
+        <p:nvSpPr>
+          <p:cNvPr id="24" name="Rectangle 23">
+            <a:extLst>
+              <a:ext uri="{FF2B5EF4-FFF2-40B4-BE49-F238E27FC236}">
+                <a16:creationId xmlns:a16="http://schemas.microsoft.com/office/drawing/2014/main" id="{39EEFFD5-B07A-CD4C-A9C4-8DBFAB9447D6}"/>
+              </a:ext>
+            </a:extLst>
+          </p:cNvPr>
+          <p:cNvSpPr/>
+          <p:nvPr/>
+        </p:nvSpPr>
+        <p:spPr>
+          <a:xfrm>
+            <a:off x="2798948" y="4367416"/>
+            <a:ext cx="4894487" cy="845134"/>
+          </a:xfrm>
+          <a:prstGeom prst="rect">
+            <a:avLst/>
+          </a:prstGeom>
+          <a:noFill/>
+          <a:ln w="12700">
+            <a:solidFill>
+              <a:srgbClr val="D86613"/>
+            </a:solidFill>
+            <a:prstDash val="dash"/>
+          </a:ln>
+        </p:spPr>
+        <p:style>
+          <a:lnRef idx="2">
+            <a:schemeClr val="accent1">
+              <a:shade val="50000"/>
+            </a:schemeClr>
+          </a:lnRef>
+          <a:fillRef idx="1">
+            <a:schemeClr val="accent1"/>
+          </a:fillRef>
+          <a:effectRef idx="0">
+            <a:schemeClr val="accent1"/>
+          </a:effectRef>
+          <a:fontRef idx="minor">
+            <a:schemeClr val="lt1"/>
+          </a:fontRef>
+        </p:style>
+        <p:txBody>
+          <a:bodyPr tIns="91440"/>
+          <a:lstStyle/>
+          <a:p>
+            <a:pPr algn="ctr" eaLnBrk="1" fontAlgn="auto" hangingPunct="1">
+              <a:spcBef>
+                <a:spcPts val="0"/>
+              </a:spcBef>
+              <a:spcAft>
+                <a:spcPts val="0"/>
+              </a:spcAft>
+              <a:defRPr/>
+            </a:pPr>
+            <a:endParaRPr lang="en-US" sz="1200" dirty="0">
+              <a:solidFill>
+                <a:srgbClr val="D86613"/>
+              </a:solidFill>
+              <a:latin typeface="Arial" panose="020B0604020202020204" pitchFamily="34" charset="0"/>
+              <a:cs typeface="Arial" panose="020B0604020202020204" pitchFamily="34" charset="0"/>
+            </a:endParaRPr>
+          </a:p>
+          <a:p>
+            <a:pPr algn="ctr" eaLnBrk="1" fontAlgn="auto" hangingPunct="1">
+              <a:spcBef>
+                <a:spcPts val="0"/>
+              </a:spcBef>
+              <a:spcAft>
+                <a:spcPts val="0"/>
+              </a:spcAft>
+              <a:defRPr/>
+            </a:pPr>
+            <a:endParaRPr lang="en-US" sz="1200" dirty="0">
+              <a:solidFill>
+                <a:srgbClr val="D86613"/>
+              </a:solidFill>
+              <a:latin typeface="Arial" panose="020B0604020202020204" pitchFamily="34" charset="0"/>
+              <a:cs typeface="Arial" panose="020B0604020202020204" pitchFamily="34" charset="0"/>
+            </a:endParaRPr>
+          </a:p>
+          <a:p>
+            <a:pPr algn="ctr" eaLnBrk="1" fontAlgn="auto" hangingPunct="1">
+              <a:spcBef>
+                <a:spcPts val="0"/>
+              </a:spcBef>
+              <a:spcAft>
+                <a:spcPts val="0"/>
+              </a:spcAft>
+              <a:defRPr/>
+            </a:pPr>
+            <a:r>
+              <a:rPr lang="en-US" sz="1200" dirty="0">
+                <a:solidFill>
+                  <a:srgbClr val="D86613"/>
+                </a:solidFill>
+                <a:latin typeface="Arial" panose="020B0604020202020204" pitchFamily="34" charset="0"/>
+                <a:cs typeface="Arial" panose="020B0604020202020204" pitchFamily="34" charset="0"/>
+              </a:rPr>
+              <a:t>Auto Scaling group</a:t>
+            </a:r>
+          </a:p>
+        </p:txBody>
+      </p:sp>
+      <p:sp>
+        <p:nvSpPr>
+          <p:cNvPr id="2" name="Rectangle 1"/>
+          <p:cNvSpPr/>
+          <p:nvPr/>
+        </p:nvSpPr>
+        <p:spPr>
+          <a:xfrm>
+            <a:off x="4729730" y="5997656"/>
+            <a:ext cx="6096000" cy="600164"/>
+          </a:xfrm>
+          <a:prstGeom prst="rect">
+            <a:avLst/>
+          </a:prstGeom>
+        </p:spPr>
+        <p:txBody>
+          <a:bodyPr>
+            <a:spAutoFit/>
+          </a:bodyPr>
+          <a:lstStyle/>
+          <a:p>
+            <a:pPr>
+              <a:buFont typeface="Arial" panose="020B0604020202020204" pitchFamily="34" charset="0"/>
+              <a:buChar char="•"/>
+            </a:pPr>
+            <a:r>
+              <a:rPr lang="en-US" sz="1100" dirty="0">
+                <a:solidFill>
+                  <a:srgbClr val="333333"/>
+                </a:solidFill>
+                <a:latin typeface="AmazonEmber"/>
+              </a:rPr>
+              <a:t>An Amazon Elastic Compute Cloud (Amazon EC2) instance in the managed account is not created as part of the Quick Start. It represents any workload instances that are protected by this Quick Start deployment.</a:t>
+            </a:r>
+            <a:endParaRPr lang="en-US" sz="1100" b="0" i="0" dirty="0">
+              <a:solidFill>
+                <a:srgbClr val="333333"/>
+              </a:solidFill>
+              <a:effectLst/>
+              <a:latin typeface="AmazonEmber"/>
+            </a:endParaRPr>
+          </a:p>
+        </p:txBody>
+      </p:sp>
+    </p:spTree>
+    <p:extLst>
+      <p:ext uri="{BB962C8B-B14F-4D97-AF65-F5344CB8AC3E}">
+        <p14:creationId xmlns:p14="http://schemas.microsoft.com/office/powerpoint/2010/main" val="528690854"/>
       </p:ext>
     </p:extLst>
   </p:cSld>

</xml_diff>

<commit_message>
add cloudwatch alarms and logs as two icons in diagram, list
</commit_message>
<xml_diff>
--- a/docs/images/darktrace-vsensor-architecture-diagram.pptx
+++ b/docs/images/darktrace-vsensor-architecture-diagram.pptx
@@ -244,7 +244,7 @@
           <a:p>
             <a:fld id="{091DC170-1660-4809-9A15-62445EB0C7B1}" type="datetimeFigureOut">
               <a:rPr lang="en-US" smtClean="0"/>
-              <a:t>8/9/21</a:t>
+              <a:t>9/13/2021</a:t>
             </a:fld>
             <a:endParaRPr lang="en-US"/>
           </a:p>
@@ -412,7 +412,7 @@
           <a:p>
             <a:fld id="{091DC170-1660-4809-9A15-62445EB0C7B1}" type="datetimeFigureOut">
               <a:rPr lang="en-US" smtClean="0"/>
-              <a:t>8/9/21</a:t>
+              <a:t>9/13/2021</a:t>
             </a:fld>
             <a:endParaRPr lang="en-US"/>
           </a:p>
@@ -590,7 +590,7 @@
           <a:p>
             <a:fld id="{091DC170-1660-4809-9A15-62445EB0C7B1}" type="datetimeFigureOut">
               <a:rPr lang="en-US" smtClean="0"/>
-              <a:t>8/9/21</a:t>
+              <a:t>9/13/2021</a:t>
             </a:fld>
             <a:endParaRPr lang="en-US"/>
           </a:p>
@@ -758,7 +758,7 @@
           <a:p>
             <a:fld id="{091DC170-1660-4809-9A15-62445EB0C7B1}" type="datetimeFigureOut">
               <a:rPr lang="en-US" smtClean="0"/>
-              <a:t>8/9/21</a:t>
+              <a:t>9/13/2021</a:t>
             </a:fld>
             <a:endParaRPr lang="en-US"/>
           </a:p>
@@ -1003,7 +1003,7 @@
           <a:p>
             <a:fld id="{091DC170-1660-4809-9A15-62445EB0C7B1}" type="datetimeFigureOut">
               <a:rPr lang="en-US" smtClean="0"/>
-              <a:t>8/9/21</a:t>
+              <a:t>9/13/2021</a:t>
             </a:fld>
             <a:endParaRPr lang="en-US"/>
           </a:p>
@@ -1232,7 +1232,7 @@
           <a:p>
             <a:fld id="{091DC170-1660-4809-9A15-62445EB0C7B1}" type="datetimeFigureOut">
               <a:rPr lang="en-US" smtClean="0"/>
-              <a:t>8/9/21</a:t>
+              <a:t>9/13/2021</a:t>
             </a:fld>
             <a:endParaRPr lang="en-US"/>
           </a:p>
@@ -1596,7 +1596,7 @@
           <a:p>
             <a:fld id="{091DC170-1660-4809-9A15-62445EB0C7B1}" type="datetimeFigureOut">
               <a:rPr lang="en-US" smtClean="0"/>
-              <a:t>8/9/21</a:t>
+              <a:t>9/13/2021</a:t>
             </a:fld>
             <a:endParaRPr lang="en-US"/>
           </a:p>
@@ -1713,7 +1713,7 @@
           <a:p>
             <a:fld id="{091DC170-1660-4809-9A15-62445EB0C7B1}" type="datetimeFigureOut">
               <a:rPr lang="en-US" smtClean="0"/>
-              <a:t>8/9/21</a:t>
+              <a:t>9/13/2021</a:t>
             </a:fld>
             <a:endParaRPr lang="en-US"/>
           </a:p>
@@ -1808,7 +1808,7 @@
           <a:p>
             <a:fld id="{091DC170-1660-4809-9A15-62445EB0C7B1}" type="datetimeFigureOut">
               <a:rPr lang="en-US" smtClean="0"/>
-              <a:t>8/9/21</a:t>
+              <a:t>9/13/2021</a:t>
             </a:fld>
             <a:endParaRPr lang="en-US"/>
           </a:p>
@@ -2083,7 +2083,7 @@
           <a:p>
             <a:fld id="{091DC170-1660-4809-9A15-62445EB0C7B1}" type="datetimeFigureOut">
               <a:rPr lang="en-US" smtClean="0"/>
-              <a:t>8/9/21</a:t>
+              <a:t>9/13/2021</a:t>
             </a:fld>
             <a:endParaRPr lang="en-US"/>
           </a:p>
@@ -2335,7 +2335,7 @@
           <a:p>
             <a:fld id="{091DC170-1660-4809-9A15-62445EB0C7B1}" type="datetimeFigureOut">
               <a:rPr lang="en-US" smtClean="0"/>
-              <a:t>8/9/21</a:t>
+              <a:t>9/13/2021</a:t>
             </a:fld>
             <a:endParaRPr lang="en-US"/>
           </a:p>
@@ -2546,7 +2546,7 @@
           <a:p>
             <a:fld id="{091DC170-1660-4809-9A15-62445EB0C7B1}" type="datetimeFigureOut">
               <a:rPr lang="en-US" smtClean="0"/>
-              <a:t>8/9/21</a:t>
+              <a:t>9/13/2021</a:t>
             </a:fld>
             <a:endParaRPr lang="en-US"/>
           </a:p>
@@ -15976,8 +15976,8 @@
         </p:nvSpPr>
         <p:spPr bwMode="auto">
           <a:xfrm>
-            <a:off x="988624" y="1555531"/>
-            <a:ext cx="8050274" cy="3869086"/>
+            <a:off x="1242390" y="1555531"/>
+            <a:ext cx="7796507" cy="3869086"/>
           </a:xfrm>
           <a:prstGeom prst="rect">
             <a:avLst/>
@@ -16693,7 +16693,7 @@
         </p:blipFill>
         <p:spPr bwMode="auto">
           <a:xfrm>
-            <a:off x="983525" y="1555756"/>
+            <a:off x="1242390" y="1555756"/>
             <a:ext cx="330200" cy="330200"/>
           </a:xfrm>
           <a:prstGeom prst="rect">
@@ -16784,227 +16784,6 @@
           </a:extLst>
         </p:spPr>
       </p:pic>
-      <p:pic>
-        <p:nvPicPr>
-          <p:cNvPr id="35" name="Graphic 17">
-            <a:extLst>
-              <a:ext uri="{FF2B5EF4-FFF2-40B4-BE49-F238E27FC236}">
-                <a16:creationId xmlns:a16="http://schemas.microsoft.com/office/drawing/2014/main" id="{443A8EDD-16C2-6848-83A6-4582C7B74B70}"/>
-              </a:ext>
-            </a:extLst>
-          </p:cNvPr>
-          <p:cNvPicPr>
-            <a:picLocks noChangeAspect="1" noChangeArrowheads="1"/>
-          </p:cNvPicPr>
-          <p:nvPr/>
-        </p:nvPicPr>
-        <p:blipFill>
-          <a:blip r:embed="rId7" cstate="print">
-            <a:extLst>
-              <a:ext uri="{28A0092B-C50C-407E-A947-70E740481C1C}">
-                <a14:useLocalDpi xmlns:a14="http://schemas.microsoft.com/office/drawing/2010/main" val="0"/>
-              </a:ext>
-            </a:extLst>
-          </a:blip>
-          <a:srcRect/>
-          <a:stretch>
-            <a:fillRect/>
-          </a:stretch>
-        </p:blipFill>
-        <p:spPr bwMode="auto">
-          <a:xfrm>
-            <a:off x="1426229" y="4307628"/>
-            <a:ext cx="643919" cy="643919"/>
-          </a:xfrm>
-          <a:prstGeom prst="rect">
-            <a:avLst/>
-          </a:prstGeom>
-          <a:noFill/>
-          <a:ln>
-            <a:noFill/>
-          </a:ln>
-          <a:extLst>
-            <a:ext uri="{909E8E84-426E-40DD-AFC4-6F175D3DCCD1}">
-              <a14:hiddenFill xmlns:a14="http://schemas.microsoft.com/office/drawing/2010/main">
-                <a:solidFill>
-                  <a:srgbClr val="FFFFFF"/>
-                </a:solidFill>
-              </a14:hiddenFill>
-            </a:ext>
-            <a:ext uri="{91240B29-F687-4F45-9708-019B960494DF}">
-              <a14:hiddenLine xmlns:a14="http://schemas.microsoft.com/office/drawing/2010/main" w="9525">
-                <a:solidFill>
-                  <a:srgbClr val="000000"/>
-                </a:solidFill>
-                <a:miter lim="800000"/>
-                <a:headEnd/>
-                <a:tailEnd/>
-              </a14:hiddenLine>
-            </a:ext>
-          </a:extLst>
-        </p:spPr>
-      </p:pic>
-      <p:sp>
-        <p:nvSpPr>
-          <p:cNvPr id="36" name="TextBox 9">
-            <a:extLst>
-              <a:ext uri="{FF2B5EF4-FFF2-40B4-BE49-F238E27FC236}">
-                <a16:creationId xmlns:a16="http://schemas.microsoft.com/office/drawing/2014/main" id="{F9D6EE48-441C-334D-8184-61EA0808B9C5}"/>
-              </a:ext>
-            </a:extLst>
-          </p:cNvPr>
-          <p:cNvSpPr txBox="1">
-            <a:spLocks noChangeArrowheads="1"/>
-          </p:cNvSpPr>
-          <p:nvPr/>
-        </p:nvSpPr>
-        <p:spPr bwMode="auto">
-          <a:xfrm>
-            <a:off x="938225" y="4953418"/>
-            <a:ext cx="1619927" cy="276999"/>
-          </a:xfrm>
-          <a:prstGeom prst="rect">
-            <a:avLst/>
-          </a:prstGeom>
-          <a:noFill/>
-          <a:ln>
-            <a:noFill/>
-          </a:ln>
-          <a:extLst>
-            <a:ext uri="{909E8E84-426E-40DD-AFC4-6F175D3DCCD1}">
-              <a14:hiddenFill xmlns:a14="http://schemas.microsoft.com/office/drawing/2010/main">
-                <a:solidFill>
-                  <a:srgbClr val="FFFFFF"/>
-                </a:solidFill>
-              </a14:hiddenFill>
-            </a:ext>
-            <a:ext uri="{91240B29-F687-4F45-9708-019B960494DF}">
-              <a14:hiddenLine xmlns:a14="http://schemas.microsoft.com/office/drawing/2010/main" w="9525">
-                <a:solidFill>
-                  <a:srgbClr val="000000"/>
-                </a:solidFill>
-                <a:miter lim="800000"/>
-                <a:headEnd/>
-                <a:tailEnd/>
-              </a14:hiddenLine>
-            </a:ext>
-          </a:extLst>
-        </p:spPr>
-        <p:txBody>
-          <a:bodyPr wrap="square">
-            <a:spAutoFit/>
-          </a:bodyPr>
-          <a:lstStyle>
-            <a:lvl1pPr>
-              <a:defRPr>
-                <a:solidFill>
-                  <a:schemeClr val="tx1"/>
-                </a:solidFill>
-                <a:latin typeface="Calibri" panose="020F0502020204030204" pitchFamily="34" charset="0"/>
-              </a:defRPr>
-            </a:lvl1pPr>
-            <a:lvl2pPr marL="742950" indent="-285750">
-              <a:defRPr>
-                <a:solidFill>
-                  <a:schemeClr val="tx1"/>
-                </a:solidFill>
-                <a:latin typeface="Calibri" panose="020F0502020204030204" pitchFamily="34" charset="0"/>
-              </a:defRPr>
-            </a:lvl2pPr>
-            <a:lvl3pPr marL="1143000" indent="-228600">
-              <a:defRPr>
-                <a:solidFill>
-                  <a:schemeClr val="tx1"/>
-                </a:solidFill>
-                <a:latin typeface="Calibri" panose="020F0502020204030204" pitchFamily="34" charset="0"/>
-              </a:defRPr>
-            </a:lvl3pPr>
-            <a:lvl4pPr marL="1600200" indent="-228600">
-              <a:defRPr>
-                <a:solidFill>
-                  <a:schemeClr val="tx1"/>
-                </a:solidFill>
-                <a:latin typeface="Calibri" panose="020F0502020204030204" pitchFamily="34" charset="0"/>
-              </a:defRPr>
-            </a:lvl4pPr>
-            <a:lvl5pPr marL="2057400" indent="-228600">
-              <a:defRPr>
-                <a:solidFill>
-                  <a:schemeClr val="tx1"/>
-                </a:solidFill>
-                <a:latin typeface="Calibri" panose="020F0502020204030204" pitchFamily="34" charset="0"/>
-              </a:defRPr>
-            </a:lvl5pPr>
-            <a:lvl6pPr marL="2514600" indent="-228600" eaLnBrk="0" fontAlgn="base" hangingPunct="0">
-              <a:spcBef>
-                <a:spcPct val="0"/>
-              </a:spcBef>
-              <a:spcAft>
-                <a:spcPct val="0"/>
-              </a:spcAft>
-              <a:defRPr>
-                <a:solidFill>
-                  <a:schemeClr val="tx1"/>
-                </a:solidFill>
-                <a:latin typeface="Calibri" panose="020F0502020204030204" pitchFamily="34" charset="0"/>
-              </a:defRPr>
-            </a:lvl6pPr>
-            <a:lvl7pPr marL="2971800" indent="-228600" eaLnBrk="0" fontAlgn="base" hangingPunct="0">
-              <a:spcBef>
-                <a:spcPct val="0"/>
-              </a:spcBef>
-              <a:spcAft>
-                <a:spcPct val="0"/>
-              </a:spcAft>
-              <a:defRPr>
-                <a:solidFill>
-                  <a:schemeClr val="tx1"/>
-                </a:solidFill>
-                <a:latin typeface="Calibri" panose="020F0502020204030204" pitchFamily="34" charset="0"/>
-              </a:defRPr>
-            </a:lvl7pPr>
-            <a:lvl8pPr marL="3429000" indent="-228600" eaLnBrk="0" fontAlgn="base" hangingPunct="0">
-              <a:spcBef>
-                <a:spcPct val="0"/>
-              </a:spcBef>
-              <a:spcAft>
-                <a:spcPct val="0"/>
-              </a:spcAft>
-              <a:defRPr>
-                <a:solidFill>
-                  <a:schemeClr val="tx1"/>
-                </a:solidFill>
-                <a:latin typeface="Calibri" panose="020F0502020204030204" pitchFamily="34" charset="0"/>
-              </a:defRPr>
-            </a:lvl8pPr>
-            <a:lvl9pPr marL="3886200" indent="-228600" eaLnBrk="0" fontAlgn="base" hangingPunct="0">
-              <a:spcBef>
-                <a:spcPct val="0"/>
-              </a:spcBef>
-              <a:spcAft>
-                <a:spcPct val="0"/>
-              </a:spcAft>
-              <a:defRPr>
-                <a:solidFill>
-                  <a:schemeClr val="tx1"/>
-                </a:solidFill>
-                <a:latin typeface="Calibri" panose="020F0502020204030204" pitchFamily="34" charset="0"/>
-              </a:defRPr>
-            </a:lvl9pPr>
-          </a:lstStyle>
-          <a:p>
-            <a:pPr algn="ctr" eaLnBrk="1" hangingPunct="1"/>
-            <a:r>
-              <a:rPr lang="en-US" altLang="en-US" sz="1200" dirty="0">
-                <a:latin typeface="Arial" panose="020B0604020202020204" pitchFamily="34" charset="0"/>
-                <a:ea typeface="Amazon Ember" panose="020B0603020204020204" pitchFamily="34" charset="0"/>
-                <a:cs typeface="Arial" panose="020B0604020202020204" pitchFamily="34" charset="0"/>
-              </a:rPr>
-              <a:t>Amazon CloudWatch</a:t>
-            </a:r>
-          </a:p>
-        </p:txBody>
-      </p:sp>
       <p:sp>
         <p:nvSpPr>
           <p:cNvPr id="9" name="Rectangle 8">
@@ -18191,7 +17970,7 @@
           <p:nvPr/>
         </p:nvPicPr>
         <p:blipFill>
-          <a:blip r:embed="rId8" cstate="print">
+          <a:blip r:embed="rId7" cstate="print">
             <a:extLst>
               <a:ext uri="{28A0092B-C50C-407E-A947-70E740481C1C}">
                 <a14:useLocalDpi xmlns:a14="http://schemas.microsoft.com/office/drawing/2010/main" val="0"/>
@@ -18412,7 +18191,7 @@
           <p:nvPr/>
         </p:nvPicPr>
         <p:blipFill>
-          <a:blip r:embed="rId8" cstate="print">
+          <a:blip r:embed="rId7" cstate="print">
             <a:extLst>
               <a:ext uri="{28A0092B-C50C-407E-A947-70E740481C1C}">
                 <a14:useLocalDpi xmlns:a14="http://schemas.microsoft.com/office/drawing/2010/main" val="0"/>
@@ -18471,8 +18250,8 @@
         </p:nvSpPr>
         <p:spPr bwMode="auto">
           <a:xfrm>
-            <a:off x="746235" y="704193"/>
-            <a:ext cx="8628994" cy="5044964"/>
+            <a:off x="934277" y="795129"/>
+            <a:ext cx="8440951" cy="4954027"/>
           </a:xfrm>
           <a:prstGeom prst="rect">
             <a:avLst/>
@@ -18541,7 +18320,7 @@
           <p:nvPr/>
         </p:nvPicPr>
         <p:blipFill>
-          <a:blip r:embed="rId9" cstate="print">
+          <a:blip r:embed="rId8" cstate="print">
             <a:extLst>
               <a:ext uri="{28A0092B-C50C-407E-A947-70E740481C1C}">
                 <a14:useLocalDpi xmlns:a14="http://schemas.microsoft.com/office/drawing/2010/main" val="0"/>
@@ -18555,7 +18334,7 @@
         </p:blipFill>
         <p:spPr bwMode="auto">
           <a:xfrm>
-            <a:off x="750333" y="706591"/>
+            <a:off x="934277" y="795129"/>
             <a:ext cx="330200" cy="330200"/>
           </a:xfrm>
           <a:prstGeom prst="rect">
@@ -18595,7 +18374,7 @@
           <p:nvPr/>
         </p:nvPicPr>
         <p:blipFill>
-          <a:blip r:embed="rId10">
+          <a:blip r:embed="rId9">
             <a:extLst>
               <a:ext uri="{28A0092B-C50C-407E-A947-70E740481C1C}">
                 <a14:useLocalDpi xmlns:a14="http://schemas.microsoft.com/office/drawing/2010/main" val="0"/>
@@ -18829,7 +18608,7 @@
           <p:nvPr/>
         </p:nvPicPr>
         <p:blipFill>
-          <a:blip r:embed="rId11" cstate="print">
+          <a:blip r:embed="rId10" cstate="print">
             <a:extLst>
               <a:ext uri="{28A0092B-C50C-407E-A947-70E740481C1C}">
                 <a14:useLocalDpi xmlns:a14="http://schemas.microsoft.com/office/drawing/2010/main" val="0"/>
@@ -18937,7 +18716,7 @@
         </p:nvSpPr>
         <p:spPr bwMode="auto">
           <a:xfrm>
-            <a:off x="992538" y="3441818"/>
+            <a:off x="1141623" y="3441818"/>
             <a:ext cx="1511300" cy="276999"/>
           </a:xfrm>
           <a:prstGeom prst="rect">
@@ -19097,7 +18876,7 @@
           <p:nvPr/>
         </p:nvPicPr>
         <p:blipFill>
-          <a:blip r:embed="rId12" cstate="print">
+          <a:blip r:embed="rId11" cstate="print">
             <a:extLst>
               <a:ext uri="{28A0092B-C50C-407E-A947-70E740481C1C}">
                 <a14:useLocalDpi xmlns:a14="http://schemas.microsoft.com/office/drawing/2010/main" val="0"/>
@@ -19111,7 +18890,7 @@
         </p:blipFill>
         <p:spPr bwMode="auto">
           <a:xfrm>
-            <a:off x="1519588" y="2991576"/>
+            <a:off x="1668673" y="2991576"/>
             <a:ext cx="457200" cy="457200"/>
           </a:xfrm>
           <a:prstGeom prst="rect">
@@ -19159,8 +18938,8 @@
         </p:nvCxnSpPr>
         <p:spPr>
           <a:xfrm flipH="1">
-            <a:off x="1976788" y="3220176"/>
-            <a:ext cx="3077509" cy="0"/>
+            <a:off x="2125873" y="3220176"/>
+            <a:ext cx="2928424" cy="0"/>
           </a:xfrm>
           <a:prstGeom prst="straightConnector1">
             <a:avLst/>
@@ -19379,7 +19158,7 @@
           <p:nvPr/>
         </p:nvPicPr>
         <p:blipFill>
-          <a:blip r:embed="rId13" cstate="print">
+          <a:blip r:embed="rId12" cstate="print">
             <a:extLst>
               <a:ext uri="{28A0092B-C50C-407E-A947-70E740481C1C}">
                 <a14:useLocalDpi xmlns:a14="http://schemas.microsoft.com/office/drawing/2010/main" val="0"/>
@@ -19618,6 +19397,448 @@
                 <a:cs typeface="Arial" panose="020B0604020202020204" pitchFamily="34" charset="0"/>
               </a:rPr>
               <a:t>Auto Scaling group</a:t>
+            </a:r>
+          </a:p>
+        </p:txBody>
+      </p:sp>
+      <p:pic>
+        <p:nvPicPr>
+          <p:cNvPr id="56" name="Graphic 7">
+            <a:extLst>
+              <a:ext uri="{FF2B5EF4-FFF2-40B4-BE49-F238E27FC236}">
+                <a16:creationId xmlns:a16="http://schemas.microsoft.com/office/drawing/2014/main" id="{C1F0389F-76A7-4D93-BC97-1B2E2971A38A}"/>
+              </a:ext>
+            </a:extLst>
+          </p:cNvPr>
+          <p:cNvPicPr>
+            <a:picLocks noChangeAspect="1" noChangeArrowheads="1"/>
+          </p:cNvPicPr>
+          <p:nvPr/>
+        </p:nvPicPr>
+        <p:blipFill>
+          <a:blip r:embed="rId13" cstate="print">
+            <a:extLst>
+              <a:ext uri="{28A0092B-C50C-407E-A947-70E740481C1C}">
+                <a14:useLocalDpi xmlns:a14="http://schemas.microsoft.com/office/drawing/2010/main" val="0"/>
+              </a:ext>
+            </a:extLst>
+          </a:blip>
+          <a:srcRect/>
+          <a:stretch>
+            <a:fillRect/>
+          </a:stretch>
+        </p:blipFill>
+        <p:spPr bwMode="auto">
+          <a:xfrm>
+            <a:off x="8287524" y="3704803"/>
+            <a:ext cx="457200" cy="457200"/>
+          </a:xfrm>
+          <a:prstGeom prst="rect">
+            <a:avLst/>
+          </a:prstGeom>
+          <a:noFill/>
+          <a:ln>
+            <a:noFill/>
+          </a:ln>
+          <a:extLst>
+            <a:ext uri="{909E8E84-426E-40DD-AFC4-6F175D3DCCD1}">
+              <a14:hiddenFill xmlns:a14="http://schemas.microsoft.com/office/drawing/2010/main">
+                <a:solidFill>
+                  <a:srgbClr val="FFFFFF"/>
+                </a:solidFill>
+              </a14:hiddenFill>
+            </a:ext>
+            <a:ext uri="{91240B29-F687-4F45-9708-019B960494DF}">
+              <a14:hiddenLine xmlns:a14="http://schemas.microsoft.com/office/drawing/2010/main" w="9525">
+                <a:solidFill>
+                  <a:srgbClr val="000000"/>
+                </a:solidFill>
+                <a:miter lim="800000"/>
+                <a:headEnd/>
+                <a:tailEnd/>
+              </a14:hiddenLine>
+            </a:ext>
+          </a:extLst>
+        </p:spPr>
+      </p:pic>
+      <p:sp>
+        <p:nvSpPr>
+          <p:cNvPr id="59" name="TextBox 16">
+            <a:extLst>
+              <a:ext uri="{FF2B5EF4-FFF2-40B4-BE49-F238E27FC236}">
+                <a16:creationId xmlns:a16="http://schemas.microsoft.com/office/drawing/2014/main" id="{9D55A238-F801-4828-B186-31BDC9EA47A2}"/>
+              </a:ext>
+            </a:extLst>
+          </p:cNvPr>
+          <p:cNvSpPr txBox="1">
+            <a:spLocks noChangeArrowheads="1"/>
+          </p:cNvSpPr>
+          <p:nvPr/>
+        </p:nvSpPr>
+        <p:spPr bwMode="auto">
+          <a:xfrm>
+            <a:off x="7922399" y="3309955"/>
+            <a:ext cx="1187450" cy="261610"/>
+          </a:xfrm>
+          <a:prstGeom prst="rect">
+            <a:avLst/>
+          </a:prstGeom>
+          <a:noFill/>
+          <a:ln>
+            <a:noFill/>
+          </a:ln>
+          <a:extLst>
+            <a:ext uri="{909E8E84-426E-40DD-AFC4-6F175D3DCCD1}">
+              <a14:hiddenFill xmlns:a14="http://schemas.microsoft.com/office/drawing/2010/main">
+                <a:solidFill>
+                  <a:srgbClr val="FFFFFF"/>
+                </a:solidFill>
+              </a14:hiddenFill>
+            </a:ext>
+            <a:ext uri="{91240B29-F687-4F45-9708-019B960494DF}">
+              <a14:hiddenLine xmlns:a14="http://schemas.microsoft.com/office/drawing/2010/main" w="9525">
+                <a:solidFill>
+                  <a:srgbClr val="000000"/>
+                </a:solidFill>
+                <a:miter lim="800000"/>
+                <a:headEnd/>
+                <a:tailEnd/>
+              </a14:hiddenLine>
+            </a:ext>
+          </a:extLst>
+        </p:spPr>
+        <p:txBody>
+          <a:bodyPr>
+            <a:spAutoFit/>
+          </a:bodyPr>
+          <a:lstStyle>
+            <a:lvl1pPr>
+              <a:defRPr>
+                <a:solidFill>
+                  <a:schemeClr val="tx1"/>
+                </a:solidFill>
+                <a:latin typeface="Calibri" panose="020F0502020204030204" pitchFamily="34" charset="0"/>
+              </a:defRPr>
+            </a:lvl1pPr>
+            <a:lvl2pPr marL="742950" indent="-285750">
+              <a:defRPr>
+                <a:solidFill>
+                  <a:schemeClr val="tx1"/>
+                </a:solidFill>
+                <a:latin typeface="Calibri" panose="020F0502020204030204" pitchFamily="34" charset="0"/>
+              </a:defRPr>
+            </a:lvl2pPr>
+            <a:lvl3pPr marL="1143000" indent="-228600">
+              <a:defRPr>
+                <a:solidFill>
+                  <a:schemeClr val="tx1"/>
+                </a:solidFill>
+                <a:latin typeface="Calibri" panose="020F0502020204030204" pitchFamily="34" charset="0"/>
+              </a:defRPr>
+            </a:lvl3pPr>
+            <a:lvl4pPr marL="1600200" indent="-228600">
+              <a:defRPr>
+                <a:solidFill>
+                  <a:schemeClr val="tx1"/>
+                </a:solidFill>
+                <a:latin typeface="Calibri" panose="020F0502020204030204" pitchFamily="34" charset="0"/>
+              </a:defRPr>
+            </a:lvl4pPr>
+            <a:lvl5pPr marL="2057400" indent="-228600">
+              <a:defRPr>
+                <a:solidFill>
+                  <a:schemeClr val="tx1"/>
+                </a:solidFill>
+                <a:latin typeface="Calibri" panose="020F0502020204030204" pitchFamily="34" charset="0"/>
+              </a:defRPr>
+            </a:lvl5pPr>
+            <a:lvl6pPr marL="2514600" indent="-228600" eaLnBrk="0" fontAlgn="base" hangingPunct="0">
+              <a:spcBef>
+                <a:spcPct val="0"/>
+              </a:spcBef>
+              <a:spcAft>
+                <a:spcPct val="0"/>
+              </a:spcAft>
+              <a:defRPr>
+                <a:solidFill>
+                  <a:schemeClr val="tx1"/>
+                </a:solidFill>
+                <a:latin typeface="Calibri" panose="020F0502020204030204" pitchFamily="34" charset="0"/>
+              </a:defRPr>
+            </a:lvl6pPr>
+            <a:lvl7pPr marL="2971800" indent="-228600" eaLnBrk="0" fontAlgn="base" hangingPunct="0">
+              <a:spcBef>
+                <a:spcPct val="0"/>
+              </a:spcBef>
+              <a:spcAft>
+                <a:spcPct val="0"/>
+              </a:spcAft>
+              <a:defRPr>
+                <a:solidFill>
+                  <a:schemeClr val="tx1"/>
+                </a:solidFill>
+                <a:latin typeface="Calibri" panose="020F0502020204030204" pitchFamily="34" charset="0"/>
+              </a:defRPr>
+            </a:lvl7pPr>
+            <a:lvl8pPr marL="3429000" indent="-228600" eaLnBrk="0" fontAlgn="base" hangingPunct="0">
+              <a:spcBef>
+                <a:spcPct val="0"/>
+              </a:spcBef>
+              <a:spcAft>
+                <a:spcPct val="0"/>
+              </a:spcAft>
+              <a:defRPr>
+                <a:solidFill>
+                  <a:schemeClr val="tx1"/>
+                </a:solidFill>
+                <a:latin typeface="Calibri" panose="020F0502020204030204" pitchFamily="34" charset="0"/>
+              </a:defRPr>
+            </a:lvl8pPr>
+            <a:lvl9pPr marL="3886200" indent="-228600" eaLnBrk="0" fontAlgn="base" hangingPunct="0">
+              <a:spcBef>
+                <a:spcPct val="0"/>
+              </a:spcBef>
+              <a:spcAft>
+                <a:spcPct val="0"/>
+              </a:spcAft>
+              <a:defRPr>
+                <a:solidFill>
+                  <a:schemeClr val="tx1"/>
+                </a:solidFill>
+                <a:latin typeface="Calibri" panose="020F0502020204030204" pitchFamily="34" charset="0"/>
+              </a:defRPr>
+            </a:lvl9pPr>
+          </a:lstStyle>
+          <a:p>
+            <a:pPr algn="ctr" eaLnBrk="1" hangingPunct="1"/>
+            <a:r>
+              <a:rPr lang="en-US" altLang="en-US" sz="1100" dirty="0">
+                <a:latin typeface="Arial" panose="020B0604020202020204" pitchFamily="34" charset="0"/>
+                <a:ea typeface="Amazon Ember" panose="020B0603020204020204" pitchFamily="34" charset="0"/>
+                <a:cs typeface="Arial" panose="020B0604020202020204" pitchFamily="34" charset="0"/>
+              </a:rPr>
+              <a:t>Alarm</a:t>
+            </a:r>
+          </a:p>
+        </p:txBody>
+      </p:sp>
+      <p:pic>
+        <p:nvPicPr>
+          <p:cNvPr id="60" name="Graphic 6">
+            <a:extLst>
+              <a:ext uri="{FF2B5EF4-FFF2-40B4-BE49-F238E27FC236}">
+                <a16:creationId xmlns:a16="http://schemas.microsoft.com/office/drawing/2014/main" id="{6825CAE7-27F5-475D-951A-A7245BA41857}"/>
+              </a:ext>
+            </a:extLst>
+          </p:cNvPr>
+          <p:cNvPicPr>
+            <a:picLocks noChangeAspect="1" noChangeArrowheads="1"/>
+          </p:cNvPicPr>
+          <p:nvPr/>
+        </p:nvPicPr>
+        <p:blipFill>
+          <a:blip r:embed="rId14" cstate="print">
+            <a:extLst>
+              <a:ext uri="{28A0092B-C50C-407E-A947-70E740481C1C}">
+                <a14:useLocalDpi xmlns:a14="http://schemas.microsoft.com/office/drawing/2010/main" val="0"/>
+              </a:ext>
+            </a:extLst>
+          </a:blip>
+          <a:srcRect/>
+          <a:stretch>
+            <a:fillRect/>
+          </a:stretch>
+        </p:blipFill>
+        <p:spPr bwMode="auto">
+          <a:xfrm>
+            <a:off x="8287524" y="2838468"/>
+            <a:ext cx="457200" cy="457200"/>
+          </a:xfrm>
+          <a:prstGeom prst="rect">
+            <a:avLst/>
+          </a:prstGeom>
+          <a:noFill/>
+          <a:ln>
+            <a:noFill/>
+          </a:ln>
+          <a:extLst>
+            <a:ext uri="{909E8E84-426E-40DD-AFC4-6F175D3DCCD1}">
+              <a14:hiddenFill xmlns:a14="http://schemas.microsoft.com/office/drawing/2010/main">
+                <a:solidFill>
+                  <a:srgbClr val="FFFFFF"/>
+                </a:solidFill>
+              </a14:hiddenFill>
+            </a:ext>
+            <a:ext uri="{91240B29-F687-4F45-9708-019B960494DF}">
+              <a14:hiddenLine xmlns:a14="http://schemas.microsoft.com/office/drawing/2010/main" w="9525">
+                <a:solidFill>
+                  <a:srgbClr val="000000"/>
+                </a:solidFill>
+                <a:miter lim="800000"/>
+                <a:headEnd/>
+                <a:tailEnd/>
+              </a14:hiddenLine>
+            </a:ext>
+          </a:extLst>
+        </p:spPr>
+      </p:pic>
+      <p:sp>
+        <p:nvSpPr>
+          <p:cNvPr id="67" name="TextBox 31">
+            <a:extLst>
+              <a:ext uri="{FF2B5EF4-FFF2-40B4-BE49-F238E27FC236}">
+                <a16:creationId xmlns:a16="http://schemas.microsoft.com/office/drawing/2014/main" id="{F09FACF5-B632-4161-B844-7952871F24BF}"/>
+              </a:ext>
+            </a:extLst>
+          </p:cNvPr>
+          <p:cNvSpPr txBox="1">
+            <a:spLocks noChangeArrowheads="1"/>
+          </p:cNvSpPr>
+          <p:nvPr/>
+        </p:nvSpPr>
+        <p:spPr bwMode="auto">
+          <a:xfrm>
+            <a:off x="7934305" y="4155654"/>
+            <a:ext cx="1163639" cy="261610"/>
+          </a:xfrm>
+          <a:prstGeom prst="rect">
+            <a:avLst/>
+          </a:prstGeom>
+          <a:noFill/>
+          <a:ln>
+            <a:noFill/>
+          </a:ln>
+          <a:extLst>
+            <a:ext uri="{909E8E84-426E-40DD-AFC4-6F175D3DCCD1}">
+              <a14:hiddenFill xmlns:a14="http://schemas.microsoft.com/office/drawing/2010/main">
+                <a:solidFill>
+                  <a:srgbClr val="FFFFFF"/>
+                </a:solidFill>
+              </a14:hiddenFill>
+            </a:ext>
+            <a:ext uri="{91240B29-F687-4F45-9708-019B960494DF}">
+              <a14:hiddenLine xmlns:a14="http://schemas.microsoft.com/office/drawing/2010/main" w="9525">
+                <a:solidFill>
+                  <a:srgbClr val="000000"/>
+                </a:solidFill>
+                <a:miter lim="800000"/>
+                <a:headEnd/>
+                <a:tailEnd/>
+              </a14:hiddenLine>
+            </a:ext>
+          </a:extLst>
+        </p:spPr>
+        <p:txBody>
+          <a:bodyPr wrap="square">
+            <a:spAutoFit/>
+          </a:bodyPr>
+          <a:lstStyle>
+            <a:lvl1pPr>
+              <a:defRPr>
+                <a:solidFill>
+                  <a:schemeClr val="tx1"/>
+                </a:solidFill>
+                <a:latin typeface="Calibri" panose="020F0502020204030204" pitchFamily="34" charset="0"/>
+              </a:defRPr>
+            </a:lvl1pPr>
+            <a:lvl2pPr marL="742950" indent="-285750">
+              <a:defRPr>
+                <a:solidFill>
+                  <a:schemeClr val="tx1"/>
+                </a:solidFill>
+                <a:latin typeface="Calibri" panose="020F0502020204030204" pitchFamily="34" charset="0"/>
+              </a:defRPr>
+            </a:lvl2pPr>
+            <a:lvl3pPr marL="1143000" indent="-228600">
+              <a:defRPr>
+                <a:solidFill>
+                  <a:schemeClr val="tx1"/>
+                </a:solidFill>
+                <a:latin typeface="Calibri" panose="020F0502020204030204" pitchFamily="34" charset="0"/>
+              </a:defRPr>
+            </a:lvl3pPr>
+            <a:lvl4pPr marL="1600200" indent="-228600">
+              <a:defRPr>
+                <a:solidFill>
+                  <a:schemeClr val="tx1"/>
+                </a:solidFill>
+                <a:latin typeface="Calibri" panose="020F0502020204030204" pitchFamily="34" charset="0"/>
+              </a:defRPr>
+            </a:lvl4pPr>
+            <a:lvl5pPr marL="2057400" indent="-228600">
+              <a:defRPr>
+                <a:solidFill>
+                  <a:schemeClr val="tx1"/>
+                </a:solidFill>
+                <a:latin typeface="Calibri" panose="020F0502020204030204" pitchFamily="34" charset="0"/>
+              </a:defRPr>
+            </a:lvl5pPr>
+            <a:lvl6pPr marL="2514600" indent="-228600" eaLnBrk="0" fontAlgn="base" hangingPunct="0">
+              <a:spcBef>
+                <a:spcPct val="0"/>
+              </a:spcBef>
+              <a:spcAft>
+                <a:spcPct val="0"/>
+              </a:spcAft>
+              <a:defRPr>
+                <a:solidFill>
+                  <a:schemeClr val="tx1"/>
+                </a:solidFill>
+                <a:latin typeface="Calibri" panose="020F0502020204030204" pitchFamily="34" charset="0"/>
+              </a:defRPr>
+            </a:lvl6pPr>
+            <a:lvl7pPr marL="2971800" indent="-228600" eaLnBrk="0" fontAlgn="base" hangingPunct="0">
+              <a:spcBef>
+                <a:spcPct val="0"/>
+              </a:spcBef>
+              <a:spcAft>
+                <a:spcPct val="0"/>
+              </a:spcAft>
+              <a:defRPr>
+                <a:solidFill>
+                  <a:schemeClr val="tx1"/>
+                </a:solidFill>
+                <a:latin typeface="Calibri" panose="020F0502020204030204" pitchFamily="34" charset="0"/>
+              </a:defRPr>
+            </a:lvl7pPr>
+            <a:lvl8pPr marL="3429000" indent="-228600" eaLnBrk="0" fontAlgn="base" hangingPunct="0">
+              <a:spcBef>
+                <a:spcPct val="0"/>
+              </a:spcBef>
+              <a:spcAft>
+                <a:spcPct val="0"/>
+              </a:spcAft>
+              <a:defRPr>
+                <a:solidFill>
+                  <a:schemeClr val="tx1"/>
+                </a:solidFill>
+                <a:latin typeface="Calibri" panose="020F0502020204030204" pitchFamily="34" charset="0"/>
+              </a:defRPr>
+            </a:lvl8pPr>
+            <a:lvl9pPr marL="3886200" indent="-228600" eaLnBrk="0" fontAlgn="base" hangingPunct="0">
+              <a:spcBef>
+                <a:spcPct val="0"/>
+              </a:spcBef>
+              <a:spcAft>
+                <a:spcPct val="0"/>
+              </a:spcAft>
+              <a:defRPr>
+                <a:solidFill>
+                  <a:schemeClr val="tx1"/>
+                </a:solidFill>
+                <a:latin typeface="Calibri" panose="020F0502020204030204" pitchFamily="34" charset="0"/>
+              </a:defRPr>
+            </a:lvl9pPr>
+          </a:lstStyle>
+          <a:p>
+            <a:pPr algn="ctr" eaLnBrk="1" hangingPunct="1"/>
+            <a:r>
+              <a:rPr lang="en-US" altLang="en-US" sz="1100" dirty="0">
+                <a:latin typeface="Arial" panose="020B0604020202020204" pitchFamily="34" charset="0"/>
+                <a:ea typeface="Amazon Ember" panose="020B0603020204020204" pitchFamily="34" charset="0"/>
+                <a:cs typeface="Arial" panose="020B0604020202020204" pitchFamily="34" charset="0"/>
+              </a:rPr>
+              <a:t>Logs</a:t>
             </a:r>
           </a:p>
         </p:txBody>

</xml_diff>

<commit_message>
Update branding on diagram.
</commit_message>
<xml_diff>
--- a/docs/images/darktrace-vsensor-architecture-diagram.pptx
+++ b/docs/images/darktrace-vsensor-architecture-diagram.pptx
@@ -244,7 +244,7 @@
           <a:p>
             <a:fld id="{091DC170-1660-4809-9A15-62445EB0C7B1}" type="datetimeFigureOut">
               <a:rPr lang="en-US" smtClean="0"/>
-              <a:t>9/13/2021</a:t>
+              <a:t>7/25/22</a:t>
             </a:fld>
             <a:endParaRPr lang="en-US"/>
           </a:p>
@@ -412,7 +412,7 @@
           <a:p>
             <a:fld id="{091DC170-1660-4809-9A15-62445EB0C7B1}" type="datetimeFigureOut">
               <a:rPr lang="en-US" smtClean="0"/>
-              <a:t>9/13/2021</a:t>
+              <a:t>7/25/22</a:t>
             </a:fld>
             <a:endParaRPr lang="en-US"/>
           </a:p>
@@ -590,7 +590,7 @@
           <a:p>
             <a:fld id="{091DC170-1660-4809-9A15-62445EB0C7B1}" type="datetimeFigureOut">
               <a:rPr lang="en-US" smtClean="0"/>
-              <a:t>9/13/2021</a:t>
+              <a:t>7/25/22</a:t>
             </a:fld>
             <a:endParaRPr lang="en-US"/>
           </a:p>
@@ -758,7 +758,7 @@
           <a:p>
             <a:fld id="{091DC170-1660-4809-9A15-62445EB0C7B1}" type="datetimeFigureOut">
               <a:rPr lang="en-US" smtClean="0"/>
-              <a:t>9/13/2021</a:t>
+              <a:t>7/25/22</a:t>
             </a:fld>
             <a:endParaRPr lang="en-US"/>
           </a:p>
@@ -1003,7 +1003,7 @@
           <a:p>
             <a:fld id="{091DC170-1660-4809-9A15-62445EB0C7B1}" type="datetimeFigureOut">
               <a:rPr lang="en-US" smtClean="0"/>
-              <a:t>9/13/2021</a:t>
+              <a:t>7/25/22</a:t>
             </a:fld>
             <a:endParaRPr lang="en-US"/>
           </a:p>
@@ -1232,7 +1232,7 @@
           <a:p>
             <a:fld id="{091DC170-1660-4809-9A15-62445EB0C7B1}" type="datetimeFigureOut">
               <a:rPr lang="en-US" smtClean="0"/>
-              <a:t>9/13/2021</a:t>
+              <a:t>7/25/22</a:t>
             </a:fld>
             <a:endParaRPr lang="en-US"/>
           </a:p>
@@ -1596,7 +1596,7 @@
           <a:p>
             <a:fld id="{091DC170-1660-4809-9A15-62445EB0C7B1}" type="datetimeFigureOut">
               <a:rPr lang="en-US" smtClean="0"/>
-              <a:t>9/13/2021</a:t>
+              <a:t>7/25/22</a:t>
             </a:fld>
             <a:endParaRPr lang="en-US"/>
           </a:p>
@@ -1713,7 +1713,7 @@
           <a:p>
             <a:fld id="{091DC170-1660-4809-9A15-62445EB0C7B1}" type="datetimeFigureOut">
               <a:rPr lang="en-US" smtClean="0"/>
-              <a:t>9/13/2021</a:t>
+              <a:t>7/25/22</a:t>
             </a:fld>
             <a:endParaRPr lang="en-US"/>
           </a:p>
@@ -1808,7 +1808,7 @@
           <a:p>
             <a:fld id="{091DC170-1660-4809-9A15-62445EB0C7B1}" type="datetimeFigureOut">
               <a:rPr lang="en-US" smtClean="0"/>
-              <a:t>9/13/2021</a:t>
+              <a:t>7/25/22</a:t>
             </a:fld>
             <a:endParaRPr lang="en-US"/>
           </a:p>
@@ -2083,7 +2083,7 @@
           <a:p>
             <a:fld id="{091DC170-1660-4809-9A15-62445EB0C7B1}" type="datetimeFigureOut">
               <a:rPr lang="en-US" smtClean="0"/>
-              <a:t>9/13/2021</a:t>
+              <a:t>7/25/22</a:t>
             </a:fld>
             <a:endParaRPr lang="en-US"/>
           </a:p>
@@ -2335,7 +2335,7 @@
           <a:p>
             <a:fld id="{091DC170-1660-4809-9A15-62445EB0C7B1}" type="datetimeFigureOut">
               <a:rPr lang="en-US" smtClean="0"/>
-              <a:t>9/13/2021</a:t>
+              <a:t>7/25/22</a:t>
             </a:fld>
             <a:endParaRPr lang="en-US"/>
           </a:p>
@@ -2546,7 +2546,7 @@
           <a:p>
             <a:fld id="{091DC170-1660-4809-9A15-62445EB0C7B1}" type="datetimeFigureOut">
               <a:rPr lang="en-US" smtClean="0"/>
-              <a:t>9/13/2021</a:t>
+              <a:t>7/25/22</a:t>
             </a:fld>
             <a:endParaRPr lang="en-US"/>
           </a:p>
@@ -6581,76 +6581,6 @@
           </a:fontRef>
         </p:style>
       </p:cxnSp>
-      <p:pic>
-        <p:nvPicPr>
-          <p:cNvPr id="13" name="Picture 12"/>
-          <p:cNvPicPr>
-            <a:picLocks noChangeAspect="1"/>
-          </p:cNvPicPr>
-          <p:nvPr/>
-        </p:nvPicPr>
-        <p:blipFill>
-          <a:blip r:embed="rId13">
-            <a:extLst>
-              <a:ext uri="{28A0092B-C50C-407E-A947-70E740481C1C}">
-                <a14:useLocalDpi xmlns:a14="http://schemas.microsoft.com/office/drawing/2010/main" val="0"/>
-              </a:ext>
-            </a:extLst>
-          </a:blip>
-          <a:stretch>
-            <a:fillRect/>
-          </a:stretch>
-        </p:blipFill>
-        <p:spPr>
-          <a:xfrm>
-            <a:off x="6146483" y="6172419"/>
-            <a:ext cx="1905000" cy="355600"/>
-          </a:xfrm>
-          <a:prstGeom prst="rect">
-            <a:avLst/>
-          </a:prstGeom>
-        </p:spPr>
-      </p:pic>
-      <p:sp>
-        <p:nvSpPr>
-          <p:cNvPr id="57" name="Rectangle 56"/>
-          <p:cNvSpPr/>
-          <p:nvPr/>
-        </p:nvSpPr>
-        <p:spPr>
-          <a:xfrm>
-            <a:off x="6307156" y="6518014"/>
-            <a:ext cx="1583655" cy="276999"/>
-          </a:xfrm>
-          <a:prstGeom prst="rect">
-            <a:avLst/>
-          </a:prstGeom>
-        </p:spPr>
-        <p:txBody>
-          <a:bodyPr wrap="square">
-            <a:spAutoFit/>
-          </a:bodyPr>
-          <a:lstStyle/>
-          <a:p>
-            <a:pPr algn="ctr"/>
-            <a:r>
-              <a:rPr lang="en-US" sz="1200" b="0" i="0" dirty="0">
-                <a:solidFill>
-                  <a:srgbClr val="2D2E3B"/>
-                </a:solidFill>
-                <a:effectLst/>
-                <a:latin typeface="Arial" panose="020B0604020202020204" pitchFamily="34" charset="0"/>
-                <a:cs typeface="Arial" panose="020B0604020202020204" pitchFamily="34" charset="0"/>
-              </a:rPr>
-              <a:t>Darktrace appliance</a:t>
-            </a:r>
-            <a:endParaRPr lang="en-US" sz="1200" dirty="0">
-              <a:latin typeface="Arial" panose="020B0604020202020204" pitchFamily="34" charset="0"/>
-              <a:cs typeface="Arial" panose="020B0604020202020204" pitchFamily="34" charset="0"/>
-            </a:endParaRPr>
-          </a:p>
-        </p:txBody>
-      </p:sp>
       <p:cxnSp>
         <p:nvCxnSpPr>
           <p:cNvPr id="61" name="Elbow Connector 60">
@@ -6715,7 +6645,7 @@
           <p:nvPr/>
         </p:nvPicPr>
         <p:blipFill>
-          <a:blip r:embed="rId14" cstate="print">
+          <a:blip r:embed="rId13" cstate="print">
             <a:extLst>
               <a:ext uri="{28A0092B-C50C-407E-A947-70E740481C1C}">
                 <a14:useLocalDpi xmlns:a14="http://schemas.microsoft.com/office/drawing/2010/main" val="0"/>
@@ -7110,7 +7040,7 @@
           <p:nvPr/>
         </p:nvPicPr>
         <p:blipFill>
-          <a:blip r:embed="rId15" cstate="print">
+          <a:blip r:embed="rId14" cstate="print">
             <a:extLst>
               <a:ext uri="{28A0092B-C50C-407E-A947-70E740481C1C}">
                 <a14:useLocalDpi xmlns:a14="http://schemas.microsoft.com/office/drawing/2010/main" val="0"/>
@@ -7249,6 +7179,85 @@
           </a:fontRef>
         </p:style>
       </p:cxnSp>
+      <p:sp>
+        <p:nvSpPr>
+          <p:cNvPr id="2" name="Rectangle 1">
+            <a:extLst>
+              <a:ext uri="{FF2B5EF4-FFF2-40B4-BE49-F238E27FC236}">
+                <a16:creationId xmlns:a16="http://schemas.microsoft.com/office/drawing/2014/main" id="{F1FFDD73-AFBD-38C7-B14A-64B623244889}"/>
+              </a:ext>
+            </a:extLst>
+          </p:cNvPr>
+          <p:cNvSpPr/>
+          <p:nvPr/>
+        </p:nvSpPr>
+        <p:spPr>
+          <a:xfrm>
+            <a:off x="6300367" y="6394435"/>
+            <a:ext cx="1744327" cy="276999"/>
+          </a:xfrm>
+          <a:prstGeom prst="rect">
+            <a:avLst/>
+          </a:prstGeom>
+        </p:spPr>
+        <p:txBody>
+          <a:bodyPr wrap="square">
+            <a:spAutoFit/>
+          </a:bodyPr>
+          <a:lstStyle/>
+          <a:p>
+            <a:pPr algn="ctr"/>
+            <a:r>
+              <a:rPr lang="en-US" sz="1200" b="0" i="0" dirty="0">
+                <a:effectLst/>
+                <a:latin typeface="Arial" panose="020B0604020202020204" pitchFamily="34" charset="0"/>
+                <a:cs typeface="Arial" panose="020B0604020202020204" pitchFamily="34" charset="0"/>
+              </a:rPr>
+              <a:t>Darktrace appliance</a:t>
+            </a:r>
+            <a:endParaRPr lang="en-US" sz="1200" dirty="0">
+              <a:latin typeface="Arial" panose="020B0604020202020204" pitchFamily="34" charset="0"/>
+              <a:cs typeface="Arial" panose="020B0604020202020204" pitchFamily="34" charset="0"/>
+            </a:endParaRPr>
+          </a:p>
+        </p:txBody>
+      </p:sp>
+      <p:pic>
+        <p:nvPicPr>
+          <p:cNvPr id="3" name="Picture 2">
+            <a:extLst>
+              <a:ext uri="{FF2B5EF4-FFF2-40B4-BE49-F238E27FC236}">
+                <a16:creationId xmlns:a16="http://schemas.microsoft.com/office/drawing/2014/main" id="{3B79D8B6-70FE-F8C4-4CB3-BE4B5D880728}"/>
+              </a:ext>
+            </a:extLst>
+          </p:cNvPr>
+          <p:cNvPicPr>
+            <a:picLocks noChangeAspect="1"/>
+          </p:cNvPicPr>
+          <p:nvPr/>
+        </p:nvPicPr>
+        <p:blipFill>
+          <a:blip r:embed="rId15">
+            <a:extLst>
+              <a:ext uri="{28A0092B-C50C-407E-A947-70E740481C1C}">
+                <a14:useLocalDpi xmlns:a14="http://schemas.microsoft.com/office/drawing/2010/main" val="0"/>
+              </a:ext>
+            </a:extLst>
+          </a:blip>
+          <a:stretch>
+            <a:fillRect/>
+          </a:stretch>
+        </p:blipFill>
+        <p:spPr>
+          <a:xfrm>
+            <a:off x="6279580" y="6174225"/>
+            <a:ext cx="1858831" cy="220210"/>
+          </a:xfrm>
+          <a:prstGeom prst="rect">
+            <a:avLst/>
+          </a:prstGeom>
+        </p:spPr>
+      </p:pic>
     </p:spTree>
     <p:extLst>
       <p:ext uri="{BB962C8B-B14F-4D97-AF65-F5344CB8AC3E}">
@@ -9956,7 +9965,7 @@
         </p:blipFill>
         <p:spPr bwMode="auto">
           <a:xfrm>
-            <a:off x="932949" y="315400"/>
+            <a:off x="624839" y="315400"/>
             <a:ext cx="330200" cy="330200"/>
           </a:xfrm>
           <a:prstGeom prst="rect">
@@ -9987,76 +9996,6 @@
           </a:extLst>
         </p:spPr>
       </p:pic>
-      <p:pic>
-        <p:nvPicPr>
-          <p:cNvPr id="13" name="Picture 12"/>
-          <p:cNvPicPr>
-            <a:picLocks noChangeAspect="1"/>
-          </p:cNvPicPr>
-          <p:nvPr/>
-        </p:nvPicPr>
-        <p:blipFill>
-          <a:blip r:embed="rId10">
-            <a:extLst>
-              <a:ext uri="{28A0092B-C50C-407E-A947-70E740481C1C}">
-                <a14:useLocalDpi xmlns:a14="http://schemas.microsoft.com/office/drawing/2010/main" val="0"/>
-              </a:ext>
-            </a:extLst>
-          </a:blip>
-          <a:stretch>
-            <a:fillRect/>
-          </a:stretch>
-        </p:blipFill>
-        <p:spPr>
-          <a:xfrm>
-            <a:off x="2668530" y="5946372"/>
-            <a:ext cx="1905000" cy="355600"/>
-          </a:xfrm>
-          <a:prstGeom prst="rect">
-            <a:avLst/>
-          </a:prstGeom>
-        </p:spPr>
-      </p:pic>
-      <p:sp>
-        <p:nvSpPr>
-          <p:cNvPr id="57" name="Rectangle 56"/>
-          <p:cNvSpPr/>
-          <p:nvPr/>
-        </p:nvSpPr>
-        <p:spPr>
-          <a:xfrm>
-            <a:off x="2829203" y="6291967"/>
-            <a:ext cx="1583655" cy="276999"/>
-          </a:xfrm>
-          <a:prstGeom prst="rect">
-            <a:avLst/>
-          </a:prstGeom>
-        </p:spPr>
-        <p:txBody>
-          <a:bodyPr wrap="square">
-            <a:spAutoFit/>
-          </a:bodyPr>
-          <a:lstStyle/>
-          <a:p>
-            <a:pPr algn="ctr"/>
-            <a:r>
-              <a:rPr lang="en-US" sz="1200" b="0" i="0" dirty="0">
-                <a:solidFill>
-                  <a:srgbClr val="2D2E3B"/>
-                </a:solidFill>
-                <a:effectLst/>
-                <a:latin typeface="Arial" panose="020B0604020202020204" pitchFamily="34" charset="0"/>
-                <a:cs typeface="Arial" panose="020B0604020202020204" pitchFamily="34" charset="0"/>
-              </a:rPr>
-              <a:t>Darktrace appliance</a:t>
-            </a:r>
-            <a:endParaRPr lang="en-US" sz="1200" dirty="0">
-              <a:latin typeface="Arial" panose="020B0604020202020204" pitchFamily="34" charset="0"/>
-              <a:cs typeface="Arial" panose="020B0604020202020204" pitchFamily="34" charset="0"/>
-            </a:endParaRPr>
-          </a:p>
-        </p:txBody>
-      </p:sp>
       <p:sp>
         <p:nvSpPr>
           <p:cNvPr id="75" name="TextBox 22">
@@ -10248,7 +10187,7 @@
           <p:nvPr/>
         </p:nvPicPr>
         <p:blipFill>
-          <a:blip r:embed="rId11" cstate="print">
+          <a:blip r:embed="rId10" cstate="print">
             <a:extLst>
               <a:ext uri="{28A0092B-C50C-407E-A947-70E740481C1C}">
                 <a14:useLocalDpi xmlns:a14="http://schemas.microsoft.com/office/drawing/2010/main" val="0"/>
@@ -10469,7 +10408,7 @@
           <p:nvPr/>
         </p:nvPicPr>
         <p:blipFill>
-          <a:blip r:embed="rId12" cstate="print">
+          <a:blip r:embed="rId11" cstate="print">
             <a:extLst>
               <a:ext uri="{28A0092B-C50C-407E-A947-70E740481C1C}">
                 <a14:useLocalDpi xmlns:a14="http://schemas.microsoft.com/office/drawing/2010/main" val="0"/>
@@ -10529,7 +10468,7 @@
           <p:nvPr/>
         </p:nvPicPr>
         <p:blipFill>
-          <a:blip r:embed="rId13" cstate="print">
+          <a:blip r:embed="rId12" cstate="print">
             <a:extLst>
               <a:ext uri="{28A0092B-C50C-407E-A947-70E740481C1C}">
                 <a14:useLocalDpi xmlns:a14="http://schemas.microsoft.com/office/drawing/2010/main" val="0"/>
@@ -11066,7 +11005,7 @@
           <p:nvPr/>
         </p:nvPicPr>
         <p:blipFill>
-          <a:blip r:embed="rId13" cstate="print">
+          <a:blip r:embed="rId12" cstate="print">
             <a:extLst>
               <a:ext uri="{28A0092B-C50C-407E-A947-70E740481C1C}">
                 <a14:useLocalDpi xmlns:a14="http://schemas.microsoft.com/office/drawing/2010/main" val="0"/>
@@ -11126,7 +11065,7 @@
           <p:nvPr/>
         </p:nvPicPr>
         <p:blipFill>
-          <a:blip r:embed="rId14" cstate="print">
+          <a:blip r:embed="rId13" cstate="print">
             <a:extLst>
               <a:ext uri="{28A0092B-C50C-407E-A947-70E740481C1C}">
                 <a14:useLocalDpi xmlns:a14="http://schemas.microsoft.com/office/drawing/2010/main" val="0"/>
@@ -11957,7 +11896,7 @@
           <p:nvPr/>
         </p:nvPicPr>
         <p:blipFill>
-          <a:blip r:embed="rId15" cstate="print">
+          <a:blip r:embed="rId14" cstate="print">
             <a:extLst>
               <a:ext uri="{28A0092B-C50C-407E-A947-70E740481C1C}">
                 <a14:useLocalDpi xmlns:a14="http://schemas.microsoft.com/office/drawing/2010/main" val="0"/>
@@ -12048,6 +11987,85 @@
           </a:fontRef>
         </p:style>
       </p:cxnSp>
+      <p:sp>
+        <p:nvSpPr>
+          <p:cNvPr id="2" name="Rectangle 1">
+            <a:extLst>
+              <a:ext uri="{FF2B5EF4-FFF2-40B4-BE49-F238E27FC236}">
+                <a16:creationId xmlns:a16="http://schemas.microsoft.com/office/drawing/2014/main" id="{8BFC6540-6BEA-84F6-AC9D-23464CC9534D}"/>
+              </a:ext>
+            </a:extLst>
+          </p:cNvPr>
+          <p:cNvSpPr/>
+          <p:nvPr/>
+        </p:nvSpPr>
+        <p:spPr>
+          <a:xfrm>
+            <a:off x="2587693" y="6223595"/>
+            <a:ext cx="1744327" cy="276999"/>
+          </a:xfrm>
+          <a:prstGeom prst="rect">
+            <a:avLst/>
+          </a:prstGeom>
+        </p:spPr>
+        <p:txBody>
+          <a:bodyPr wrap="square">
+            <a:spAutoFit/>
+          </a:bodyPr>
+          <a:lstStyle/>
+          <a:p>
+            <a:pPr algn="ctr"/>
+            <a:r>
+              <a:rPr lang="en-US" sz="1200" b="0" i="0" dirty="0">
+                <a:effectLst/>
+                <a:latin typeface="Arial" panose="020B0604020202020204" pitchFamily="34" charset="0"/>
+                <a:cs typeface="Arial" panose="020B0604020202020204" pitchFamily="34" charset="0"/>
+              </a:rPr>
+              <a:t>Darktrace appliance</a:t>
+            </a:r>
+            <a:endParaRPr lang="en-US" sz="1200" dirty="0">
+              <a:latin typeface="Arial" panose="020B0604020202020204" pitchFamily="34" charset="0"/>
+              <a:cs typeface="Arial" panose="020B0604020202020204" pitchFamily="34" charset="0"/>
+            </a:endParaRPr>
+          </a:p>
+        </p:txBody>
+      </p:sp>
+      <p:pic>
+        <p:nvPicPr>
+          <p:cNvPr id="3" name="Picture 2">
+            <a:extLst>
+              <a:ext uri="{FF2B5EF4-FFF2-40B4-BE49-F238E27FC236}">
+                <a16:creationId xmlns:a16="http://schemas.microsoft.com/office/drawing/2014/main" id="{DE672D60-71C3-F259-CDE8-CB33438B80A5}"/>
+              </a:ext>
+            </a:extLst>
+          </p:cNvPr>
+          <p:cNvPicPr>
+            <a:picLocks noChangeAspect="1"/>
+          </p:cNvPicPr>
+          <p:nvPr/>
+        </p:nvPicPr>
+        <p:blipFill>
+          <a:blip r:embed="rId15">
+            <a:extLst>
+              <a:ext uri="{28A0092B-C50C-407E-A947-70E740481C1C}">
+                <a14:useLocalDpi xmlns:a14="http://schemas.microsoft.com/office/drawing/2010/main" val="0"/>
+              </a:ext>
+            </a:extLst>
+          </a:blip>
+          <a:stretch>
+            <a:fillRect/>
+          </a:stretch>
+        </p:blipFill>
+        <p:spPr>
+          <a:xfrm>
+            <a:off x="2566906" y="6003385"/>
+            <a:ext cx="1858831" cy="220210"/>
+          </a:xfrm>
+          <a:prstGeom prst="rect">
+            <a:avLst/>
+          </a:prstGeom>
+        </p:spPr>
+      </p:pic>
     </p:spTree>
     <p:extLst>
       <p:ext uri="{BB962C8B-B14F-4D97-AF65-F5344CB8AC3E}">
@@ -14774,36 +14792,6 @@
           </a:extLst>
         </p:spPr>
       </p:pic>
-      <p:pic>
-        <p:nvPicPr>
-          <p:cNvPr id="13" name="Picture 12"/>
-          <p:cNvPicPr>
-            <a:picLocks noChangeAspect="1"/>
-          </p:cNvPicPr>
-          <p:nvPr/>
-        </p:nvPicPr>
-        <p:blipFill>
-          <a:blip r:embed="rId10">
-            <a:extLst>
-              <a:ext uri="{28A0092B-C50C-407E-A947-70E740481C1C}">
-                <a14:useLocalDpi xmlns:a14="http://schemas.microsoft.com/office/drawing/2010/main" val="0"/>
-              </a:ext>
-            </a:extLst>
-          </a:blip>
-          <a:stretch>
-            <a:fillRect/>
-          </a:stretch>
-        </p:blipFill>
-        <p:spPr>
-          <a:xfrm>
-            <a:off x="6819170" y="5745683"/>
-            <a:ext cx="1905000" cy="355600"/>
-          </a:xfrm>
-          <a:prstGeom prst="rect">
-            <a:avLst/>
-          </a:prstGeom>
-        </p:spPr>
-      </p:pic>
       <p:sp>
         <p:nvSpPr>
           <p:cNvPr id="57" name="Rectangle 56"/>
@@ -15017,7 +15005,7 @@
           <p:nvPr/>
         </p:nvPicPr>
         <p:blipFill>
-          <a:blip r:embed="rId11" cstate="print">
+          <a:blip r:embed="rId10" cstate="print">
             <a:extLst>
               <a:ext uri="{28A0092B-C50C-407E-A947-70E740481C1C}">
                 <a14:useLocalDpi xmlns:a14="http://schemas.microsoft.com/office/drawing/2010/main" val="0"/>
@@ -15299,7 +15287,7 @@
           <p:nvPr/>
         </p:nvPicPr>
         <p:blipFill>
-          <a:blip r:embed="rId12" cstate="print">
+          <a:blip r:embed="rId11" cstate="print">
             <a:extLst>
               <a:ext uri="{28A0092B-C50C-407E-A947-70E740481C1C}">
                 <a14:useLocalDpi xmlns:a14="http://schemas.microsoft.com/office/drawing/2010/main" val="0"/>
@@ -15626,7 +15614,7 @@
           <p:nvPr/>
         </p:nvPicPr>
         <p:blipFill>
-          <a:blip r:embed="rId13" cstate="print">
+          <a:blip r:embed="rId12" cstate="print">
             <a:extLst>
               <a:ext uri="{28A0092B-C50C-407E-A947-70E740481C1C}">
                 <a14:useLocalDpi xmlns:a14="http://schemas.microsoft.com/office/drawing/2010/main" val="0"/>
@@ -15825,7 +15813,6 @@
           </p:cNvPr>
           <p:cNvCxnSpPr>
             <a:cxnSpLocks/>
-            <a:stCxn id="13" idx="0"/>
           </p:cNvCxnSpPr>
           <p:nvPr/>
         </p:nvCxnSpPr>
@@ -15860,6 +15847,42 @@
           </a:fontRef>
         </p:style>
       </p:cxnSp>
+      <p:pic>
+        <p:nvPicPr>
+          <p:cNvPr id="2" name="Picture 1">
+            <a:extLst>
+              <a:ext uri="{FF2B5EF4-FFF2-40B4-BE49-F238E27FC236}">
+                <a16:creationId xmlns:a16="http://schemas.microsoft.com/office/drawing/2014/main" id="{45530AFA-89A1-D45E-32D3-094A20A756FC}"/>
+              </a:ext>
+            </a:extLst>
+          </p:cNvPr>
+          <p:cNvPicPr>
+            <a:picLocks noChangeAspect="1"/>
+          </p:cNvPicPr>
+          <p:nvPr/>
+        </p:nvPicPr>
+        <p:blipFill>
+          <a:blip r:embed="rId13">
+            <a:extLst>
+              <a:ext uri="{28A0092B-C50C-407E-A947-70E740481C1C}">
+                <a14:useLocalDpi xmlns:a14="http://schemas.microsoft.com/office/drawing/2010/main" val="0"/>
+              </a:ext>
+            </a:extLst>
+          </a:blip>
+          <a:stretch>
+            <a:fillRect/>
+          </a:stretch>
+        </p:blipFill>
+        <p:spPr>
+          <a:xfrm>
+            <a:off x="6840839" y="5886048"/>
+            <a:ext cx="1858831" cy="220210"/>
+          </a:xfrm>
+          <a:prstGeom prst="rect">
+            <a:avLst/>
+          </a:prstGeom>
+        </p:spPr>
+      </p:pic>
     </p:spTree>
     <p:extLst>
       <p:ext uri="{BB962C8B-B14F-4D97-AF65-F5344CB8AC3E}">
@@ -18365,73 +18388,6 @@
           </a:extLst>
         </p:spPr>
       </p:pic>
-      <p:pic>
-        <p:nvPicPr>
-          <p:cNvPr id="13" name="Picture 12"/>
-          <p:cNvPicPr>
-            <a:picLocks noChangeAspect="1"/>
-          </p:cNvPicPr>
-          <p:nvPr/>
-        </p:nvPicPr>
-        <p:blipFill>
-          <a:blip r:embed="rId9">
-            <a:extLst>
-              <a:ext uri="{28A0092B-C50C-407E-A947-70E740481C1C}">
-                <a14:useLocalDpi xmlns:a14="http://schemas.microsoft.com/office/drawing/2010/main" val="0"/>
-              </a:ext>
-            </a:extLst>
-          </a:blip>
-          <a:stretch>
-            <a:fillRect/>
-          </a:stretch>
-        </p:blipFill>
-        <p:spPr>
-          <a:xfrm>
-            <a:off x="5965805" y="5962767"/>
-            <a:ext cx="1905000" cy="355600"/>
-          </a:xfrm>
-          <a:prstGeom prst="rect">
-            <a:avLst/>
-          </a:prstGeom>
-        </p:spPr>
-      </p:pic>
-      <p:sp>
-        <p:nvSpPr>
-          <p:cNvPr id="57" name="Rectangle 56"/>
-          <p:cNvSpPr/>
-          <p:nvPr/>
-        </p:nvSpPr>
-        <p:spPr>
-          <a:xfrm>
-            <a:off x="6046141" y="6274814"/>
-            <a:ext cx="1744327" cy="276999"/>
-          </a:xfrm>
-          <a:prstGeom prst="rect">
-            <a:avLst/>
-          </a:prstGeom>
-        </p:spPr>
-        <p:txBody>
-          <a:bodyPr wrap="square">
-            <a:spAutoFit/>
-          </a:bodyPr>
-          <a:lstStyle/>
-          <a:p>
-            <a:pPr algn="ctr"/>
-            <a:r>
-              <a:rPr lang="en-US" sz="1200" b="0" i="0" dirty="0">
-                <a:effectLst/>
-                <a:latin typeface="Arial" panose="020B0604020202020204" pitchFamily="34" charset="0"/>
-                <a:cs typeface="Arial" panose="020B0604020202020204" pitchFamily="34" charset="0"/>
-              </a:rPr>
-              <a:t>Darktrace appliance</a:t>
-            </a:r>
-            <a:endParaRPr lang="en-US" sz="1200" dirty="0">
-              <a:latin typeface="Arial" panose="020B0604020202020204" pitchFamily="34" charset="0"/>
-              <a:cs typeface="Arial" panose="020B0604020202020204" pitchFamily="34" charset="0"/>
-            </a:endParaRPr>
-          </a:p>
-        </p:txBody>
-      </p:sp>
       <p:sp>
         <p:nvSpPr>
           <p:cNvPr id="64" name="TextBox 20">
@@ -18608,7 +18564,7 @@
           <p:nvPr/>
         </p:nvPicPr>
         <p:blipFill>
-          <a:blip r:embed="rId10" cstate="print">
+          <a:blip r:embed="rId9" cstate="print">
             <a:extLst>
               <a:ext uri="{28A0092B-C50C-407E-A947-70E740481C1C}">
                 <a14:useLocalDpi xmlns:a14="http://schemas.microsoft.com/office/drawing/2010/main" val="0"/>
@@ -18876,7 +18832,7 @@
           <p:nvPr/>
         </p:nvPicPr>
         <p:blipFill>
-          <a:blip r:embed="rId11" cstate="print">
+          <a:blip r:embed="rId10" cstate="print">
             <a:extLst>
               <a:ext uri="{28A0092B-C50C-407E-A947-70E740481C1C}">
                 <a14:useLocalDpi xmlns:a14="http://schemas.microsoft.com/office/drawing/2010/main" val="0"/>
@@ -19158,7 +19114,7 @@
           <p:nvPr/>
         </p:nvPicPr>
         <p:blipFill>
-          <a:blip r:embed="rId12" cstate="print">
+          <a:blip r:embed="rId11" cstate="print">
             <a:extLst>
               <a:ext uri="{28A0092B-C50C-407E-A947-70E740481C1C}">
                 <a14:useLocalDpi xmlns:a14="http://schemas.microsoft.com/office/drawing/2010/main" val="0"/>
@@ -19260,7 +19216,6 @@
           </p:cNvPr>
           <p:cNvCxnSpPr>
             <a:cxnSpLocks/>
-            <a:stCxn id="13" idx="0"/>
           </p:cNvCxnSpPr>
           <p:nvPr/>
         </p:nvCxnSpPr>
@@ -19416,7 +19371,7 @@
           <p:nvPr/>
         </p:nvPicPr>
         <p:blipFill>
-          <a:blip r:embed="rId13" cstate="print">
+          <a:blip r:embed="rId12" cstate="print">
             <a:extLst>
               <a:ext uri="{28A0092B-C50C-407E-A947-70E740481C1C}">
                 <a14:useLocalDpi xmlns:a14="http://schemas.microsoft.com/office/drawing/2010/main" val="0"/>
@@ -19637,7 +19592,7 @@
           <p:nvPr/>
         </p:nvPicPr>
         <p:blipFill>
-          <a:blip r:embed="rId14" cstate="print">
+          <a:blip r:embed="rId13" cstate="print">
             <a:extLst>
               <a:ext uri="{28A0092B-C50C-407E-A947-70E740481C1C}">
                 <a14:useLocalDpi xmlns:a14="http://schemas.microsoft.com/office/drawing/2010/main" val="0"/>
@@ -19843,6 +19798,85 @@
           </a:p>
         </p:txBody>
       </p:sp>
+      <p:sp>
+        <p:nvSpPr>
+          <p:cNvPr id="2" name="Rectangle 1">
+            <a:extLst>
+              <a:ext uri="{FF2B5EF4-FFF2-40B4-BE49-F238E27FC236}">
+                <a16:creationId xmlns:a16="http://schemas.microsoft.com/office/drawing/2014/main" id="{25F65173-4D54-74D8-3120-57AB1AD187B4}"/>
+              </a:ext>
+            </a:extLst>
+          </p:cNvPr>
+          <p:cNvSpPr/>
+          <p:nvPr/>
+        </p:nvSpPr>
+        <p:spPr>
+          <a:xfrm>
+            <a:off x="6072702" y="6345906"/>
+            <a:ext cx="1744327" cy="276999"/>
+          </a:xfrm>
+          <a:prstGeom prst="rect">
+            <a:avLst/>
+          </a:prstGeom>
+        </p:spPr>
+        <p:txBody>
+          <a:bodyPr wrap="square">
+            <a:spAutoFit/>
+          </a:bodyPr>
+          <a:lstStyle/>
+          <a:p>
+            <a:pPr algn="ctr"/>
+            <a:r>
+              <a:rPr lang="en-US" sz="1200" b="0" i="0" dirty="0">
+                <a:effectLst/>
+                <a:latin typeface="Arial" panose="020B0604020202020204" pitchFamily="34" charset="0"/>
+                <a:cs typeface="Arial" panose="020B0604020202020204" pitchFamily="34" charset="0"/>
+              </a:rPr>
+              <a:t>Darktrace appliance</a:t>
+            </a:r>
+            <a:endParaRPr lang="en-US" sz="1200" dirty="0">
+              <a:latin typeface="Arial" panose="020B0604020202020204" pitchFamily="34" charset="0"/>
+              <a:cs typeface="Arial" panose="020B0604020202020204" pitchFamily="34" charset="0"/>
+            </a:endParaRPr>
+          </a:p>
+        </p:txBody>
+      </p:sp>
+      <p:pic>
+        <p:nvPicPr>
+          <p:cNvPr id="3" name="Picture 2">
+            <a:extLst>
+              <a:ext uri="{FF2B5EF4-FFF2-40B4-BE49-F238E27FC236}">
+                <a16:creationId xmlns:a16="http://schemas.microsoft.com/office/drawing/2014/main" id="{C8D588E7-6250-FD17-FCA2-1AEEAFFA4D7C}"/>
+              </a:ext>
+            </a:extLst>
+          </p:cNvPr>
+          <p:cNvPicPr>
+            <a:picLocks noChangeAspect="1"/>
+          </p:cNvPicPr>
+          <p:nvPr/>
+        </p:nvPicPr>
+        <p:blipFill>
+          <a:blip r:embed="rId14">
+            <a:extLst>
+              <a:ext uri="{28A0092B-C50C-407E-A947-70E740481C1C}">
+                <a14:useLocalDpi xmlns:a14="http://schemas.microsoft.com/office/drawing/2010/main" val="0"/>
+              </a:ext>
+            </a:extLst>
+          </a:blip>
+          <a:stretch>
+            <a:fillRect/>
+          </a:stretch>
+        </p:blipFill>
+        <p:spPr>
+          <a:xfrm>
+            <a:off x="6051915" y="6125696"/>
+            <a:ext cx="1858831" cy="220210"/>
+          </a:xfrm>
+          <a:prstGeom prst="rect">
+            <a:avLst/>
+          </a:prstGeom>
+        </p:spPr>
+      </p:pic>
     </p:spTree>
     <p:extLst>
       <p:ext uri="{BB962C8B-B14F-4D97-AF65-F5344CB8AC3E}">

</xml_diff>

<commit_message>
Fix availability zone 2 -> 1
</commit_message>
<xml_diff>
--- a/docs/images/darktrace-vsensor-architecture-diagram.pptx
+++ b/docs/images/darktrace-vsensor-architecture-diagram.pptx
@@ -242,7 +242,7 @@
           <a:p>
             <a:fld id="{091DC170-1660-4809-9A15-62445EB0C7B1}" type="datetimeFigureOut">
               <a:rPr lang="en-US" smtClean="0"/>
-              <a:t>1/30/23</a:t>
+              <a:t>2/3/23</a:t>
             </a:fld>
             <a:endParaRPr lang="en-US"/>
           </a:p>
@@ -410,7 +410,7 @@
           <a:p>
             <a:fld id="{091DC170-1660-4809-9A15-62445EB0C7B1}" type="datetimeFigureOut">
               <a:rPr lang="en-US" smtClean="0"/>
-              <a:t>1/30/23</a:t>
+              <a:t>2/3/23</a:t>
             </a:fld>
             <a:endParaRPr lang="en-US"/>
           </a:p>
@@ -588,7 +588,7 @@
           <a:p>
             <a:fld id="{091DC170-1660-4809-9A15-62445EB0C7B1}" type="datetimeFigureOut">
               <a:rPr lang="en-US" smtClean="0"/>
-              <a:t>1/30/23</a:t>
+              <a:t>2/3/23</a:t>
             </a:fld>
             <a:endParaRPr lang="en-US"/>
           </a:p>
@@ -756,7 +756,7 @@
           <a:p>
             <a:fld id="{091DC170-1660-4809-9A15-62445EB0C7B1}" type="datetimeFigureOut">
               <a:rPr lang="en-US" smtClean="0"/>
-              <a:t>1/30/23</a:t>
+              <a:t>2/3/23</a:t>
             </a:fld>
             <a:endParaRPr lang="en-US"/>
           </a:p>
@@ -1001,7 +1001,7 @@
           <a:p>
             <a:fld id="{091DC170-1660-4809-9A15-62445EB0C7B1}" type="datetimeFigureOut">
               <a:rPr lang="en-US" smtClean="0"/>
-              <a:t>1/30/23</a:t>
+              <a:t>2/3/23</a:t>
             </a:fld>
             <a:endParaRPr lang="en-US"/>
           </a:p>
@@ -1230,7 +1230,7 @@
           <a:p>
             <a:fld id="{091DC170-1660-4809-9A15-62445EB0C7B1}" type="datetimeFigureOut">
               <a:rPr lang="en-US" smtClean="0"/>
-              <a:t>1/30/23</a:t>
+              <a:t>2/3/23</a:t>
             </a:fld>
             <a:endParaRPr lang="en-US"/>
           </a:p>
@@ -1594,7 +1594,7 @@
           <a:p>
             <a:fld id="{091DC170-1660-4809-9A15-62445EB0C7B1}" type="datetimeFigureOut">
               <a:rPr lang="en-US" smtClean="0"/>
-              <a:t>1/30/23</a:t>
+              <a:t>2/3/23</a:t>
             </a:fld>
             <a:endParaRPr lang="en-US"/>
           </a:p>
@@ -1711,7 +1711,7 @@
           <a:p>
             <a:fld id="{091DC170-1660-4809-9A15-62445EB0C7B1}" type="datetimeFigureOut">
               <a:rPr lang="en-US" smtClean="0"/>
-              <a:t>1/30/23</a:t>
+              <a:t>2/3/23</a:t>
             </a:fld>
             <a:endParaRPr lang="en-US"/>
           </a:p>
@@ -1806,7 +1806,7 @@
           <a:p>
             <a:fld id="{091DC170-1660-4809-9A15-62445EB0C7B1}" type="datetimeFigureOut">
               <a:rPr lang="en-US" smtClean="0"/>
-              <a:t>1/30/23</a:t>
+              <a:t>2/3/23</a:t>
             </a:fld>
             <a:endParaRPr lang="en-US"/>
           </a:p>
@@ -2081,7 +2081,7 @@
           <a:p>
             <a:fld id="{091DC170-1660-4809-9A15-62445EB0C7B1}" type="datetimeFigureOut">
               <a:rPr lang="en-US" smtClean="0"/>
-              <a:t>1/30/23</a:t>
+              <a:t>2/3/23</a:t>
             </a:fld>
             <a:endParaRPr lang="en-US"/>
           </a:p>
@@ -2333,7 +2333,7 @@
           <a:p>
             <a:fld id="{091DC170-1660-4809-9A15-62445EB0C7B1}" type="datetimeFigureOut">
               <a:rPr lang="en-US" smtClean="0"/>
-              <a:t>1/30/23</a:t>
+              <a:t>2/3/23</a:t>
             </a:fld>
             <a:endParaRPr lang="en-US"/>
           </a:p>
@@ -2544,7 +2544,7 @@
           <a:p>
             <a:fld id="{091DC170-1660-4809-9A15-62445EB0C7B1}" type="datetimeFigureOut">
               <a:rPr lang="en-US" smtClean="0"/>
-              <a:t>1/30/23</a:t>
+              <a:t>2/3/23</a:t>
             </a:fld>
             <a:endParaRPr lang="en-US"/>
           </a:p>
@@ -5257,7 +5257,7 @@
                 <a:latin typeface="Arial" panose="020B0604020202020204" pitchFamily="34" charset="0"/>
                 <a:cs typeface="Arial" panose="020B0604020202020204" pitchFamily="34" charset="0"/>
               </a:rPr>
-              <a:t>Availability Zone 2</a:t>
+              <a:t>Availability Zone 1</a:t>
             </a:r>
           </a:p>
         </p:txBody>
@@ -9456,7 +9456,7 @@
                 <a:latin typeface="Arial" panose="020B0604020202020204" pitchFamily="34" charset="0"/>
                 <a:cs typeface="Arial" panose="020B0604020202020204" pitchFamily="34" charset="0"/>
               </a:rPr>
-              <a:t>Availability Zone 2</a:t>
+              <a:t>Availability Zone 1</a:t>
             </a:r>
           </a:p>
         </p:txBody>

</xml_diff>